<commit_message>
[WD] add rop slide + animations
</commit_message>
<xml_diff>
--- a/Blind_Date/slides.pptx
+++ b/Blind_Date/slides.pptx
@@ -13,6 +13,11 @@
     <p:sldId id="271" r:id="rId7"/>
     <p:sldId id="272" r:id="rId8"/>
     <p:sldId id="273" r:id="rId9"/>
+    <p:sldId id="274" r:id="rId10"/>
+    <p:sldId id="277" r:id="rId11"/>
+    <p:sldId id="278" r:id="rId12"/>
+    <p:sldId id="275" r:id="rId13"/>
+    <p:sldId id="276" r:id="rId14"/>
   </p:sldIdLst>
   <p:sldSz cx="12192000" cy="6858000"/>
   <p:notesSz cx="6858000" cy="9144000"/>
@@ -3810,7 +3815,7 @@
         </p:nvSpPr>
         <p:spPr>
           <a:xfrm>
-            <a:off x="2250606" y="1673467"/>
+            <a:off x="1822238" y="1698181"/>
             <a:ext cx="7963850" cy="1754326"/>
           </a:xfrm>
           <a:prstGeom prst="rect">
@@ -3851,7 +3856,7 @@
         </p:nvSpPr>
         <p:spPr>
           <a:xfrm>
-            <a:off x="4341816" y="6165517"/>
+            <a:off x="3913448" y="6190231"/>
             <a:ext cx="3781425" cy="461665"/>
           </a:xfrm>
           <a:prstGeom prst="rect">
@@ -3881,7 +3886,7 @@
         </p:nvSpPr>
         <p:spPr>
           <a:xfrm>
-            <a:off x="2250606" y="170497"/>
+            <a:off x="1822238" y="195211"/>
             <a:ext cx="7963849" cy="1077218"/>
           </a:xfrm>
           <a:prstGeom prst="rect">
@@ -3918,7 +3923,7 @@
         </p:nvSpPr>
         <p:spPr>
           <a:xfrm flipV="1">
-            <a:off x="4552157" y="1490752"/>
+            <a:off x="4123789" y="1515466"/>
             <a:ext cx="3360745" cy="45719"/>
           </a:xfrm>
           <a:prstGeom prst="rect">
@@ -3972,7 +3977,7 @@
         </p:blipFill>
         <p:spPr>
           <a:xfrm>
-            <a:off x="4857724" y="3564789"/>
+            <a:off x="4429356" y="3589503"/>
             <a:ext cx="2756260" cy="2325801"/>
           </a:xfrm>
           <a:prstGeom prst="rect">
@@ -3984,6 +3989,638 @@
     <p:extLst>
       <p:ext uri="{BB962C8B-B14F-4D97-AF65-F5344CB8AC3E}">
         <p14:creationId xmlns:p14="http://schemas.microsoft.com/office/powerpoint/2010/main" val="3577957547"/>
+      </p:ext>
+    </p:extLst>
+  </p:cSld>
+  <p:clrMapOvr>
+    <a:masterClrMapping/>
+  </p:clrMapOvr>
+  <mc:AlternateContent xmlns:mc="http://schemas.openxmlformats.org/markup-compatibility/2006">
+    <mc:Choice xmlns:p14="http://schemas.microsoft.com/office/powerpoint/2010/main" Requires="p14">
+      <p:transition p14:dur="0"/>
+    </mc:Choice>
+    <mc:Fallback>
+      <p:transition/>
+    </mc:Fallback>
+  </mc:AlternateContent>
+  <p:timing>
+    <p:tnLst>
+      <p:par>
+        <p:cTn id="1" dur="indefinite" restart="never" nodeType="tmRoot"/>
+      </p:par>
+    </p:tnLst>
+  </p:timing>
+</p:sld>
+</file>
+
+<file path=ppt/slides/slide10.xml><?xml version="1.0" encoding="utf-8"?>
+<p:sld xmlns:a="http://schemas.openxmlformats.org/drawingml/2006/main" xmlns:r="http://schemas.openxmlformats.org/officeDocument/2006/relationships" xmlns:p="http://schemas.openxmlformats.org/presentationml/2006/main">
+  <p:cSld>
+    <p:spTree>
+      <p:nvGrpSpPr>
+        <p:cNvPr id="1" name=""/>
+        <p:cNvGrpSpPr/>
+        <p:nvPr/>
+      </p:nvGrpSpPr>
+      <p:grpSpPr>
+        <a:xfrm>
+          <a:off x="0" y="0"/>
+          <a:ext cx="0" cy="0"/>
+          <a:chOff x="0" y="0"/>
+          <a:chExt cx="0" cy="0"/>
+        </a:xfrm>
+      </p:grpSpPr>
+      <p:sp>
+        <p:nvSpPr>
+          <p:cNvPr id="12" name="Rectangle 11"/>
+          <p:cNvSpPr/>
+          <p:nvPr/>
+        </p:nvSpPr>
+        <p:spPr>
+          <a:xfrm>
+            <a:off x="457199" y="0"/>
+            <a:ext cx="10839451" cy="628649"/>
+          </a:xfrm>
+          <a:prstGeom prst="rect">
+            <a:avLst/>
+          </a:prstGeom>
+          <a:gradFill flip="none" rotWithShape="1">
+            <a:gsLst>
+              <a:gs pos="52000">
+                <a:schemeClr val="accent1">
+                  <a:lumMod val="60000"/>
+                  <a:lumOff val="40000"/>
+                </a:schemeClr>
+              </a:gs>
+              <a:gs pos="100000">
+                <a:schemeClr val="tx2">
+                  <a:lumMod val="60000"/>
+                  <a:lumOff val="40000"/>
+                </a:schemeClr>
+              </a:gs>
+              <a:gs pos="0">
+                <a:schemeClr val="accent1"/>
+              </a:gs>
+            </a:gsLst>
+            <a:lin ang="10800000" scaled="1"/>
+            <a:tileRect/>
+          </a:gradFill>
+          <a:ln>
+            <a:noFill/>
+          </a:ln>
+        </p:spPr>
+        <p:style>
+          <a:lnRef idx="2">
+            <a:schemeClr val="accent1">
+              <a:shade val="50000"/>
+            </a:schemeClr>
+          </a:lnRef>
+          <a:fillRef idx="1">
+            <a:schemeClr val="accent1"/>
+          </a:fillRef>
+          <a:effectRef idx="0">
+            <a:schemeClr val="accent1"/>
+          </a:effectRef>
+          <a:fontRef idx="minor">
+            <a:schemeClr val="lt1"/>
+          </a:fontRef>
+        </p:style>
+        <p:txBody>
+          <a:bodyPr rtlCol="0" anchor="ctr"/>
+          <a:lstStyle/>
+          <a:p>
+            <a:pPr algn="ctr"/>
+            <a:endParaRPr lang="en-US" sz="3200"/>
+          </a:p>
+        </p:txBody>
+      </p:sp>
+      <p:pic>
+        <p:nvPicPr>
+          <p:cNvPr id="10" name="Picture 9"/>
+          <p:cNvPicPr>
+            <a:picLocks noChangeAspect="1"/>
+          </p:cNvPicPr>
+          <p:nvPr/>
+        </p:nvPicPr>
+        <p:blipFill>
+          <a:blip r:embed="rId2" cstate="print">
+            <a:extLst>
+              <a:ext uri="{28A0092B-C50C-407E-A947-70E740481C1C}">
+                <a14:useLocalDpi xmlns:a14="http://schemas.microsoft.com/office/drawing/2010/main" val="0"/>
+              </a:ext>
+            </a:extLst>
+          </a:blip>
+          <a:stretch>
+            <a:fillRect/>
+          </a:stretch>
+        </p:blipFill>
+        <p:spPr>
+          <a:xfrm>
+            <a:off x="11325199" y="116740"/>
+            <a:ext cx="866801" cy="731428"/>
+          </a:xfrm>
+          <a:prstGeom prst="rect">
+            <a:avLst/>
+          </a:prstGeom>
+        </p:spPr>
+      </p:pic>
+      <p:sp>
+        <p:nvSpPr>
+          <p:cNvPr id="4" name="TextBox 3"/>
+          <p:cNvSpPr txBox="1"/>
+          <p:nvPr/>
+        </p:nvSpPr>
+        <p:spPr>
+          <a:xfrm>
+            <a:off x="1340642" y="0"/>
+            <a:ext cx="9072564" cy="584775"/>
+          </a:xfrm>
+          <a:prstGeom prst="rect">
+            <a:avLst/>
+          </a:prstGeom>
+          <a:noFill/>
+        </p:spPr>
+        <p:txBody>
+          <a:bodyPr wrap="square" rtlCol="0">
+            <a:spAutoFit/>
+          </a:bodyPr>
+          <a:lstStyle/>
+          <a:p>
+            <a:pPr algn="ctr"/>
+            <a:r>
+              <a:rPr lang="en-US" sz="3200" dirty="0" smtClean="0"/>
+              <a:t>A visual representation</a:t>
+            </a:r>
+            <a:endParaRPr lang="en-US" sz="3200" dirty="0"/>
+          </a:p>
+        </p:txBody>
+      </p:sp>
+      <p:pic>
+        <p:nvPicPr>
+          <p:cNvPr id="2" name="Picture 1"/>
+          <p:cNvPicPr>
+            <a:picLocks noChangeAspect="1"/>
+          </p:cNvPicPr>
+          <p:nvPr/>
+        </p:nvPicPr>
+        <p:blipFill>
+          <a:blip r:embed="rId3">
+            <a:extLst>
+              <a:ext uri="{28A0092B-C50C-407E-A947-70E740481C1C}">
+                <a14:useLocalDpi xmlns:a14="http://schemas.microsoft.com/office/drawing/2010/main" val="0"/>
+              </a:ext>
+            </a:extLst>
+          </a:blip>
+          <a:stretch>
+            <a:fillRect/>
+          </a:stretch>
+        </p:blipFill>
+        <p:spPr>
+          <a:xfrm>
+            <a:off x="846297" y="1118625"/>
+            <a:ext cx="7317400" cy="5286869"/>
+          </a:xfrm>
+          <a:prstGeom prst="rect">
+            <a:avLst/>
+          </a:prstGeom>
+        </p:spPr>
+      </p:pic>
+      <p:sp>
+        <p:nvSpPr>
+          <p:cNvPr id="3" name="TextBox 2"/>
+          <p:cNvSpPr txBox="1"/>
+          <p:nvPr/>
+        </p:nvSpPr>
+        <p:spPr>
+          <a:xfrm>
+            <a:off x="8440243" y="2946451"/>
+            <a:ext cx="2623174" cy="1631216"/>
+          </a:xfrm>
+          <a:prstGeom prst="rect">
+            <a:avLst/>
+          </a:prstGeom>
+          <a:noFill/>
+        </p:spPr>
+        <p:txBody>
+          <a:bodyPr wrap="square" rtlCol="0">
+            <a:spAutoFit/>
+          </a:bodyPr>
+          <a:lstStyle/>
+          <a:p>
+            <a:r>
+              <a:rPr lang="en-US" sz="2000" i="1" dirty="0" smtClean="0"/>
+              <a:t>Ok cool bro, but...</a:t>
+            </a:r>
+          </a:p>
+          <a:p>
+            <a:endParaRPr lang="en-US" sz="2000" i="1" dirty="0"/>
+          </a:p>
+          <a:p>
+            <a:r>
+              <a:rPr lang="en-US" sz="2000" i="1" dirty="0" smtClean="0"/>
+              <a:t>We can’t locate the gadgets without the binary!</a:t>
+            </a:r>
+            <a:endParaRPr lang="en-US" sz="2000" i="1" dirty="0"/>
+          </a:p>
+        </p:txBody>
+      </p:sp>
+    </p:spTree>
+    <p:extLst>
+      <p:ext uri="{BB962C8B-B14F-4D97-AF65-F5344CB8AC3E}">
+        <p14:creationId xmlns:p14="http://schemas.microsoft.com/office/powerpoint/2010/main" val="2581586024"/>
+      </p:ext>
+    </p:extLst>
+  </p:cSld>
+  <p:clrMapOvr>
+    <a:masterClrMapping/>
+  </p:clrMapOvr>
+  <p:timing>
+    <p:tnLst>
+      <p:par>
+        <p:cTn id="1" dur="indefinite" restart="never" nodeType="tmRoot"/>
+      </p:par>
+    </p:tnLst>
+  </p:timing>
+</p:sld>
+</file>
+
+<file path=ppt/slides/slide11.xml><?xml version="1.0" encoding="utf-8"?>
+<p:sld xmlns:a="http://schemas.openxmlformats.org/drawingml/2006/main" xmlns:r="http://schemas.openxmlformats.org/officeDocument/2006/relationships" xmlns:p="http://schemas.openxmlformats.org/presentationml/2006/main">
+  <p:cSld>
+    <p:spTree>
+      <p:nvGrpSpPr>
+        <p:cNvPr id="1" name=""/>
+        <p:cNvGrpSpPr/>
+        <p:nvPr/>
+      </p:nvGrpSpPr>
+      <p:grpSpPr>
+        <a:xfrm>
+          <a:off x="0" y="0"/>
+          <a:ext cx="0" cy="0"/>
+          <a:chOff x="0" y="0"/>
+          <a:chExt cx="0" cy="0"/>
+        </a:xfrm>
+      </p:grpSpPr>
+      <p:sp>
+        <p:nvSpPr>
+          <p:cNvPr id="12" name="Rectangle 11"/>
+          <p:cNvSpPr/>
+          <p:nvPr/>
+        </p:nvSpPr>
+        <p:spPr>
+          <a:xfrm>
+            <a:off x="457199" y="0"/>
+            <a:ext cx="10839451" cy="628649"/>
+          </a:xfrm>
+          <a:prstGeom prst="rect">
+            <a:avLst/>
+          </a:prstGeom>
+          <a:gradFill flip="none" rotWithShape="1">
+            <a:gsLst>
+              <a:gs pos="52000">
+                <a:schemeClr val="accent1">
+                  <a:lumMod val="60000"/>
+                  <a:lumOff val="40000"/>
+                </a:schemeClr>
+              </a:gs>
+              <a:gs pos="100000">
+                <a:schemeClr val="tx2">
+                  <a:lumMod val="60000"/>
+                  <a:lumOff val="40000"/>
+                </a:schemeClr>
+              </a:gs>
+              <a:gs pos="0">
+                <a:schemeClr val="accent1"/>
+              </a:gs>
+            </a:gsLst>
+            <a:lin ang="10800000" scaled="1"/>
+            <a:tileRect/>
+          </a:gradFill>
+          <a:ln>
+            <a:noFill/>
+          </a:ln>
+        </p:spPr>
+        <p:style>
+          <a:lnRef idx="2">
+            <a:schemeClr val="accent1">
+              <a:shade val="50000"/>
+            </a:schemeClr>
+          </a:lnRef>
+          <a:fillRef idx="1">
+            <a:schemeClr val="accent1"/>
+          </a:fillRef>
+          <a:effectRef idx="0">
+            <a:schemeClr val="accent1"/>
+          </a:effectRef>
+          <a:fontRef idx="minor">
+            <a:schemeClr val="lt1"/>
+          </a:fontRef>
+        </p:style>
+        <p:txBody>
+          <a:bodyPr rtlCol="0" anchor="ctr"/>
+          <a:lstStyle/>
+          <a:p>
+            <a:pPr algn="ctr"/>
+            <a:endParaRPr lang="en-US" sz="3200"/>
+          </a:p>
+        </p:txBody>
+      </p:sp>
+      <p:pic>
+        <p:nvPicPr>
+          <p:cNvPr id="10" name="Picture 9"/>
+          <p:cNvPicPr>
+            <a:picLocks noChangeAspect="1"/>
+          </p:cNvPicPr>
+          <p:nvPr/>
+        </p:nvPicPr>
+        <p:blipFill>
+          <a:blip r:embed="rId2" cstate="print">
+            <a:extLst>
+              <a:ext uri="{28A0092B-C50C-407E-A947-70E740481C1C}">
+                <a14:useLocalDpi xmlns:a14="http://schemas.microsoft.com/office/drawing/2010/main" val="0"/>
+              </a:ext>
+            </a:extLst>
+          </a:blip>
+          <a:stretch>
+            <a:fillRect/>
+          </a:stretch>
+        </p:blipFill>
+        <p:spPr>
+          <a:xfrm>
+            <a:off x="11325199" y="116740"/>
+            <a:ext cx="866801" cy="731428"/>
+          </a:xfrm>
+          <a:prstGeom prst="rect">
+            <a:avLst/>
+          </a:prstGeom>
+        </p:spPr>
+      </p:pic>
+    </p:spTree>
+    <p:extLst>
+      <p:ext uri="{BB962C8B-B14F-4D97-AF65-F5344CB8AC3E}">
+        <p14:creationId xmlns:p14="http://schemas.microsoft.com/office/powerpoint/2010/main" val="3056285235"/>
+      </p:ext>
+    </p:extLst>
+  </p:cSld>
+  <p:clrMapOvr>
+    <a:masterClrMapping/>
+  </p:clrMapOvr>
+  <p:timing>
+    <p:tnLst>
+      <p:par>
+        <p:cTn id="1" dur="indefinite" restart="never" nodeType="tmRoot"/>
+      </p:par>
+    </p:tnLst>
+  </p:timing>
+</p:sld>
+</file>
+
+<file path=ppt/slides/slide12.xml><?xml version="1.0" encoding="utf-8"?>
+<p:sld xmlns:a="http://schemas.openxmlformats.org/drawingml/2006/main" xmlns:r="http://schemas.openxmlformats.org/officeDocument/2006/relationships" xmlns:p="http://schemas.openxmlformats.org/presentationml/2006/main">
+  <p:cSld>
+    <p:spTree>
+      <p:nvGrpSpPr>
+        <p:cNvPr id="1" name=""/>
+        <p:cNvGrpSpPr/>
+        <p:nvPr/>
+      </p:nvGrpSpPr>
+      <p:grpSpPr>
+        <a:xfrm>
+          <a:off x="0" y="0"/>
+          <a:ext cx="0" cy="0"/>
+          <a:chOff x="0" y="0"/>
+          <a:chExt cx="0" cy="0"/>
+        </a:xfrm>
+      </p:grpSpPr>
+      <p:sp>
+        <p:nvSpPr>
+          <p:cNvPr id="12" name="Rectangle 11"/>
+          <p:cNvSpPr/>
+          <p:nvPr/>
+        </p:nvSpPr>
+        <p:spPr>
+          <a:xfrm>
+            <a:off x="457199" y="0"/>
+            <a:ext cx="10839451" cy="628649"/>
+          </a:xfrm>
+          <a:prstGeom prst="rect">
+            <a:avLst/>
+          </a:prstGeom>
+          <a:gradFill flip="none" rotWithShape="1">
+            <a:gsLst>
+              <a:gs pos="52000">
+                <a:schemeClr val="accent1">
+                  <a:lumMod val="60000"/>
+                  <a:lumOff val="40000"/>
+                </a:schemeClr>
+              </a:gs>
+              <a:gs pos="100000">
+                <a:schemeClr val="tx2">
+                  <a:lumMod val="60000"/>
+                  <a:lumOff val="40000"/>
+                </a:schemeClr>
+              </a:gs>
+              <a:gs pos="0">
+                <a:schemeClr val="accent1"/>
+              </a:gs>
+            </a:gsLst>
+            <a:lin ang="10800000" scaled="1"/>
+            <a:tileRect/>
+          </a:gradFill>
+          <a:ln>
+            <a:noFill/>
+          </a:ln>
+        </p:spPr>
+        <p:style>
+          <a:lnRef idx="2">
+            <a:schemeClr val="accent1">
+              <a:shade val="50000"/>
+            </a:schemeClr>
+          </a:lnRef>
+          <a:fillRef idx="1">
+            <a:schemeClr val="accent1"/>
+          </a:fillRef>
+          <a:effectRef idx="0">
+            <a:schemeClr val="accent1"/>
+          </a:effectRef>
+          <a:fontRef idx="minor">
+            <a:schemeClr val="lt1"/>
+          </a:fontRef>
+        </p:style>
+        <p:txBody>
+          <a:bodyPr rtlCol="0" anchor="ctr"/>
+          <a:lstStyle/>
+          <a:p>
+            <a:pPr algn="ctr"/>
+            <a:endParaRPr lang="en-US" sz="3200"/>
+          </a:p>
+        </p:txBody>
+      </p:sp>
+      <p:pic>
+        <p:nvPicPr>
+          <p:cNvPr id="10" name="Picture 9"/>
+          <p:cNvPicPr>
+            <a:picLocks noChangeAspect="1"/>
+          </p:cNvPicPr>
+          <p:nvPr/>
+        </p:nvPicPr>
+        <p:blipFill>
+          <a:blip r:embed="rId2" cstate="print">
+            <a:extLst>
+              <a:ext uri="{28A0092B-C50C-407E-A947-70E740481C1C}">
+                <a14:useLocalDpi xmlns:a14="http://schemas.microsoft.com/office/drawing/2010/main" val="0"/>
+              </a:ext>
+            </a:extLst>
+          </a:blip>
+          <a:stretch>
+            <a:fillRect/>
+          </a:stretch>
+        </p:blipFill>
+        <p:spPr>
+          <a:xfrm>
+            <a:off x="11325199" y="116740"/>
+            <a:ext cx="866801" cy="731428"/>
+          </a:xfrm>
+          <a:prstGeom prst="rect">
+            <a:avLst/>
+          </a:prstGeom>
+        </p:spPr>
+      </p:pic>
+    </p:spTree>
+    <p:extLst>
+      <p:ext uri="{BB962C8B-B14F-4D97-AF65-F5344CB8AC3E}">
+        <p14:creationId xmlns:p14="http://schemas.microsoft.com/office/powerpoint/2010/main" val="1942445374"/>
+      </p:ext>
+    </p:extLst>
+  </p:cSld>
+  <p:clrMapOvr>
+    <a:masterClrMapping/>
+  </p:clrMapOvr>
+  <p:timing>
+    <p:tnLst>
+      <p:par>
+        <p:cTn id="1" dur="indefinite" restart="never" nodeType="tmRoot"/>
+      </p:par>
+    </p:tnLst>
+  </p:timing>
+</p:sld>
+</file>
+
+<file path=ppt/slides/slide13.xml><?xml version="1.0" encoding="utf-8"?>
+<p:sld xmlns:a="http://schemas.openxmlformats.org/drawingml/2006/main" xmlns:r="http://schemas.openxmlformats.org/officeDocument/2006/relationships" xmlns:p="http://schemas.openxmlformats.org/presentationml/2006/main">
+  <p:cSld>
+    <p:spTree>
+      <p:nvGrpSpPr>
+        <p:cNvPr id="1" name=""/>
+        <p:cNvGrpSpPr/>
+        <p:nvPr/>
+      </p:nvGrpSpPr>
+      <p:grpSpPr>
+        <a:xfrm>
+          <a:off x="0" y="0"/>
+          <a:ext cx="0" cy="0"/>
+          <a:chOff x="0" y="0"/>
+          <a:chExt cx="0" cy="0"/>
+        </a:xfrm>
+      </p:grpSpPr>
+      <p:sp>
+        <p:nvSpPr>
+          <p:cNvPr id="12" name="Rectangle 11"/>
+          <p:cNvSpPr/>
+          <p:nvPr/>
+        </p:nvSpPr>
+        <p:spPr>
+          <a:xfrm>
+            <a:off x="457199" y="0"/>
+            <a:ext cx="10839451" cy="628649"/>
+          </a:xfrm>
+          <a:prstGeom prst="rect">
+            <a:avLst/>
+          </a:prstGeom>
+          <a:gradFill flip="none" rotWithShape="1">
+            <a:gsLst>
+              <a:gs pos="52000">
+                <a:schemeClr val="accent1">
+                  <a:lumMod val="60000"/>
+                  <a:lumOff val="40000"/>
+                </a:schemeClr>
+              </a:gs>
+              <a:gs pos="100000">
+                <a:schemeClr val="tx2">
+                  <a:lumMod val="60000"/>
+                  <a:lumOff val="40000"/>
+                </a:schemeClr>
+              </a:gs>
+              <a:gs pos="0">
+                <a:schemeClr val="accent1"/>
+              </a:gs>
+            </a:gsLst>
+            <a:lin ang="10800000" scaled="1"/>
+            <a:tileRect/>
+          </a:gradFill>
+          <a:ln>
+            <a:noFill/>
+          </a:ln>
+        </p:spPr>
+        <p:style>
+          <a:lnRef idx="2">
+            <a:schemeClr val="accent1">
+              <a:shade val="50000"/>
+            </a:schemeClr>
+          </a:lnRef>
+          <a:fillRef idx="1">
+            <a:schemeClr val="accent1"/>
+          </a:fillRef>
+          <a:effectRef idx="0">
+            <a:schemeClr val="accent1"/>
+          </a:effectRef>
+          <a:fontRef idx="minor">
+            <a:schemeClr val="lt1"/>
+          </a:fontRef>
+        </p:style>
+        <p:txBody>
+          <a:bodyPr rtlCol="0" anchor="ctr"/>
+          <a:lstStyle/>
+          <a:p>
+            <a:pPr algn="ctr"/>
+            <a:endParaRPr lang="en-US" sz="3200"/>
+          </a:p>
+        </p:txBody>
+      </p:sp>
+      <p:pic>
+        <p:nvPicPr>
+          <p:cNvPr id="10" name="Picture 9"/>
+          <p:cNvPicPr>
+            <a:picLocks noChangeAspect="1"/>
+          </p:cNvPicPr>
+          <p:nvPr/>
+        </p:nvPicPr>
+        <p:blipFill>
+          <a:blip r:embed="rId2" cstate="print">
+            <a:extLst>
+              <a:ext uri="{28A0092B-C50C-407E-A947-70E740481C1C}">
+                <a14:useLocalDpi xmlns:a14="http://schemas.microsoft.com/office/drawing/2010/main" val="0"/>
+              </a:ext>
+            </a:extLst>
+          </a:blip>
+          <a:stretch>
+            <a:fillRect/>
+          </a:stretch>
+        </p:blipFill>
+        <p:spPr>
+          <a:xfrm>
+            <a:off x="11325199" y="116740"/>
+            <a:ext cx="866801" cy="731428"/>
+          </a:xfrm>
+          <a:prstGeom prst="rect">
+            <a:avLst/>
+          </a:prstGeom>
+        </p:spPr>
+      </p:pic>
+    </p:spTree>
+    <p:extLst>
+      <p:ext uri="{BB962C8B-B14F-4D97-AF65-F5344CB8AC3E}">
+        <p14:creationId xmlns:p14="http://schemas.microsoft.com/office/powerpoint/2010/main" val="1380505184"/>
       </p:ext>
     </p:extLst>
   </p:cSld>
@@ -4263,6 +4900,138 @@
   <p:clrMapOvr>
     <a:masterClrMapping/>
   </p:clrMapOvr>
+  <mc:AlternateContent xmlns:mc="http://schemas.openxmlformats.org/markup-compatibility/2006">
+    <mc:Choice xmlns:p14="http://schemas.microsoft.com/office/powerpoint/2010/main" Requires="p14">
+      <p:transition p14:dur="10"/>
+    </mc:Choice>
+    <mc:Fallback>
+      <p:transition/>
+    </mc:Fallback>
+  </mc:AlternateContent>
+  <p:timing>
+    <p:tnLst>
+      <p:par>
+        <p:cTn id="1" dur="indefinite" restart="never" nodeType="tmRoot">
+          <p:childTnLst>
+            <p:seq concurrent="1" nextAc="seek">
+              <p:cTn id="2" dur="indefinite" nodeType="mainSeq">
+                <p:childTnLst>
+                  <p:par>
+                    <p:cTn id="3" fill="hold">
+                      <p:stCondLst>
+                        <p:cond delay="indefinite"/>
+                      </p:stCondLst>
+                      <p:childTnLst>
+                        <p:par>
+                          <p:cTn id="4" fill="hold">
+                            <p:stCondLst>
+                              <p:cond delay="0"/>
+                            </p:stCondLst>
+                            <p:childTnLst>
+                              <p:par>
+                                <p:cTn id="5" presetID="1" presetClass="entr" presetSubtype="0" fill="hold" grpId="0" nodeType="clickEffect">
+                                  <p:stCondLst>
+                                    <p:cond delay="0"/>
+                                  </p:stCondLst>
+                                  <p:childTnLst>
+                                    <p:set>
+                                      <p:cBhvr>
+                                        <p:cTn id="6" dur="1" fill="hold">
+                                          <p:stCondLst>
+                                            <p:cond delay="0"/>
+                                          </p:stCondLst>
+                                        </p:cTn>
+                                        <p:tgtEl>
+                                          <p:spTgt spid="8"/>
+                                        </p:tgtEl>
+                                        <p:attrNameLst>
+                                          <p:attrName>style.visibility</p:attrName>
+                                        </p:attrNameLst>
+                                      </p:cBhvr>
+                                      <p:to>
+                                        <p:strVal val="visible"/>
+                                      </p:to>
+                                    </p:set>
+                                  </p:childTnLst>
+                                </p:cTn>
+                              </p:par>
+                            </p:childTnLst>
+                          </p:cTn>
+                        </p:par>
+                      </p:childTnLst>
+                    </p:cTn>
+                  </p:par>
+                  <p:par>
+                    <p:cTn id="7" fill="hold">
+                      <p:stCondLst>
+                        <p:cond delay="indefinite"/>
+                      </p:stCondLst>
+                      <p:childTnLst>
+                        <p:par>
+                          <p:cTn id="8" fill="hold">
+                            <p:stCondLst>
+                              <p:cond delay="0"/>
+                            </p:stCondLst>
+                            <p:childTnLst>
+                              <p:par>
+                                <p:cTn id="9" presetID="1" presetClass="entr" presetSubtype="0" fill="hold" grpId="0" nodeType="clickEffect">
+                                  <p:stCondLst>
+                                    <p:cond delay="0"/>
+                                  </p:stCondLst>
+                                  <p:childTnLst>
+                                    <p:set>
+                                      <p:cBhvr>
+                                        <p:cTn id="10" dur="1" fill="hold">
+                                          <p:stCondLst>
+                                            <p:cond delay="0"/>
+                                          </p:stCondLst>
+                                        </p:cTn>
+                                        <p:tgtEl>
+                                          <p:spTgt spid="9"/>
+                                        </p:tgtEl>
+                                        <p:attrNameLst>
+                                          <p:attrName>style.visibility</p:attrName>
+                                        </p:attrNameLst>
+                                      </p:cBhvr>
+                                      <p:to>
+                                        <p:strVal val="visible"/>
+                                      </p:to>
+                                    </p:set>
+                                  </p:childTnLst>
+                                </p:cTn>
+                              </p:par>
+                            </p:childTnLst>
+                          </p:cTn>
+                        </p:par>
+                      </p:childTnLst>
+                    </p:cTn>
+                  </p:par>
+                </p:childTnLst>
+              </p:cTn>
+              <p:prevCondLst>
+                <p:cond evt="onPrev" delay="0">
+                  <p:tgtEl>
+                    <p:sldTgt/>
+                  </p:tgtEl>
+                </p:cond>
+              </p:prevCondLst>
+              <p:nextCondLst>
+                <p:cond evt="onNext" delay="0">
+                  <p:tgtEl>
+                    <p:sldTgt/>
+                  </p:tgtEl>
+                </p:cond>
+              </p:nextCondLst>
+            </p:seq>
+          </p:childTnLst>
+        </p:cTn>
+      </p:par>
+    </p:tnLst>
+    <p:bldLst>
+      <p:bldP spid="8" grpId="0" animBg="1"/>
+      <p:bldP spid="9" grpId="0"/>
+    </p:bldLst>
+  </p:timing>
 </p:sld>
 </file>
 
@@ -4355,8 +5124,8 @@
         </p:nvSpPr>
         <p:spPr>
           <a:xfrm>
-            <a:off x="3995736" y="21936"/>
-            <a:ext cx="3762375" cy="584775"/>
+            <a:off x="3079157" y="28236"/>
+            <a:ext cx="5595531" cy="584775"/>
           </a:xfrm>
           <a:prstGeom prst="rect">
             <a:avLst/>
@@ -4372,7 +5141,7 @@
             <a:pPr algn="ctr"/>
             <a:r>
               <a:rPr lang="en-US" sz="3200" dirty="0" smtClean="0"/>
-              <a:t>Recon</a:t>
+              <a:t>Understanding the service</a:t>
             </a:r>
             <a:endParaRPr lang="en-US" sz="3200" dirty="0"/>
           </a:p>
@@ -4416,7 +5185,7 @@
         </p:nvSpPr>
         <p:spPr>
           <a:xfrm>
-            <a:off x="2162576" y="4419598"/>
+            <a:off x="2273421" y="4572490"/>
             <a:ext cx="7428691" cy="1631216"/>
           </a:xfrm>
           <a:prstGeom prst="rect">
@@ -4490,7 +5259,7 @@
         </p:blipFill>
         <p:spPr>
           <a:xfrm>
-            <a:off x="1990316" y="1114425"/>
+            <a:off x="2101161" y="1335039"/>
             <a:ext cx="7600951" cy="2683952"/>
           </a:xfrm>
           <a:prstGeom prst="rect">
@@ -4498,6 +5267,37 @@
           </a:prstGeom>
         </p:spPr>
       </p:pic>
+      <p:sp>
+        <p:nvSpPr>
+          <p:cNvPr id="4" name="TextBox 3"/>
+          <p:cNvSpPr txBox="1"/>
+          <p:nvPr/>
+        </p:nvSpPr>
+        <p:spPr>
+          <a:xfrm>
+            <a:off x="4497085" y="848168"/>
+            <a:ext cx="2759674" cy="369332"/>
+          </a:xfrm>
+          <a:prstGeom prst="rect">
+            <a:avLst/>
+          </a:prstGeom>
+          <a:noFill/>
+        </p:spPr>
+        <p:txBody>
+          <a:bodyPr wrap="square" rtlCol="0">
+            <a:spAutoFit/>
+          </a:bodyPr>
+          <a:lstStyle/>
+          <a:p>
+            <a:pPr algn="ctr"/>
+            <a:r>
+              <a:rPr lang="en-US" dirty="0" smtClean="0"/>
+              <a:t>[DEMO SERVICE]</a:t>
+            </a:r>
+            <a:endParaRPr lang="en-US" dirty="0"/>
+          </a:p>
+        </p:txBody>
+      </p:sp>
     </p:spTree>
     <p:extLst>
       <p:ext uri="{BB962C8B-B14F-4D97-AF65-F5344CB8AC3E}">
@@ -4508,6 +5308,157 @@
   <p:clrMapOvr>
     <a:masterClrMapping/>
   </p:clrMapOvr>
+  <p:timing>
+    <p:tnLst>
+      <p:par>
+        <p:cTn id="1" dur="indefinite" restart="never" nodeType="tmRoot">
+          <p:childTnLst>
+            <p:seq concurrent="1" nextAc="seek">
+              <p:cTn id="2" dur="indefinite" nodeType="mainSeq">
+                <p:childTnLst>
+                  <p:par>
+                    <p:cTn id="3" fill="hold">
+                      <p:stCondLst>
+                        <p:cond delay="indefinite"/>
+                      </p:stCondLst>
+                      <p:childTnLst>
+                        <p:par>
+                          <p:cTn id="4" fill="hold">
+                            <p:stCondLst>
+                              <p:cond delay="0"/>
+                            </p:stCondLst>
+                            <p:childTnLst>
+                              <p:par>
+                                <p:cTn id="5" presetID="1" presetClass="exit" presetSubtype="0" fill="hold" grpId="0" nodeType="clickEffect">
+                                  <p:stCondLst>
+                                    <p:cond delay="0"/>
+                                  </p:stCondLst>
+                                  <p:childTnLst>
+                                    <p:set>
+                                      <p:cBhvr>
+                                        <p:cTn id="6" dur="1" fill="hold">
+                                          <p:stCondLst>
+                                            <p:cond delay="0"/>
+                                          </p:stCondLst>
+                                        </p:cTn>
+                                        <p:tgtEl>
+                                          <p:spTgt spid="4"/>
+                                        </p:tgtEl>
+                                        <p:attrNameLst>
+                                          <p:attrName>style.visibility</p:attrName>
+                                        </p:attrNameLst>
+                                      </p:cBhvr>
+                                      <p:to>
+                                        <p:strVal val="hidden"/>
+                                      </p:to>
+                                    </p:set>
+                                  </p:childTnLst>
+                                </p:cTn>
+                              </p:par>
+                            </p:childTnLst>
+                          </p:cTn>
+                        </p:par>
+                        <p:par>
+                          <p:cTn id="7" fill="hold">
+                            <p:stCondLst>
+                              <p:cond delay="0"/>
+                            </p:stCondLst>
+                            <p:childTnLst>
+                              <p:par>
+                                <p:cTn id="8" presetID="1" presetClass="entr" presetSubtype="0" fill="hold" grpId="0" nodeType="afterEffect">
+                                  <p:stCondLst>
+                                    <p:cond delay="0"/>
+                                  </p:stCondLst>
+                                  <p:childTnLst>
+                                    <p:set>
+                                      <p:cBhvr>
+                                        <p:cTn id="9" dur="1" fill="hold">
+                                          <p:stCondLst>
+                                            <p:cond delay="0"/>
+                                          </p:stCondLst>
+                                        </p:cTn>
+                                        <p:tgtEl>
+                                          <p:spTgt spid="14"/>
+                                        </p:tgtEl>
+                                        <p:attrNameLst>
+                                          <p:attrName>style.visibility</p:attrName>
+                                        </p:attrNameLst>
+                                      </p:cBhvr>
+                                      <p:to>
+                                        <p:strVal val="visible"/>
+                                      </p:to>
+                                    </p:set>
+                                  </p:childTnLst>
+                                </p:cTn>
+                              </p:par>
+                            </p:childTnLst>
+                          </p:cTn>
+                        </p:par>
+                        <p:par>
+                          <p:cTn id="10" fill="hold">
+                            <p:stCondLst>
+                              <p:cond delay="0"/>
+                            </p:stCondLst>
+                            <p:childTnLst>
+                              <p:par>
+                                <p:cTn id="11" presetID="1" presetClass="entr" presetSubtype="0" fill="hold" nodeType="afterEffect">
+                                  <p:stCondLst>
+                                    <p:cond delay="0"/>
+                                  </p:stCondLst>
+                                  <p:childTnLst>
+                                    <p:set>
+                                      <p:cBhvr>
+                                        <p:cTn id="12" dur="1" fill="hold">
+                                          <p:stCondLst>
+                                            <p:cond delay="0"/>
+                                          </p:stCondLst>
+                                        </p:cTn>
+                                        <p:tgtEl>
+                                          <p:spTgt spid="2"/>
+                                        </p:tgtEl>
+                                        <p:attrNameLst>
+                                          <p:attrName>style.visibility</p:attrName>
+                                        </p:attrNameLst>
+                                      </p:cBhvr>
+                                      <p:to>
+                                        <p:strVal val="visible"/>
+                                      </p:to>
+                                    </p:set>
+                                  </p:childTnLst>
+                                </p:cTn>
+                              </p:par>
+                            </p:childTnLst>
+                          </p:cTn>
+                        </p:par>
+                      </p:childTnLst>
+                    </p:cTn>
+                  </p:par>
+                </p:childTnLst>
+              </p:cTn>
+              <p:prevCondLst>
+                <p:cond evt="onPrev" delay="0">
+                  <p:tgtEl>
+                    <p:sldTgt/>
+                  </p:tgtEl>
+                </p:cond>
+              </p:prevCondLst>
+              <p:nextCondLst>
+                <p:cond evt="onNext" delay="0">
+                  <p:tgtEl>
+                    <p:sldTgt/>
+                  </p:tgtEl>
+                </p:cond>
+              </p:nextCondLst>
+            </p:seq>
+          </p:childTnLst>
+        </p:cTn>
+      </p:par>
+    </p:tnLst>
+    <p:bldLst>
+      <p:bldP spid="14" grpId="0"/>
+      <p:bldP spid="4" grpId="0"/>
+    </p:bldLst>
+  </p:timing>
 </p:sld>
 </file>
 
@@ -4661,7 +5612,7 @@
         </p:nvSpPr>
         <p:spPr>
           <a:xfrm>
-            <a:off x="2457450" y="1119097"/>
+            <a:off x="2900361" y="1490572"/>
             <a:ext cx="5953125" cy="1200329"/>
           </a:xfrm>
           <a:prstGeom prst="rect">
@@ -4720,7 +5671,7 @@
           </p:cNvPicPr>
           <p:nvPr/>
         </p:nvPicPr>
-        <p:blipFill>
+        <p:blipFill rotWithShape="1">
           <a:blip r:embed="rId3">
             <a:extLst>
               <a:ext uri="{28A0092B-C50C-407E-A947-70E740481C1C}">
@@ -4728,14 +5679,13 @@
               </a:ext>
             </a:extLst>
           </a:blip>
-          <a:stretch>
-            <a:fillRect/>
-          </a:stretch>
+          <a:srcRect l="2130" t="15729" r="5481" b="26954"/>
+          <a:stretch/>
         </p:blipFill>
         <p:spPr>
           <a:xfrm>
-            <a:off x="2457450" y="2809874"/>
-            <a:ext cx="6257924" cy="3572863"/>
+            <a:off x="2363539" y="3295650"/>
+            <a:ext cx="7422057" cy="2628900"/>
           </a:xfrm>
           <a:prstGeom prst="rect">
             <a:avLst/>
@@ -4752,6 +5702,129 @@
   <p:clrMapOvr>
     <a:masterClrMapping/>
   </p:clrMapOvr>
+  <p:timing>
+    <p:tnLst>
+      <p:par>
+        <p:cTn id="1" dur="indefinite" restart="never" nodeType="tmRoot">
+          <p:childTnLst>
+            <p:seq concurrent="1" nextAc="seek">
+              <p:cTn id="2" dur="indefinite" nodeType="mainSeq">
+                <p:childTnLst>
+                  <p:par>
+                    <p:cTn id="3" fill="hold">
+                      <p:stCondLst>
+                        <p:cond delay="indefinite"/>
+                      </p:stCondLst>
+                      <p:childTnLst>
+                        <p:par>
+                          <p:cTn id="4" fill="hold">
+                            <p:stCondLst>
+                              <p:cond delay="0"/>
+                            </p:stCondLst>
+                            <p:childTnLst>
+                              <p:par>
+                                <p:cTn id="5" presetID="1" presetClass="entr" presetSubtype="0" fill="hold" grpId="0" nodeType="clickEffect">
+                                  <p:stCondLst>
+                                    <p:cond delay="0"/>
+                                  </p:stCondLst>
+                                  <p:childTnLst>
+                                    <p:set>
+                                      <p:cBhvr>
+                                        <p:cTn id="6" dur="1" fill="hold">
+                                          <p:stCondLst>
+                                            <p:cond delay="0"/>
+                                          </p:stCondLst>
+                                        </p:cTn>
+                                        <p:tgtEl>
+                                          <p:spTgt spid="2"/>
+                                        </p:tgtEl>
+                                        <p:attrNameLst>
+                                          <p:attrName>style.visibility</p:attrName>
+                                        </p:attrNameLst>
+                                      </p:cBhvr>
+                                      <p:to>
+                                        <p:strVal val="visible"/>
+                                      </p:to>
+                                    </p:set>
+                                  </p:childTnLst>
+                                </p:cTn>
+                              </p:par>
+                            </p:childTnLst>
+                          </p:cTn>
+                        </p:par>
+                      </p:childTnLst>
+                    </p:cTn>
+                  </p:par>
+                  <p:par>
+                    <p:cTn id="7" fill="hold">
+                      <p:stCondLst>
+                        <p:cond delay="indefinite"/>
+                      </p:stCondLst>
+                      <p:childTnLst>
+                        <p:par>
+                          <p:cTn id="8" fill="hold">
+                            <p:stCondLst>
+                              <p:cond delay="0"/>
+                            </p:stCondLst>
+                            <p:childTnLst>
+                              <p:par>
+                                <p:cTn id="9" presetID="1" presetClass="entr" presetSubtype="0" fill="hold" nodeType="clickEffect">
+                                  <p:stCondLst>
+                                    <p:cond delay="0"/>
+                                  </p:stCondLst>
+                                  <p:childTnLst>
+                                    <p:set>
+                                      <p:cBhvr>
+                                        <p:cTn id="10" dur="1" fill="hold">
+                                          <p:stCondLst>
+                                            <p:cond delay="0"/>
+                                          </p:stCondLst>
+                                        </p:cTn>
+                                        <p:tgtEl>
+                                          <p:spTgt spid="6"/>
+                                        </p:tgtEl>
+                                        <p:attrNameLst>
+                                          <p:attrName>style.visibility</p:attrName>
+                                        </p:attrNameLst>
+                                      </p:cBhvr>
+                                      <p:to>
+                                        <p:strVal val="visible"/>
+                                      </p:to>
+                                    </p:set>
+                                  </p:childTnLst>
+                                </p:cTn>
+                              </p:par>
+                            </p:childTnLst>
+                          </p:cTn>
+                        </p:par>
+                      </p:childTnLst>
+                    </p:cTn>
+                  </p:par>
+                </p:childTnLst>
+              </p:cTn>
+              <p:prevCondLst>
+                <p:cond evt="onPrev" delay="0">
+                  <p:tgtEl>
+                    <p:sldTgt/>
+                  </p:tgtEl>
+                </p:cond>
+              </p:prevCondLst>
+              <p:nextCondLst>
+                <p:cond evt="onNext" delay="0">
+                  <p:tgtEl>
+                    <p:sldTgt/>
+                  </p:tgtEl>
+                </p:cond>
+              </p:nextCondLst>
+            </p:seq>
+          </p:childTnLst>
+        </p:cTn>
+      </p:par>
+    </p:tnLst>
+    <p:bldLst>
+      <p:bldP spid="2" grpId="0"/>
+    </p:bldLst>
+  </p:timing>
 </p:sld>
 </file>
 
@@ -4866,6 +5939,190 @@
           </a:prstGeom>
         </p:spPr>
       </p:pic>
+      <p:sp>
+        <p:nvSpPr>
+          <p:cNvPr id="4" name="TextBox 3"/>
+          <p:cNvSpPr txBox="1"/>
+          <p:nvPr/>
+        </p:nvSpPr>
+        <p:spPr>
+          <a:xfrm>
+            <a:off x="1443036" y="0"/>
+            <a:ext cx="9072564" cy="584775"/>
+          </a:xfrm>
+          <a:prstGeom prst="rect">
+            <a:avLst/>
+          </a:prstGeom>
+          <a:noFill/>
+        </p:spPr>
+        <p:txBody>
+          <a:bodyPr wrap="square" rtlCol="0">
+            <a:spAutoFit/>
+          </a:bodyPr>
+          <a:lstStyle/>
+          <a:p>
+            <a:pPr algn="ctr"/>
+            <a:r>
+              <a:rPr lang="en-US" sz="3200" dirty="0" smtClean="0"/>
+              <a:t>More like a buffer overflow…</a:t>
+            </a:r>
+            <a:endParaRPr lang="en-US" sz="3200" dirty="0"/>
+          </a:p>
+        </p:txBody>
+      </p:sp>
+      <p:sp>
+        <p:nvSpPr>
+          <p:cNvPr id="5" name="TextBox 4"/>
+          <p:cNvSpPr txBox="1"/>
+          <p:nvPr/>
+        </p:nvSpPr>
+        <p:spPr>
+          <a:xfrm>
+            <a:off x="2466974" y="1109572"/>
+            <a:ext cx="6819900" cy="646331"/>
+          </a:xfrm>
+          <a:prstGeom prst="rect">
+            <a:avLst/>
+          </a:prstGeom>
+          <a:noFill/>
+        </p:spPr>
+        <p:txBody>
+          <a:bodyPr wrap="square" rtlCol="0">
+            <a:spAutoFit/>
+          </a:bodyPr>
+          <a:lstStyle/>
+          <a:p>
+            <a:pPr marL="285750" indent="-285750">
+              <a:buFont typeface="Arial" panose="020B0604020202020204" pitchFamily="34" charset="0"/>
+              <a:buChar char="•"/>
+            </a:pPr>
+            <a:r>
+              <a:rPr lang="en-US" dirty="0" smtClean="0"/>
+              <a:t>We can easily test by sending a formatting string which would leak the stack if there was an vulnerable </a:t>
+            </a:r>
+            <a:r>
+              <a:rPr lang="en-US" i="1" dirty="0" err="1" smtClean="0"/>
+              <a:t>printf</a:t>
+            </a:r>
+            <a:r>
+              <a:rPr lang="en-US" dirty="0" smtClean="0"/>
+              <a:t> call</a:t>
+            </a:r>
+            <a:endParaRPr lang="en-US" dirty="0"/>
+          </a:p>
+        </p:txBody>
+      </p:sp>
+      <p:pic>
+        <p:nvPicPr>
+          <p:cNvPr id="2" name="Picture 1"/>
+          <p:cNvPicPr>
+            <a:picLocks noChangeAspect="1"/>
+          </p:cNvPicPr>
+          <p:nvPr/>
+        </p:nvPicPr>
+        <p:blipFill>
+          <a:blip r:embed="rId3">
+            <a:extLst>
+              <a:ext uri="{28A0092B-C50C-407E-A947-70E740481C1C}">
+                <a14:useLocalDpi xmlns:a14="http://schemas.microsoft.com/office/drawing/2010/main" val="0"/>
+              </a:ext>
+            </a:extLst>
+          </a:blip>
+          <a:stretch>
+            <a:fillRect/>
+          </a:stretch>
+        </p:blipFill>
+        <p:spPr>
+          <a:xfrm>
+            <a:off x="1489436" y="2215245"/>
+            <a:ext cx="8979764" cy="2611399"/>
+          </a:xfrm>
+          <a:prstGeom prst="rect">
+            <a:avLst/>
+          </a:prstGeom>
+        </p:spPr>
+      </p:pic>
+      <p:sp>
+        <p:nvSpPr>
+          <p:cNvPr id="7" name="TextBox 6"/>
+          <p:cNvSpPr txBox="1"/>
+          <p:nvPr/>
+        </p:nvSpPr>
+        <p:spPr>
+          <a:xfrm>
+            <a:off x="2714624" y="5567272"/>
+            <a:ext cx="8048626" cy="461665"/>
+          </a:xfrm>
+          <a:prstGeom prst="rect">
+            <a:avLst/>
+          </a:prstGeom>
+          <a:noFill/>
+        </p:spPr>
+        <p:txBody>
+          <a:bodyPr wrap="square" rtlCol="0">
+            <a:spAutoFit/>
+          </a:bodyPr>
+          <a:lstStyle/>
+          <a:p>
+            <a:r>
+              <a:rPr lang="en-US" sz="2400" i="1" dirty="0" smtClean="0"/>
+              <a:t>Not a format string attack! Let’s check the overflow…</a:t>
+            </a:r>
+            <a:endParaRPr lang="en-US" sz="2400" i="1" dirty="0"/>
+          </a:p>
+        </p:txBody>
+      </p:sp>
+      <p:sp>
+        <p:nvSpPr>
+          <p:cNvPr id="3" name="Right Arrow 2"/>
+          <p:cNvSpPr/>
+          <p:nvPr/>
+        </p:nvSpPr>
+        <p:spPr>
+          <a:xfrm>
+            <a:off x="1581149" y="5426629"/>
+            <a:ext cx="885825" cy="742950"/>
+          </a:xfrm>
+          <a:prstGeom prst="rightArrow">
+            <a:avLst/>
+          </a:prstGeom>
+          <a:solidFill>
+            <a:schemeClr val="tx2">
+              <a:lumMod val="20000"/>
+              <a:lumOff val="80000"/>
+            </a:schemeClr>
+          </a:solidFill>
+          <a:ln>
+            <a:solidFill>
+              <a:schemeClr val="accent2"/>
+            </a:solidFill>
+          </a:ln>
+        </p:spPr>
+        <p:style>
+          <a:lnRef idx="2">
+            <a:schemeClr val="accent1">
+              <a:shade val="50000"/>
+            </a:schemeClr>
+          </a:lnRef>
+          <a:fillRef idx="1">
+            <a:schemeClr val="accent1"/>
+          </a:fillRef>
+          <a:effectRef idx="0">
+            <a:schemeClr val="accent1"/>
+          </a:effectRef>
+          <a:fontRef idx="minor">
+            <a:schemeClr val="lt1"/>
+          </a:fontRef>
+        </p:style>
+        <p:txBody>
+          <a:bodyPr rtlCol="0" anchor="ctr"/>
+          <a:lstStyle/>
+          <a:p>
+            <a:pPr algn="ctr"/>
+            <a:endParaRPr lang="en-US"/>
+          </a:p>
+        </p:txBody>
+      </p:sp>
     </p:spTree>
     <p:extLst>
       <p:ext uri="{BB962C8B-B14F-4D97-AF65-F5344CB8AC3E}">
@@ -4876,6 +6133,185 @@
   <p:clrMapOvr>
     <a:masterClrMapping/>
   </p:clrMapOvr>
+  <p:timing>
+    <p:tnLst>
+      <p:par>
+        <p:cTn id="1" dur="indefinite" restart="never" nodeType="tmRoot">
+          <p:childTnLst>
+            <p:seq concurrent="1" nextAc="seek">
+              <p:cTn id="2" dur="indefinite" nodeType="mainSeq">
+                <p:childTnLst>
+                  <p:par>
+                    <p:cTn id="3" fill="hold">
+                      <p:stCondLst>
+                        <p:cond delay="indefinite"/>
+                      </p:stCondLst>
+                      <p:childTnLst>
+                        <p:par>
+                          <p:cTn id="4" fill="hold">
+                            <p:stCondLst>
+                              <p:cond delay="0"/>
+                            </p:stCondLst>
+                            <p:childTnLst>
+                              <p:par>
+                                <p:cTn id="5" presetID="1" presetClass="entr" presetSubtype="0" fill="hold" grpId="0" nodeType="clickEffect">
+                                  <p:stCondLst>
+                                    <p:cond delay="0"/>
+                                  </p:stCondLst>
+                                  <p:childTnLst>
+                                    <p:set>
+                                      <p:cBhvr>
+                                        <p:cTn id="6" dur="1" fill="hold">
+                                          <p:stCondLst>
+                                            <p:cond delay="0"/>
+                                          </p:stCondLst>
+                                        </p:cTn>
+                                        <p:tgtEl>
+                                          <p:spTgt spid="5"/>
+                                        </p:tgtEl>
+                                        <p:attrNameLst>
+                                          <p:attrName>style.visibility</p:attrName>
+                                        </p:attrNameLst>
+                                      </p:cBhvr>
+                                      <p:to>
+                                        <p:strVal val="visible"/>
+                                      </p:to>
+                                    </p:set>
+                                  </p:childTnLst>
+                                </p:cTn>
+                              </p:par>
+                            </p:childTnLst>
+                          </p:cTn>
+                        </p:par>
+                      </p:childTnLst>
+                    </p:cTn>
+                  </p:par>
+                  <p:par>
+                    <p:cTn id="7" fill="hold">
+                      <p:stCondLst>
+                        <p:cond delay="indefinite"/>
+                      </p:stCondLst>
+                      <p:childTnLst>
+                        <p:par>
+                          <p:cTn id="8" fill="hold">
+                            <p:stCondLst>
+                              <p:cond delay="0"/>
+                            </p:stCondLst>
+                            <p:childTnLst>
+                              <p:par>
+                                <p:cTn id="9" presetID="1" presetClass="entr" presetSubtype="0" fill="hold" nodeType="clickEffect">
+                                  <p:stCondLst>
+                                    <p:cond delay="0"/>
+                                  </p:stCondLst>
+                                  <p:childTnLst>
+                                    <p:set>
+                                      <p:cBhvr>
+                                        <p:cTn id="10" dur="1" fill="hold">
+                                          <p:stCondLst>
+                                            <p:cond delay="0"/>
+                                          </p:stCondLst>
+                                        </p:cTn>
+                                        <p:tgtEl>
+                                          <p:spTgt spid="2"/>
+                                        </p:tgtEl>
+                                        <p:attrNameLst>
+                                          <p:attrName>style.visibility</p:attrName>
+                                        </p:attrNameLst>
+                                      </p:cBhvr>
+                                      <p:to>
+                                        <p:strVal val="visible"/>
+                                      </p:to>
+                                    </p:set>
+                                  </p:childTnLst>
+                                </p:cTn>
+                              </p:par>
+                              <p:par>
+                                <p:cTn id="11" presetID="1" presetClass="entr" presetSubtype="0" fill="hold" grpId="0" nodeType="withEffect">
+                                  <p:stCondLst>
+                                    <p:cond delay="0"/>
+                                  </p:stCondLst>
+                                  <p:childTnLst>
+                                    <p:set>
+                                      <p:cBhvr>
+                                        <p:cTn id="12" dur="1" fill="hold">
+                                          <p:stCondLst>
+                                            <p:cond delay="0"/>
+                                          </p:stCondLst>
+                                        </p:cTn>
+                                        <p:tgtEl>
+                                          <p:spTgt spid="7"/>
+                                        </p:tgtEl>
+                                        <p:attrNameLst>
+                                          <p:attrName>style.visibility</p:attrName>
+                                        </p:attrNameLst>
+                                      </p:cBhvr>
+                                      <p:to>
+                                        <p:strVal val="visible"/>
+                                      </p:to>
+                                    </p:set>
+                                  </p:childTnLst>
+                                </p:cTn>
+                              </p:par>
+                              <p:par>
+                                <p:cTn id="13" presetID="1" presetClass="entr" presetSubtype="0" fill="hold" grpId="0" nodeType="withEffect">
+                                  <p:stCondLst>
+                                    <p:cond delay="0"/>
+                                  </p:stCondLst>
+                                  <p:childTnLst>
+                                    <p:set>
+                                      <p:cBhvr>
+                                        <p:cTn id="14" dur="1" fill="hold">
+                                          <p:stCondLst>
+                                            <p:cond delay="0"/>
+                                          </p:stCondLst>
+                                        </p:cTn>
+                                        <p:tgtEl>
+                                          <p:spTgt spid="3"/>
+                                        </p:tgtEl>
+                                        <p:attrNameLst>
+                                          <p:attrName>style.visibility</p:attrName>
+                                        </p:attrNameLst>
+                                      </p:cBhvr>
+                                      <p:to>
+                                        <p:strVal val="visible"/>
+                                      </p:to>
+                                    </p:set>
+                                  </p:childTnLst>
+                                </p:cTn>
+                              </p:par>
+                            </p:childTnLst>
+                          </p:cTn>
+                        </p:par>
+                      </p:childTnLst>
+                    </p:cTn>
+                  </p:par>
+                </p:childTnLst>
+              </p:cTn>
+              <p:prevCondLst>
+                <p:cond evt="onPrev" delay="0">
+                  <p:tgtEl>
+                    <p:sldTgt/>
+                  </p:tgtEl>
+                </p:cond>
+              </p:prevCondLst>
+              <p:nextCondLst>
+                <p:cond evt="onNext" delay="0">
+                  <p:tgtEl>
+                    <p:sldTgt/>
+                  </p:tgtEl>
+                </p:cond>
+              </p:nextCondLst>
+            </p:seq>
+          </p:childTnLst>
+        </p:cTn>
+      </p:par>
+    </p:tnLst>
+    <p:bldLst>
+      <p:bldP spid="5" grpId="0"/>
+      <p:bldP spid="7" grpId="0"/>
+      <p:bldP spid="3" grpId="0" animBg="1"/>
+    </p:bldLst>
+  </p:timing>
 </p:sld>
 </file>
 
@@ -4990,6 +6426,220 @@
           </a:prstGeom>
         </p:spPr>
       </p:pic>
+      <p:sp>
+        <p:nvSpPr>
+          <p:cNvPr id="4" name="TextBox 3"/>
+          <p:cNvSpPr txBox="1"/>
+          <p:nvPr/>
+        </p:nvSpPr>
+        <p:spPr>
+          <a:xfrm>
+            <a:off x="1443036" y="0"/>
+            <a:ext cx="9072564" cy="584775"/>
+          </a:xfrm>
+          <a:prstGeom prst="rect">
+            <a:avLst/>
+          </a:prstGeom>
+          <a:noFill/>
+        </p:spPr>
+        <p:txBody>
+          <a:bodyPr wrap="square" rtlCol="0">
+            <a:spAutoFit/>
+          </a:bodyPr>
+          <a:lstStyle/>
+          <a:p>
+            <a:pPr algn="ctr"/>
+            <a:r>
+              <a:rPr lang="en-US" sz="3200" dirty="0" smtClean="0"/>
+              <a:t>What’s a stack buffer overflow?</a:t>
+            </a:r>
+            <a:endParaRPr lang="en-US" sz="3200" dirty="0"/>
+          </a:p>
+        </p:txBody>
+      </p:sp>
+      <p:pic>
+        <p:nvPicPr>
+          <p:cNvPr id="2" name="Picture 1"/>
+          <p:cNvPicPr>
+            <a:picLocks noChangeAspect="1"/>
+          </p:cNvPicPr>
+          <p:nvPr/>
+        </p:nvPicPr>
+        <p:blipFill>
+          <a:blip r:embed="rId3">
+            <a:extLst>
+              <a:ext uri="{28A0092B-C50C-407E-A947-70E740481C1C}">
+                <a14:useLocalDpi xmlns:a14="http://schemas.microsoft.com/office/drawing/2010/main" val="0"/>
+              </a:ext>
+            </a:extLst>
+          </a:blip>
+          <a:stretch>
+            <a:fillRect/>
+          </a:stretch>
+        </p:blipFill>
+        <p:spPr>
+          <a:xfrm>
+            <a:off x="549679" y="1181100"/>
+            <a:ext cx="5470121" cy="5084662"/>
+          </a:xfrm>
+          <a:prstGeom prst="rect">
+            <a:avLst/>
+          </a:prstGeom>
+        </p:spPr>
+      </p:pic>
+      <p:sp>
+        <p:nvSpPr>
+          <p:cNvPr id="6" name="TextBox 5"/>
+          <p:cNvSpPr txBox="1"/>
+          <p:nvPr/>
+        </p:nvSpPr>
+        <p:spPr>
+          <a:xfrm>
+            <a:off x="6176963" y="1601955"/>
+            <a:ext cx="4676774" cy="646331"/>
+          </a:xfrm>
+          <a:prstGeom prst="rect">
+            <a:avLst/>
+          </a:prstGeom>
+          <a:noFill/>
+        </p:spPr>
+        <p:txBody>
+          <a:bodyPr wrap="square" rtlCol="0">
+            <a:spAutoFit/>
+          </a:bodyPr>
+          <a:lstStyle/>
+          <a:p>
+            <a:pPr marL="285750" indent="-285750">
+              <a:buFont typeface="Arial" panose="020B0604020202020204" pitchFamily="34" charset="0"/>
+              <a:buChar char="•"/>
+            </a:pPr>
+            <a:r>
+              <a:rPr lang="en-US" dirty="0" smtClean="0"/>
+              <a:t>Occurs when we do not check if the user input fits in the buffer it went in</a:t>
+            </a:r>
+            <a:endParaRPr lang="en-US" dirty="0"/>
+          </a:p>
+        </p:txBody>
+      </p:sp>
+      <p:sp>
+        <p:nvSpPr>
+          <p:cNvPr id="7" name="TextBox 6"/>
+          <p:cNvSpPr txBox="1"/>
+          <p:nvPr/>
+        </p:nvSpPr>
+        <p:spPr>
+          <a:xfrm>
+            <a:off x="6176963" y="2659926"/>
+            <a:ext cx="4878215" cy="646331"/>
+          </a:xfrm>
+          <a:prstGeom prst="rect">
+            <a:avLst/>
+          </a:prstGeom>
+          <a:noFill/>
+        </p:spPr>
+        <p:txBody>
+          <a:bodyPr wrap="square" rtlCol="0">
+            <a:spAutoFit/>
+          </a:bodyPr>
+          <a:lstStyle/>
+          <a:p>
+            <a:pPr marL="285750" indent="-285750">
+              <a:buFont typeface="Arial" panose="020B0604020202020204" pitchFamily="34" charset="0"/>
+              <a:buChar char="•"/>
+            </a:pPr>
+            <a:r>
+              <a:rPr lang="en-US" dirty="0" smtClean="0"/>
+              <a:t>If there is no protection such as </a:t>
+            </a:r>
+            <a:r>
+              <a:rPr lang="en-US" dirty="0" smtClean="0"/>
+              <a:t>canary, </a:t>
+            </a:r>
+            <a:r>
+              <a:rPr lang="en-US" dirty="0" smtClean="0"/>
+              <a:t>we can overwrite data behind the buffer</a:t>
+            </a:r>
+            <a:endParaRPr lang="en-US" dirty="0"/>
+          </a:p>
+        </p:txBody>
+      </p:sp>
+      <p:sp>
+        <p:nvSpPr>
+          <p:cNvPr id="8" name="TextBox 7"/>
+          <p:cNvSpPr txBox="1"/>
+          <p:nvPr/>
+        </p:nvSpPr>
+        <p:spPr>
+          <a:xfrm>
+            <a:off x="6176963" y="3717897"/>
+            <a:ext cx="4991100" cy="923330"/>
+          </a:xfrm>
+          <a:prstGeom prst="rect">
+            <a:avLst/>
+          </a:prstGeom>
+          <a:noFill/>
+        </p:spPr>
+        <p:txBody>
+          <a:bodyPr wrap="square" rtlCol="0">
+            <a:spAutoFit/>
+          </a:bodyPr>
+          <a:lstStyle/>
+          <a:p>
+            <a:pPr marL="285750" indent="-285750">
+              <a:buFont typeface="Arial" panose="020B0604020202020204" pitchFamily="34" charset="0"/>
+              <a:buChar char="•"/>
+            </a:pPr>
+            <a:r>
+              <a:rPr lang="en-US" dirty="0" smtClean="0"/>
+              <a:t>It means that we can take control of execution flow because the return address we jump on is located on the stack</a:t>
+            </a:r>
+            <a:endParaRPr lang="en-US" dirty="0"/>
+          </a:p>
+        </p:txBody>
+      </p:sp>
+      <p:sp>
+        <p:nvSpPr>
+          <p:cNvPr id="9" name="TextBox 8"/>
+          <p:cNvSpPr txBox="1"/>
+          <p:nvPr/>
+        </p:nvSpPr>
+        <p:spPr>
+          <a:xfrm>
+            <a:off x="6249237" y="5186763"/>
+            <a:ext cx="4532226" cy="461665"/>
+          </a:xfrm>
+          <a:prstGeom prst="rect">
+            <a:avLst/>
+          </a:prstGeom>
+          <a:noFill/>
+          <a:ln>
+            <a:solidFill>
+              <a:schemeClr val="tx1"/>
+            </a:solidFill>
+          </a:ln>
+        </p:spPr>
+        <p:txBody>
+          <a:bodyPr wrap="square" rtlCol="0">
+            <a:spAutoFit/>
+          </a:bodyPr>
+          <a:lstStyle/>
+          <a:p>
+            <a:r>
+              <a:rPr lang="en-US" sz="2400" dirty="0" smtClean="0"/>
+              <a:t>RET </a:t>
+            </a:r>
+            <a:r>
+              <a:rPr lang="en-US" sz="2400" dirty="0" smtClean="0"/>
+              <a:t>is equivalent to </a:t>
+            </a:r>
+            <a:r>
+              <a:rPr lang="en-US" sz="2400" dirty="0" smtClean="0"/>
+              <a:t>POP RIP</a:t>
+            </a:r>
+            <a:endParaRPr lang="en-US" sz="2400" dirty="0"/>
+          </a:p>
+        </p:txBody>
+      </p:sp>
     </p:spTree>
     <p:extLst>
       <p:ext uri="{BB962C8B-B14F-4D97-AF65-F5344CB8AC3E}">
@@ -5000,6 +6650,13 @@
   <p:clrMapOvr>
     <a:masterClrMapping/>
   </p:clrMapOvr>
+  <p:timing>
+    <p:tnLst>
+      <p:par>
+        <p:cTn id="1" dur="indefinite" restart="never" nodeType="tmRoot"/>
+      </p:par>
+    </p:tnLst>
+  </p:timing>
 </p:sld>
 </file>
 
@@ -5114,6 +6771,234 @@
           </a:prstGeom>
         </p:spPr>
       </p:pic>
+      <p:sp>
+        <p:nvSpPr>
+          <p:cNvPr id="5" name="TextBox 4"/>
+          <p:cNvSpPr txBox="1"/>
+          <p:nvPr/>
+        </p:nvSpPr>
+        <p:spPr>
+          <a:xfrm>
+            <a:off x="1340642" y="0"/>
+            <a:ext cx="9072564" cy="584775"/>
+          </a:xfrm>
+          <a:prstGeom prst="rect">
+            <a:avLst/>
+          </a:prstGeom>
+          <a:noFill/>
+        </p:spPr>
+        <p:txBody>
+          <a:bodyPr wrap="square" rtlCol="0">
+            <a:spAutoFit/>
+          </a:bodyPr>
+          <a:lstStyle/>
+          <a:p>
+            <a:pPr algn="ctr"/>
+            <a:r>
+              <a:rPr lang="en-US" sz="3200" dirty="0" smtClean="0"/>
+              <a:t>Recon</a:t>
+            </a:r>
+            <a:endParaRPr lang="en-US" sz="3200" dirty="0"/>
+          </a:p>
+        </p:txBody>
+      </p:sp>
+      <p:sp>
+        <p:nvSpPr>
+          <p:cNvPr id="6" name="TextBox 5"/>
+          <p:cNvSpPr txBox="1"/>
+          <p:nvPr/>
+        </p:nvSpPr>
+        <p:spPr>
+          <a:xfrm>
+            <a:off x="2894345" y="943825"/>
+            <a:ext cx="6748463" cy="1477328"/>
+          </a:xfrm>
+          <a:prstGeom prst="rect">
+            <a:avLst/>
+          </a:prstGeom>
+          <a:noFill/>
+        </p:spPr>
+        <p:txBody>
+          <a:bodyPr wrap="square" rtlCol="0">
+            <a:spAutoFit/>
+          </a:bodyPr>
+          <a:lstStyle/>
+          <a:p>
+            <a:pPr marL="285750" indent="-285750">
+              <a:buFont typeface="Arial" panose="020B0604020202020204" pitchFamily="34" charset="0"/>
+              <a:buChar char="•"/>
+            </a:pPr>
+            <a:r>
+              <a:rPr lang="en-US" dirty="0" smtClean="0"/>
+              <a:t>Increment input size until program crashes</a:t>
+            </a:r>
+          </a:p>
+          <a:p>
+            <a:pPr marL="285750" indent="-285750">
+              <a:buFont typeface="Arial" panose="020B0604020202020204" pitchFamily="34" charset="0"/>
+              <a:buChar char="•"/>
+            </a:pPr>
+            <a:endParaRPr lang="en-US" dirty="0"/>
+          </a:p>
+          <a:p>
+            <a:pPr marL="285750" indent="-285750">
+              <a:buFont typeface="Arial" panose="020B0604020202020204" pitchFamily="34" charset="0"/>
+              <a:buChar char="•"/>
+            </a:pPr>
+            <a:r>
+              <a:rPr lang="en-US" dirty="0"/>
+              <a:t>C</a:t>
+            </a:r>
+            <a:r>
+              <a:rPr lang="en-US" dirty="0" smtClean="0"/>
+              <a:t>heck the protections:</a:t>
+            </a:r>
+          </a:p>
+          <a:p>
+            <a:pPr marL="742950" lvl="1" indent="-285750">
+              <a:buFont typeface="Arial" panose="020B0604020202020204" pitchFamily="34" charset="0"/>
+              <a:buChar char="•"/>
+            </a:pPr>
+            <a:r>
+              <a:rPr lang="en-US" dirty="0" smtClean="0"/>
+              <a:t>on the binary (PIE, canary) </a:t>
+            </a:r>
+            <a:endParaRPr lang="en-US" dirty="0"/>
+          </a:p>
+          <a:p>
+            <a:pPr marL="742950" lvl="1" indent="-285750">
+              <a:buFont typeface="Arial" panose="020B0604020202020204" pitchFamily="34" charset="0"/>
+              <a:buChar char="•"/>
+            </a:pPr>
+            <a:r>
+              <a:rPr lang="en-US" dirty="0"/>
+              <a:t>o</a:t>
+            </a:r>
+            <a:r>
+              <a:rPr lang="en-US" dirty="0" smtClean="0"/>
+              <a:t>n the server (ASLR)</a:t>
+            </a:r>
+            <a:endParaRPr lang="en-US" dirty="0"/>
+          </a:p>
+        </p:txBody>
+      </p:sp>
+      <p:pic>
+        <p:nvPicPr>
+          <p:cNvPr id="2" name="Picture 1"/>
+          <p:cNvPicPr>
+            <a:picLocks noChangeAspect="1"/>
+          </p:cNvPicPr>
+          <p:nvPr/>
+        </p:nvPicPr>
+        <p:blipFill>
+          <a:blip r:embed="rId3">
+            <a:extLst>
+              <a:ext uri="{28A0092B-C50C-407E-A947-70E740481C1C}">
+                <a14:useLocalDpi xmlns:a14="http://schemas.microsoft.com/office/drawing/2010/main" val="0"/>
+              </a:ext>
+            </a:extLst>
+          </a:blip>
+          <a:stretch>
+            <a:fillRect/>
+          </a:stretch>
+        </p:blipFill>
+        <p:spPr>
+          <a:xfrm>
+            <a:off x="2282487" y="2672962"/>
+            <a:ext cx="7360321" cy="2566988"/>
+          </a:xfrm>
+          <a:prstGeom prst="rect">
+            <a:avLst/>
+          </a:prstGeom>
+        </p:spPr>
+      </p:pic>
+      <p:sp>
+        <p:nvSpPr>
+          <p:cNvPr id="8" name="TextBox 7"/>
+          <p:cNvSpPr txBox="1"/>
+          <p:nvPr/>
+        </p:nvSpPr>
+        <p:spPr>
+          <a:xfrm>
+            <a:off x="3731388" y="5555126"/>
+            <a:ext cx="5438802" cy="830997"/>
+          </a:xfrm>
+          <a:prstGeom prst="rect">
+            <a:avLst/>
+          </a:prstGeom>
+          <a:noFill/>
+        </p:spPr>
+        <p:txBody>
+          <a:bodyPr wrap="square" rtlCol="0">
+            <a:spAutoFit/>
+          </a:bodyPr>
+          <a:lstStyle/>
+          <a:p>
+            <a:r>
+              <a:rPr lang="en-US" sz="2400" dirty="0" smtClean="0"/>
+              <a:t>Program crashes after 40 bytes</a:t>
+            </a:r>
+          </a:p>
+          <a:p>
+            <a:r>
+              <a:rPr lang="en-US" sz="2400" dirty="0" smtClean="0"/>
+              <a:t>= (probably stack) buffer overflow</a:t>
+            </a:r>
+            <a:endParaRPr lang="en-US" sz="2400" dirty="0"/>
+          </a:p>
+        </p:txBody>
+      </p:sp>
+      <p:sp>
+        <p:nvSpPr>
+          <p:cNvPr id="9" name="Right Arrow 8"/>
+          <p:cNvSpPr/>
+          <p:nvPr/>
+        </p:nvSpPr>
+        <p:spPr>
+          <a:xfrm>
+            <a:off x="2368212" y="5648055"/>
+            <a:ext cx="885825" cy="645141"/>
+          </a:xfrm>
+          <a:prstGeom prst="rightArrow">
+            <a:avLst/>
+          </a:prstGeom>
+          <a:solidFill>
+            <a:schemeClr val="tx2">
+              <a:lumMod val="20000"/>
+              <a:lumOff val="80000"/>
+            </a:schemeClr>
+          </a:solidFill>
+          <a:ln>
+            <a:solidFill>
+              <a:schemeClr val="accent2"/>
+            </a:solidFill>
+          </a:ln>
+        </p:spPr>
+        <p:style>
+          <a:lnRef idx="2">
+            <a:schemeClr val="accent1">
+              <a:shade val="50000"/>
+            </a:schemeClr>
+          </a:lnRef>
+          <a:fillRef idx="1">
+            <a:schemeClr val="accent1"/>
+          </a:fillRef>
+          <a:effectRef idx="0">
+            <a:schemeClr val="accent1"/>
+          </a:effectRef>
+          <a:fontRef idx="minor">
+            <a:schemeClr val="lt1"/>
+          </a:fontRef>
+        </p:style>
+        <p:txBody>
+          <a:bodyPr rtlCol="0" anchor="ctr"/>
+          <a:lstStyle/>
+          <a:p>
+            <a:pPr algn="ctr"/>
+            <a:endParaRPr lang="en-US"/>
+          </a:p>
+        </p:txBody>
+      </p:sp>
     </p:spTree>
     <p:extLst>
       <p:ext uri="{BB962C8B-B14F-4D97-AF65-F5344CB8AC3E}">
@@ -5124,6 +7009,139 @@
   <p:clrMapOvr>
     <a:masterClrMapping/>
   </p:clrMapOvr>
+  <p:timing>
+    <p:tnLst>
+      <p:par>
+        <p:cTn id="1" dur="indefinite" restart="never" nodeType="tmRoot">
+          <p:childTnLst>
+            <p:seq concurrent="1" nextAc="seek">
+              <p:cTn id="2" dur="indefinite" nodeType="mainSeq">
+                <p:childTnLst>
+                  <p:par>
+                    <p:cTn id="3" fill="hold">
+                      <p:stCondLst>
+                        <p:cond delay="indefinite"/>
+                      </p:stCondLst>
+                      <p:childTnLst>
+                        <p:par>
+                          <p:cTn id="4" fill="hold">
+                            <p:stCondLst>
+                              <p:cond delay="0"/>
+                            </p:stCondLst>
+                            <p:childTnLst>
+                              <p:par>
+                                <p:cTn id="5" presetID="1" presetClass="entr" presetSubtype="0" fill="hold" nodeType="clickEffect">
+                                  <p:stCondLst>
+                                    <p:cond delay="0"/>
+                                  </p:stCondLst>
+                                  <p:childTnLst>
+                                    <p:set>
+                                      <p:cBhvr>
+                                        <p:cTn id="6" dur="1" fill="hold">
+                                          <p:stCondLst>
+                                            <p:cond delay="0"/>
+                                          </p:stCondLst>
+                                        </p:cTn>
+                                        <p:tgtEl>
+                                          <p:spTgt spid="2"/>
+                                        </p:tgtEl>
+                                        <p:attrNameLst>
+                                          <p:attrName>style.visibility</p:attrName>
+                                        </p:attrNameLst>
+                                      </p:cBhvr>
+                                      <p:to>
+                                        <p:strVal val="visible"/>
+                                      </p:to>
+                                    </p:set>
+                                  </p:childTnLst>
+                                </p:cTn>
+                              </p:par>
+                              <p:par>
+                                <p:cTn id="7" presetID="1" presetClass="entr" presetSubtype="0" fill="hold" grpId="0" nodeType="withEffect">
+                                  <p:stCondLst>
+                                    <p:cond delay="0"/>
+                                  </p:stCondLst>
+                                  <p:childTnLst>
+                                    <p:set>
+                                      <p:cBhvr>
+                                        <p:cTn id="8" dur="1" fill="hold">
+                                          <p:stCondLst>
+                                            <p:cond delay="0"/>
+                                          </p:stCondLst>
+                                        </p:cTn>
+                                        <p:tgtEl>
+                                          <p:spTgt spid="8"/>
+                                        </p:tgtEl>
+                                        <p:attrNameLst>
+                                          <p:attrName>style.visibility</p:attrName>
+                                        </p:attrNameLst>
+                                      </p:cBhvr>
+                                      <p:to>
+                                        <p:strVal val="visible"/>
+                                      </p:to>
+                                    </p:set>
+                                  </p:childTnLst>
+                                </p:cTn>
+                              </p:par>
+                              <p:par>
+                                <p:cTn id="9" presetID="1" presetClass="entr" presetSubtype="0" fill="hold" grpId="0" nodeType="withEffect">
+                                  <p:stCondLst>
+                                    <p:cond delay="0"/>
+                                  </p:stCondLst>
+                                  <p:childTnLst>
+                                    <p:set>
+                                      <p:cBhvr>
+                                        <p:cTn id="10" dur="1" fill="hold">
+                                          <p:stCondLst>
+                                            <p:cond delay="0"/>
+                                          </p:stCondLst>
+                                        </p:cTn>
+                                        <p:tgtEl>
+                                          <p:spTgt spid="9"/>
+                                        </p:tgtEl>
+                                        <p:attrNameLst>
+                                          <p:attrName>style.visibility</p:attrName>
+                                        </p:attrNameLst>
+                                      </p:cBhvr>
+                                      <p:to>
+                                        <p:strVal val="visible"/>
+                                      </p:to>
+                                    </p:set>
+                                  </p:childTnLst>
+                                </p:cTn>
+                              </p:par>
+                            </p:childTnLst>
+                          </p:cTn>
+                        </p:par>
+                      </p:childTnLst>
+                    </p:cTn>
+                  </p:par>
+                </p:childTnLst>
+              </p:cTn>
+              <p:prevCondLst>
+                <p:cond evt="onPrev" delay="0">
+                  <p:tgtEl>
+                    <p:sldTgt/>
+                  </p:tgtEl>
+                </p:cond>
+              </p:prevCondLst>
+              <p:nextCondLst>
+                <p:cond evt="onNext" delay="0">
+                  <p:tgtEl>
+                    <p:sldTgt/>
+                  </p:tgtEl>
+                </p:cond>
+              </p:nextCondLst>
+            </p:seq>
+          </p:childTnLst>
+        </p:cTn>
+      </p:par>
+    </p:tnLst>
+    <p:bldLst>
+      <p:bldP spid="8" grpId="0"/>
+      <p:bldP spid="9" grpId="0" animBg="1"/>
+    </p:bldLst>
+  </p:timing>
 </p:sld>
 </file>
 
@@ -5144,6 +7162,35 @@
           <a:chExt cx="0" cy="0"/>
         </a:xfrm>
       </p:grpSpPr>
+      <p:pic>
+        <p:nvPicPr>
+          <p:cNvPr id="2" name="Picture 1"/>
+          <p:cNvPicPr>
+            <a:picLocks noChangeAspect="1"/>
+          </p:cNvPicPr>
+          <p:nvPr/>
+        </p:nvPicPr>
+        <p:blipFill rotWithShape="1">
+          <a:blip r:embed="rId2">
+            <a:extLst>
+              <a:ext uri="{28A0092B-C50C-407E-A947-70E740481C1C}">
+                <a14:useLocalDpi xmlns:a14="http://schemas.microsoft.com/office/drawing/2010/main" val="0"/>
+              </a:ext>
+            </a:extLst>
+          </a:blip>
+          <a:srcRect l="1797" t="12990" r="3214" b="16156"/>
+          <a:stretch/>
+        </p:blipFill>
+        <p:spPr>
+          <a:xfrm>
+            <a:off x="2469806" y="2991922"/>
+            <a:ext cx="6814236" cy="3000765"/>
+          </a:xfrm>
+          <a:prstGeom prst="rect">
+            <a:avLst/>
+          </a:prstGeom>
+        </p:spPr>
+      </p:pic>
       <p:sp>
         <p:nvSpPr>
           <p:cNvPr id="12" name="Rectangle 11"/>
@@ -5217,6 +7264,375 @@
           <p:nvPr/>
         </p:nvPicPr>
         <p:blipFill>
+          <a:blip r:embed="rId3" cstate="print">
+            <a:extLst>
+              <a:ext uri="{28A0092B-C50C-407E-A947-70E740481C1C}">
+                <a14:useLocalDpi xmlns:a14="http://schemas.microsoft.com/office/drawing/2010/main" val="0"/>
+              </a:ext>
+            </a:extLst>
+          </a:blip>
+          <a:stretch>
+            <a:fillRect/>
+          </a:stretch>
+        </p:blipFill>
+        <p:spPr>
+          <a:xfrm>
+            <a:off x="11325199" y="116740"/>
+            <a:ext cx="866801" cy="731428"/>
+          </a:xfrm>
+          <a:prstGeom prst="rect">
+            <a:avLst/>
+          </a:prstGeom>
+        </p:spPr>
+      </p:pic>
+      <p:sp>
+        <p:nvSpPr>
+          <p:cNvPr id="4" name="TextBox 3"/>
+          <p:cNvSpPr txBox="1"/>
+          <p:nvPr/>
+        </p:nvSpPr>
+        <p:spPr>
+          <a:xfrm>
+            <a:off x="1340642" y="0"/>
+            <a:ext cx="9072564" cy="584775"/>
+          </a:xfrm>
+          <a:prstGeom prst="rect">
+            <a:avLst/>
+          </a:prstGeom>
+          <a:noFill/>
+        </p:spPr>
+        <p:txBody>
+          <a:bodyPr wrap="square" rtlCol="0">
+            <a:spAutoFit/>
+          </a:bodyPr>
+          <a:lstStyle/>
+          <a:p>
+            <a:pPr algn="ctr"/>
+            <a:r>
+              <a:rPr lang="en-US" sz="3200" dirty="0" smtClean="0"/>
+              <a:t>Reca</a:t>
+            </a:r>
+            <a:r>
+              <a:rPr lang="en-US" sz="3200" dirty="0"/>
+              <a:t>p</a:t>
+            </a:r>
+          </a:p>
+        </p:txBody>
+      </p:sp>
+      <p:sp>
+        <p:nvSpPr>
+          <p:cNvPr id="5" name="TextBox 4"/>
+          <p:cNvSpPr txBox="1"/>
+          <p:nvPr/>
+        </p:nvSpPr>
+        <p:spPr>
+          <a:xfrm>
+            <a:off x="2324725" y="765790"/>
+            <a:ext cx="8021305" cy="2031325"/>
+          </a:xfrm>
+          <a:prstGeom prst="rect">
+            <a:avLst/>
+          </a:prstGeom>
+          <a:noFill/>
+        </p:spPr>
+        <p:txBody>
+          <a:bodyPr wrap="square" rtlCol="0">
+            <a:spAutoFit/>
+          </a:bodyPr>
+          <a:lstStyle/>
+          <a:p>
+            <a:pPr marL="285750" indent="-285750">
+              <a:buFont typeface="Arial" panose="020B0604020202020204" pitchFamily="34" charset="0"/>
+              <a:buChar char="•"/>
+            </a:pPr>
+            <a:r>
+              <a:rPr lang="en-US" dirty="0" smtClean="0"/>
+              <a:t>x86-64 addresses = </a:t>
+            </a:r>
+            <a:r>
+              <a:rPr lang="en-US" dirty="0" smtClean="0">
+                <a:solidFill>
+                  <a:srgbClr val="FF0000"/>
+                </a:solidFill>
+              </a:rPr>
+              <a:t>64-bit</a:t>
+            </a:r>
+            <a:r>
+              <a:rPr lang="en-US" dirty="0" smtClean="0"/>
+              <a:t> executable running</a:t>
+            </a:r>
+            <a:endParaRPr lang="en-US" dirty="0"/>
+          </a:p>
+          <a:p>
+            <a:pPr marL="285750" indent="-285750">
+              <a:buFont typeface="Arial" panose="020B0604020202020204" pitchFamily="34" charset="0"/>
+              <a:buChar char="•"/>
+            </a:pPr>
+            <a:r>
+              <a:rPr lang="en-US" dirty="0" smtClean="0"/>
+              <a:t>We always leak the same bytes which looks like an address:</a:t>
+            </a:r>
+          </a:p>
+          <a:p>
+            <a:pPr marL="742950" lvl="1" indent="-285750">
+              <a:buFont typeface="Arial" panose="020B0604020202020204" pitchFamily="34" charset="0"/>
+              <a:buChar char="•"/>
+            </a:pPr>
+            <a:r>
+              <a:rPr lang="en-US" dirty="0" smtClean="0">
+                <a:solidFill>
+                  <a:srgbClr val="FF0000"/>
+                </a:solidFill>
+              </a:rPr>
+              <a:t>PIE off</a:t>
+            </a:r>
+          </a:p>
+          <a:p>
+            <a:pPr marL="742950" lvl="1" indent="-285750">
+              <a:buFont typeface="Arial" panose="020B0604020202020204" pitchFamily="34" charset="0"/>
+              <a:buChar char="•"/>
+            </a:pPr>
+            <a:r>
+              <a:rPr lang="en-US" dirty="0">
+                <a:solidFill>
+                  <a:srgbClr val="FF0000"/>
+                </a:solidFill>
+              </a:rPr>
+              <a:t>n</a:t>
+            </a:r>
+            <a:r>
+              <a:rPr lang="en-US" dirty="0" smtClean="0">
+                <a:solidFill>
+                  <a:srgbClr val="FF0000"/>
+                </a:solidFill>
+              </a:rPr>
+              <a:t>o canary</a:t>
+            </a:r>
+            <a:endParaRPr lang="en-US" dirty="0" smtClean="0"/>
+          </a:p>
+          <a:p>
+            <a:pPr marL="285750" indent="-285750">
+              <a:buFont typeface="Arial" panose="020B0604020202020204" pitchFamily="34" charset="0"/>
+              <a:buChar char="•"/>
+            </a:pPr>
+            <a:r>
+              <a:rPr lang="en-US" dirty="0" smtClean="0"/>
+              <a:t>The stack addresses are </a:t>
+            </a:r>
+            <a:r>
+              <a:rPr lang="en-US" dirty="0" smtClean="0"/>
+              <a:t>randomized </a:t>
+            </a:r>
+            <a:r>
+              <a:rPr lang="en-US" dirty="0" smtClean="0"/>
+              <a:t>= </a:t>
+            </a:r>
+            <a:r>
+              <a:rPr lang="en-US" dirty="0" smtClean="0">
+                <a:solidFill>
+                  <a:srgbClr val="FF0000"/>
+                </a:solidFill>
+              </a:rPr>
+              <a:t>ASLR on</a:t>
+            </a:r>
+            <a:endParaRPr lang="en-US" dirty="0"/>
+          </a:p>
+          <a:p>
+            <a:pPr marL="285750" indent="-285750">
+              <a:buFont typeface="Arial" panose="020B0604020202020204" pitchFamily="34" charset="0"/>
+              <a:buChar char="•"/>
+            </a:pPr>
+            <a:r>
+              <a:rPr lang="en-US" dirty="0" smtClean="0"/>
+              <a:t>Crash after 40 bytes, trash in buffer = </a:t>
+            </a:r>
+            <a:r>
+              <a:rPr lang="en-US" dirty="0" smtClean="0">
+                <a:solidFill>
+                  <a:srgbClr val="FF0000"/>
+                </a:solidFill>
+              </a:rPr>
+              <a:t>char </a:t>
+            </a:r>
+            <a:r>
+              <a:rPr lang="en-US" dirty="0">
+                <a:solidFill>
+                  <a:srgbClr val="FF0000"/>
+                </a:solidFill>
+              </a:rPr>
+              <a:t>b</a:t>
+            </a:r>
+            <a:r>
+              <a:rPr lang="en-US" dirty="0" smtClean="0">
+                <a:solidFill>
+                  <a:srgbClr val="FF0000"/>
+                </a:solidFill>
+              </a:rPr>
+              <a:t>uffer[32];</a:t>
+            </a:r>
+            <a:endParaRPr lang="en-US" dirty="0"/>
+          </a:p>
+          <a:p>
+            <a:pPr marL="285750" indent="-285750">
+              <a:buFont typeface="Arial" panose="020B0604020202020204" pitchFamily="34" charset="0"/>
+              <a:buChar char="•"/>
+            </a:pPr>
+            <a:r>
+              <a:rPr lang="en-US" dirty="0" smtClean="0"/>
+              <a:t>Does not print “ </a:t>
+            </a:r>
+            <a:r>
+              <a:rPr lang="en-US" i="1" dirty="0" smtClean="0"/>
+              <a:t>Bye! </a:t>
+            </a:r>
+            <a:r>
+              <a:rPr lang="en-US" dirty="0" smtClean="0"/>
+              <a:t>” when it crashes = intermediate function</a:t>
+            </a:r>
+            <a:endParaRPr lang="en-US" dirty="0"/>
+          </a:p>
+        </p:txBody>
+      </p:sp>
+      <p:sp>
+        <p:nvSpPr>
+          <p:cNvPr id="3" name="TextBox 2"/>
+          <p:cNvSpPr txBox="1"/>
+          <p:nvPr/>
+        </p:nvSpPr>
+        <p:spPr>
+          <a:xfrm>
+            <a:off x="4004068" y="6187494"/>
+            <a:ext cx="4201297" cy="369332"/>
+          </a:xfrm>
+          <a:prstGeom prst="rect">
+            <a:avLst/>
+          </a:prstGeom>
+          <a:noFill/>
+        </p:spPr>
+        <p:txBody>
+          <a:bodyPr wrap="square" rtlCol="0">
+            <a:spAutoFit/>
+          </a:bodyPr>
+          <a:lstStyle/>
+          <a:p>
+            <a:r>
+              <a:rPr lang="en-US" i="1" dirty="0" smtClean="0"/>
+              <a:t>Ok cool bro, but what’s next?</a:t>
+            </a:r>
+            <a:endParaRPr lang="en-US" i="1" dirty="0"/>
+          </a:p>
+        </p:txBody>
+      </p:sp>
+    </p:spTree>
+    <p:extLst>
+      <p:ext uri="{BB962C8B-B14F-4D97-AF65-F5344CB8AC3E}">
+        <p14:creationId xmlns:p14="http://schemas.microsoft.com/office/powerpoint/2010/main" val="3297735021"/>
+      </p:ext>
+    </p:extLst>
+  </p:cSld>
+  <p:clrMapOvr>
+    <a:masterClrMapping/>
+  </p:clrMapOvr>
+  <p:timing>
+    <p:tnLst>
+      <p:par>
+        <p:cTn id="1" dur="indefinite" restart="never" nodeType="tmRoot"/>
+      </p:par>
+    </p:tnLst>
+  </p:timing>
+</p:sld>
+</file>
+
+<file path=ppt/slides/slide9.xml><?xml version="1.0" encoding="utf-8"?>
+<p:sld xmlns:a="http://schemas.openxmlformats.org/drawingml/2006/main" xmlns:r="http://schemas.openxmlformats.org/officeDocument/2006/relationships" xmlns:p="http://schemas.openxmlformats.org/presentationml/2006/main">
+  <p:cSld>
+    <p:spTree>
+      <p:nvGrpSpPr>
+        <p:cNvPr id="1" name=""/>
+        <p:cNvGrpSpPr/>
+        <p:nvPr/>
+      </p:nvGrpSpPr>
+      <p:grpSpPr>
+        <a:xfrm>
+          <a:off x="0" y="0"/>
+          <a:ext cx="0" cy="0"/>
+          <a:chOff x="0" y="0"/>
+          <a:chExt cx="0" cy="0"/>
+        </a:xfrm>
+      </p:grpSpPr>
+      <p:sp>
+        <p:nvSpPr>
+          <p:cNvPr id="12" name="Rectangle 11"/>
+          <p:cNvSpPr/>
+          <p:nvPr/>
+        </p:nvSpPr>
+        <p:spPr>
+          <a:xfrm>
+            <a:off x="457199" y="0"/>
+            <a:ext cx="10839451" cy="628649"/>
+          </a:xfrm>
+          <a:prstGeom prst="rect">
+            <a:avLst/>
+          </a:prstGeom>
+          <a:gradFill flip="none" rotWithShape="1">
+            <a:gsLst>
+              <a:gs pos="52000">
+                <a:schemeClr val="accent1">
+                  <a:lumMod val="60000"/>
+                  <a:lumOff val="40000"/>
+                </a:schemeClr>
+              </a:gs>
+              <a:gs pos="100000">
+                <a:schemeClr val="tx2">
+                  <a:lumMod val="60000"/>
+                  <a:lumOff val="40000"/>
+                </a:schemeClr>
+              </a:gs>
+              <a:gs pos="0">
+                <a:schemeClr val="accent1"/>
+              </a:gs>
+            </a:gsLst>
+            <a:lin ang="10800000" scaled="1"/>
+            <a:tileRect/>
+          </a:gradFill>
+          <a:ln>
+            <a:noFill/>
+          </a:ln>
+        </p:spPr>
+        <p:style>
+          <a:lnRef idx="2">
+            <a:schemeClr val="accent1">
+              <a:shade val="50000"/>
+            </a:schemeClr>
+          </a:lnRef>
+          <a:fillRef idx="1">
+            <a:schemeClr val="accent1"/>
+          </a:fillRef>
+          <a:effectRef idx="0">
+            <a:schemeClr val="accent1"/>
+          </a:effectRef>
+          <a:fontRef idx="minor">
+            <a:schemeClr val="lt1"/>
+          </a:fontRef>
+        </p:style>
+        <p:txBody>
+          <a:bodyPr rtlCol="0" anchor="ctr"/>
+          <a:lstStyle/>
+          <a:p>
+            <a:pPr algn="ctr"/>
+            <a:endParaRPr lang="en-US" sz="3200"/>
+          </a:p>
+        </p:txBody>
+      </p:sp>
+      <p:pic>
+        <p:nvPicPr>
+          <p:cNvPr id="10" name="Picture 9"/>
+          <p:cNvPicPr>
+            <a:picLocks noChangeAspect="1"/>
+          </p:cNvPicPr>
+          <p:nvPr/>
+        </p:nvPicPr>
+        <p:blipFill>
           <a:blip r:embed="rId2" cstate="print">
             <a:extLst>
               <a:ext uri="{28A0092B-C50C-407E-A947-70E740481C1C}">
@@ -5238,16 +7654,190 @@
           </a:prstGeom>
         </p:spPr>
       </p:pic>
+      <p:sp>
+        <p:nvSpPr>
+          <p:cNvPr id="4" name="TextBox 3"/>
+          <p:cNvSpPr txBox="1"/>
+          <p:nvPr/>
+        </p:nvSpPr>
+        <p:spPr>
+          <a:xfrm>
+            <a:off x="1340642" y="0"/>
+            <a:ext cx="9072564" cy="584775"/>
+          </a:xfrm>
+          <a:prstGeom prst="rect">
+            <a:avLst/>
+          </a:prstGeom>
+          <a:noFill/>
+        </p:spPr>
+        <p:txBody>
+          <a:bodyPr wrap="square" rtlCol="0">
+            <a:spAutoFit/>
+          </a:bodyPr>
+          <a:lstStyle/>
+          <a:p>
+            <a:pPr algn="ctr"/>
+            <a:r>
+              <a:rPr lang="en-US" sz="3200" dirty="0" smtClean="0"/>
+              <a:t>Return Oriented Programming</a:t>
+            </a:r>
+            <a:endParaRPr lang="en-US" sz="3200" dirty="0"/>
+          </a:p>
+        </p:txBody>
+      </p:sp>
+      <p:sp>
+        <p:nvSpPr>
+          <p:cNvPr id="3" name="TextBox 2"/>
+          <p:cNvSpPr txBox="1"/>
+          <p:nvPr/>
+        </p:nvSpPr>
+        <p:spPr>
+          <a:xfrm>
+            <a:off x="2034746" y="1351005"/>
+            <a:ext cx="7809470" cy="1754326"/>
+          </a:xfrm>
+          <a:prstGeom prst="rect">
+            <a:avLst/>
+          </a:prstGeom>
+          <a:noFill/>
+        </p:spPr>
+        <p:txBody>
+          <a:bodyPr wrap="square" rtlCol="0">
+            <a:spAutoFit/>
+          </a:bodyPr>
+          <a:lstStyle/>
+          <a:p>
+            <a:pPr marL="285750" indent="-285750">
+              <a:buFont typeface="Arial" panose="020B0604020202020204" pitchFamily="34" charset="0"/>
+              <a:buChar char="•"/>
+            </a:pPr>
+            <a:r>
+              <a:rPr lang="en-US" dirty="0" smtClean="0"/>
+              <a:t>Once we control the execution flow = we control RIP</a:t>
+            </a:r>
+          </a:p>
+          <a:p>
+            <a:pPr marL="285750" indent="-285750">
+              <a:buFont typeface="Arial" panose="020B0604020202020204" pitchFamily="34" charset="0"/>
+              <a:buChar char="•"/>
+            </a:pPr>
+            <a:endParaRPr lang="en-US" dirty="0"/>
+          </a:p>
+          <a:p>
+            <a:pPr marL="285750" indent="-285750">
+              <a:buFont typeface="Arial" panose="020B0604020202020204" pitchFamily="34" charset="0"/>
+              <a:buChar char="•"/>
+            </a:pPr>
+            <a:r>
+              <a:rPr lang="en-US" dirty="0" smtClean="0"/>
+              <a:t>Use </a:t>
+            </a:r>
+            <a:r>
+              <a:rPr lang="en-US" i="1" dirty="0" smtClean="0"/>
+              <a:t>gadgets</a:t>
+            </a:r>
+            <a:r>
+              <a:rPr lang="en-US" dirty="0" smtClean="0"/>
+              <a:t> to execute instructions sequences from the binary itself and jump somewhere else using RET</a:t>
+            </a:r>
+            <a:endParaRPr lang="en-US" i="1" dirty="0" smtClean="0"/>
+          </a:p>
+          <a:p>
+            <a:pPr marL="285750" indent="-285750">
+              <a:buFont typeface="Arial" panose="020B0604020202020204" pitchFamily="34" charset="0"/>
+              <a:buChar char="•"/>
+            </a:pPr>
+            <a:endParaRPr lang="en-US" i="1" dirty="0"/>
+          </a:p>
+          <a:p>
+            <a:pPr marL="285750" indent="-285750">
+              <a:buFont typeface="Arial" panose="020B0604020202020204" pitchFamily="34" charset="0"/>
+              <a:buChar char="•"/>
+            </a:pPr>
+            <a:r>
+              <a:rPr lang="en-US" dirty="0" smtClean="0"/>
+              <a:t>We control the stack values with the stack buffer overflow!</a:t>
+            </a:r>
+          </a:p>
+        </p:txBody>
+      </p:sp>
+      <p:pic>
+        <p:nvPicPr>
+          <p:cNvPr id="5" name="Picture 4"/>
+          <p:cNvPicPr>
+            <a:picLocks noChangeAspect="1"/>
+          </p:cNvPicPr>
+          <p:nvPr/>
+        </p:nvPicPr>
+        <p:blipFill>
+          <a:blip r:embed="rId3">
+            <a:extLst>
+              <a:ext uri="{28A0092B-C50C-407E-A947-70E740481C1C}">
+                <a14:useLocalDpi xmlns:a14="http://schemas.microsoft.com/office/drawing/2010/main" val="0"/>
+              </a:ext>
+            </a:extLst>
+          </a:blip>
+          <a:stretch>
+            <a:fillRect/>
+          </a:stretch>
+        </p:blipFill>
+        <p:spPr>
+          <a:xfrm>
+            <a:off x="1070059" y="4562694"/>
+            <a:ext cx="9712584" cy="868857"/>
+          </a:xfrm>
+          <a:prstGeom prst="rect">
+            <a:avLst/>
+          </a:prstGeom>
+        </p:spPr>
+      </p:pic>
+      <p:sp>
+        <p:nvSpPr>
+          <p:cNvPr id="8" name="TextBox 7"/>
+          <p:cNvSpPr txBox="1"/>
+          <p:nvPr/>
+        </p:nvSpPr>
+        <p:spPr>
+          <a:xfrm>
+            <a:off x="1070059" y="3593898"/>
+            <a:ext cx="9704172" cy="646331"/>
+          </a:xfrm>
+          <a:prstGeom prst="rect">
+            <a:avLst/>
+          </a:prstGeom>
+          <a:noFill/>
+        </p:spPr>
+        <p:txBody>
+          <a:bodyPr wrap="square" rtlCol="0">
+            <a:spAutoFit/>
+          </a:bodyPr>
+          <a:lstStyle/>
+          <a:p>
+            <a:r>
+              <a:rPr lang="en-US" dirty="0" smtClean="0"/>
+              <a:t>For instance, this gadgets allows the attacker to control RDI, which is the first argument in the x64 calling convention.</a:t>
+            </a:r>
+            <a:endParaRPr lang="en-US" dirty="0"/>
+          </a:p>
+        </p:txBody>
+      </p:sp>
     </p:spTree>
     <p:extLst>
       <p:ext uri="{BB962C8B-B14F-4D97-AF65-F5344CB8AC3E}">
-        <p14:creationId xmlns:p14="http://schemas.microsoft.com/office/powerpoint/2010/main" val="3297735021"/>
+        <p14:creationId xmlns:p14="http://schemas.microsoft.com/office/powerpoint/2010/main" val="3476725745"/>
       </p:ext>
     </p:extLst>
   </p:cSld>
   <p:clrMapOvr>
     <a:masterClrMapping/>
   </p:clrMapOvr>
+  <p:timing>
+    <p:tnLst>
+      <p:par>
+        <p:cTn id="1" dur="indefinite" restart="never" nodeType="tmRoot"/>
+      </p:par>
+    </p:tnLst>
+  </p:timing>
 </p:sld>
 </file>
 

</xml_diff>

<commit_message>
[WD] add stop gadget slides
</commit_message>
<xml_diff>
--- a/Blind_Date/slides.pptx
+++ b/Blind_Date/slides.pptx
@@ -17,7 +17,10 @@
     <p:sldId id="277" r:id="rId11"/>
     <p:sldId id="278" r:id="rId12"/>
     <p:sldId id="275" r:id="rId13"/>
-    <p:sldId id="276" r:id="rId14"/>
+    <p:sldId id="279" r:id="rId14"/>
+    <p:sldId id="280" r:id="rId15"/>
+    <p:sldId id="281" r:id="rId16"/>
+    <p:sldId id="276" r:id="rId17"/>
   </p:sldIdLst>
   <p:sldSz cx="12192000" cy="6858000"/>
   <p:notesSz cx="6858000" cy="9144000"/>
@@ -3995,11 +3998,11 @@
   <p:clrMapOvr>
     <a:masterClrMapping/>
   </p:clrMapOvr>
-  <mc:AlternateContent xmlns:mc="http://schemas.openxmlformats.org/markup-compatibility/2006">
-    <mc:Choice xmlns:p14="http://schemas.microsoft.com/office/powerpoint/2010/main" Requires="p14">
+  <mc:AlternateContent xmlns:mc="http://schemas.openxmlformats.org/markup-compatibility/2006" xmlns:p14="http://schemas.microsoft.com/office/powerpoint/2010/main">
+    <mc:Choice Requires="p14">
       <p:transition p14:dur="0"/>
     </mc:Choice>
-    <mc:Fallback>
+    <mc:Fallback xmlns="">
       <p:transition/>
     </mc:Fallback>
   </mc:AlternateContent>
@@ -4237,9 +4240,125 @@
   <p:timing>
     <p:tnLst>
       <p:par>
-        <p:cTn id="1" dur="indefinite" restart="never" nodeType="tmRoot"/>
+        <p:cTn id="1" dur="indefinite" restart="never" nodeType="tmRoot">
+          <p:childTnLst>
+            <p:seq concurrent="1" nextAc="seek">
+              <p:cTn id="2" dur="indefinite" nodeType="mainSeq">
+                <p:childTnLst>
+                  <p:par>
+                    <p:cTn id="3" fill="hold">
+                      <p:stCondLst>
+                        <p:cond delay="indefinite"/>
+                      </p:stCondLst>
+                      <p:childTnLst>
+                        <p:par>
+                          <p:cTn id="4" fill="hold">
+                            <p:stCondLst>
+                              <p:cond delay="0"/>
+                            </p:stCondLst>
+                            <p:childTnLst>
+                              <p:par>
+                                <p:cTn id="5" presetID="1" presetClass="entr" presetSubtype="0" fill="hold" nodeType="clickEffect">
+                                  <p:stCondLst>
+                                    <p:cond delay="0"/>
+                                  </p:stCondLst>
+                                  <p:childTnLst>
+                                    <p:set>
+                                      <p:cBhvr>
+                                        <p:cTn id="6" dur="1" fill="hold">
+                                          <p:stCondLst>
+                                            <p:cond delay="0"/>
+                                          </p:stCondLst>
+                                        </p:cTn>
+                                        <p:tgtEl>
+                                          <p:spTgt spid="2"/>
+                                        </p:tgtEl>
+                                        <p:attrNameLst>
+                                          <p:attrName>style.visibility</p:attrName>
+                                        </p:attrNameLst>
+                                      </p:cBhvr>
+                                      <p:to>
+                                        <p:strVal val="visible"/>
+                                      </p:to>
+                                    </p:set>
+                                  </p:childTnLst>
+                                </p:cTn>
+                              </p:par>
+                            </p:childTnLst>
+                          </p:cTn>
+                        </p:par>
+                      </p:childTnLst>
+                    </p:cTn>
+                  </p:par>
+                  <p:par>
+                    <p:cTn id="7" fill="hold">
+                      <p:stCondLst>
+                        <p:cond delay="indefinite"/>
+                      </p:stCondLst>
+                      <p:childTnLst>
+                        <p:par>
+                          <p:cTn id="8" fill="hold">
+                            <p:stCondLst>
+                              <p:cond delay="0"/>
+                            </p:stCondLst>
+                            <p:childTnLst>
+                              <p:par>
+                                <p:cTn id="9" presetID="1" presetClass="entr" presetSubtype="0" fill="hold" grpId="0" nodeType="clickEffect">
+                                  <p:stCondLst>
+                                    <p:cond delay="0"/>
+                                  </p:stCondLst>
+                                  <p:childTnLst>
+                                    <p:set>
+                                      <p:cBhvr>
+                                        <p:cTn id="10" dur="1" fill="hold">
+                                          <p:stCondLst>
+                                            <p:cond delay="0"/>
+                                          </p:stCondLst>
+                                        </p:cTn>
+                                        <p:tgtEl>
+                                          <p:spTgt spid="3"/>
+                                        </p:tgtEl>
+                                        <p:attrNameLst>
+                                          <p:attrName>style.visibility</p:attrName>
+                                        </p:attrNameLst>
+                                      </p:cBhvr>
+                                      <p:to>
+                                        <p:strVal val="visible"/>
+                                      </p:to>
+                                    </p:set>
+                                  </p:childTnLst>
+                                </p:cTn>
+                              </p:par>
+                            </p:childTnLst>
+                          </p:cTn>
+                        </p:par>
+                      </p:childTnLst>
+                    </p:cTn>
+                  </p:par>
+                </p:childTnLst>
+              </p:cTn>
+              <p:prevCondLst>
+                <p:cond evt="onPrev" delay="0">
+                  <p:tgtEl>
+                    <p:sldTgt/>
+                  </p:tgtEl>
+                </p:cond>
+              </p:prevCondLst>
+              <p:nextCondLst>
+                <p:cond evt="onNext" delay="0">
+                  <p:tgtEl>
+                    <p:sldTgt/>
+                  </p:tgtEl>
+                </p:cond>
+              </p:nextCondLst>
+            </p:seq>
+          </p:childTnLst>
+        </p:cTn>
       </p:par>
     </p:tnLst>
+    <p:bldLst>
+      <p:bldP spid="3" grpId="0"/>
+    </p:bldLst>
   </p:timing>
 </p:sld>
 </file>
@@ -4355,6 +4474,232 @@
           </a:prstGeom>
         </p:spPr>
       </p:pic>
+      <p:sp>
+        <p:nvSpPr>
+          <p:cNvPr id="4" name="TextBox 3"/>
+          <p:cNvSpPr txBox="1"/>
+          <p:nvPr/>
+        </p:nvSpPr>
+        <p:spPr>
+          <a:xfrm>
+            <a:off x="1340642" y="0"/>
+            <a:ext cx="9072564" cy="584775"/>
+          </a:xfrm>
+          <a:prstGeom prst="rect">
+            <a:avLst/>
+          </a:prstGeom>
+          <a:noFill/>
+        </p:spPr>
+        <p:txBody>
+          <a:bodyPr wrap="square" rtlCol="0">
+            <a:spAutoFit/>
+          </a:bodyPr>
+          <a:lstStyle/>
+          <a:p>
+            <a:pPr algn="ctr"/>
+            <a:r>
+              <a:rPr lang="en-US" sz="3200" dirty="0" smtClean="0"/>
+              <a:t>The stop gadget</a:t>
+            </a:r>
+            <a:endParaRPr lang="en-US" sz="3200" dirty="0"/>
+          </a:p>
+        </p:txBody>
+      </p:sp>
+      <p:sp>
+        <p:nvSpPr>
+          <p:cNvPr id="5" name="TextBox 4"/>
+          <p:cNvSpPr txBox="1"/>
+          <p:nvPr/>
+        </p:nvSpPr>
+        <p:spPr>
+          <a:xfrm>
+            <a:off x="1755559" y="1351005"/>
+            <a:ext cx="8242730" cy="923330"/>
+          </a:xfrm>
+          <a:prstGeom prst="rect">
+            <a:avLst/>
+          </a:prstGeom>
+          <a:noFill/>
+        </p:spPr>
+        <p:txBody>
+          <a:bodyPr wrap="square" rtlCol="0">
+            <a:spAutoFit/>
+          </a:bodyPr>
+          <a:lstStyle/>
+          <a:p>
+            <a:pPr marL="285750" indent="-285750">
+              <a:buFont typeface="Arial" panose="020B0604020202020204" pitchFamily="34" charset="0"/>
+              <a:buChar char="•"/>
+            </a:pPr>
+            <a:r>
+              <a:rPr lang="en-US" dirty="0" smtClean="0"/>
+              <a:t>Most important gadget!</a:t>
+            </a:r>
+          </a:p>
+          <a:p>
+            <a:pPr marL="285750" indent="-285750">
+              <a:buFont typeface="Arial" panose="020B0604020202020204" pitchFamily="34" charset="0"/>
+              <a:buChar char="•"/>
+            </a:pPr>
+            <a:endParaRPr lang="en-US" dirty="0"/>
+          </a:p>
+          <a:p>
+            <a:pPr marL="285750" indent="-285750">
+              <a:buFont typeface="Arial" panose="020B0604020202020204" pitchFamily="34" charset="0"/>
+              <a:buChar char="•"/>
+            </a:pPr>
+            <a:r>
+              <a:rPr lang="en-US" dirty="0" smtClean="0"/>
+              <a:t>Essential to confirm we regain execution flow control during each step</a:t>
+            </a:r>
+          </a:p>
+        </p:txBody>
+      </p:sp>
+      <p:pic>
+        <p:nvPicPr>
+          <p:cNvPr id="2" name="Picture 1"/>
+          <p:cNvPicPr>
+            <a:picLocks noChangeAspect="1"/>
+          </p:cNvPicPr>
+          <p:nvPr/>
+        </p:nvPicPr>
+        <p:blipFill rotWithShape="1">
+          <a:blip r:embed="rId3">
+            <a:extLst>
+              <a:ext uri="{28A0092B-C50C-407E-A947-70E740481C1C}">
+                <a14:useLocalDpi xmlns:a14="http://schemas.microsoft.com/office/drawing/2010/main" val="0"/>
+              </a:ext>
+            </a:extLst>
+          </a:blip>
+          <a:srcRect t="42712" r="74636" b="29140"/>
+          <a:stretch/>
+        </p:blipFill>
+        <p:spPr>
+          <a:xfrm>
+            <a:off x="6245630" y="2840737"/>
+            <a:ext cx="3659949" cy="1071669"/>
+          </a:xfrm>
+          <a:prstGeom prst="rect">
+            <a:avLst/>
+          </a:prstGeom>
+        </p:spPr>
+      </p:pic>
+      <p:sp>
+        <p:nvSpPr>
+          <p:cNvPr id="3" name="TextBox 2"/>
+          <p:cNvSpPr txBox="1"/>
+          <p:nvPr/>
+        </p:nvSpPr>
+        <p:spPr>
+          <a:xfrm>
+            <a:off x="1755559" y="2840737"/>
+            <a:ext cx="4013952" cy="1200329"/>
+          </a:xfrm>
+          <a:prstGeom prst="rect">
+            <a:avLst/>
+          </a:prstGeom>
+          <a:noFill/>
+        </p:spPr>
+        <p:txBody>
+          <a:bodyPr wrap="square" rtlCol="0">
+            <a:spAutoFit/>
+          </a:bodyPr>
+          <a:lstStyle/>
+          <a:p>
+            <a:r>
+              <a:rPr lang="en-US" dirty="0"/>
+              <a:t>In our case, we expect that there’s an </a:t>
+            </a:r>
+            <a:r>
+              <a:rPr lang="en-US" dirty="0" smtClean="0"/>
+              <a:t>address that, if we jump on it, produces the following output:</a:t>
+            </a:r>
+            <a:endParaRPr lang="en-US" dirty="0"/>
+          </a:p>
+          <a:p>
+            <a:endParaRPr lang="en-US" dirty="0"/>
+          </a:p>
+        </p:txBody>
+      </p:sp>
+      <p:sp>
+        <p:nvSpPr>
+          <p:cNvPr id="8" name="TextBox 7"/>
+          <p:cNvSpPr txBox="1"/>
+          <p:nvPr/>
+        </p:nvSpPr>
+        <p:spPr>
+          <a:xfrm>
+            <a:off x="1755559" y="4232990"/>
+            <a:ext cx="8737899" cy="2031325"/>
+          </a:xfrm>
+          <a:prstGeom prst="rect">
+            <a:avLst/>
+          </a:prstGeom>
+          <a:noFill/>
+        </p:spPr>
+        <p:txBody>
+          <a:bodyPr wrap="square" rtlCol="0">
+            <a:spAutoFit/>
+          </a:bodyPr>
+          <a:lstStyle/>
+          <a:p>
+            <a:r>
+              <a:rPr lang="en-US" dirty="0" smtClean="0"/>
+              <a:t>How do we find it?</a:t>
+            </a:r>
+          </a:p>
+          <a:p>
+            <a:endParaRPr lang="en-US" dirty="0" smtClean="0"/>
+          </a:p>
+          <a:p>
+            <a:pPr marL="285750" indent="-285750">
+              <a:buFontTx/>
+              <a:buChar char="-"/>
+            </a:pPr>
+            <a:r>
+              <a:rPr lang="en-US" dirty="0" smtClean="0"/>
+              <a:t>we fill the buffer and RBP</a:t>
+            </a:r>
+          </a:p>
+          <a:p>
+            <a:pPr marL="285750" indent="-285750">
+              <a:buFontTx/>
+              <a:buChar char="-"/>
+            </a:pPr>
+            <a:r>
+              <a:rPr lang="en-US" dirty="0"/>
+              <a:t>t</a:t>
+            </a:r>
+            <a:r>
+              <a:rPr lang="en-US" dirty="0" smtClean="0"/>
+              <a:t>hen we overwrite the return address with an address X from the binary</a:t>
+            </a:r>
+          </a:p>
+          <a:p>
+            <a:pPr marL="285750" indent="-285750">
+              <a:buFontTx/>
+              <a:buChar char="-"/>
+            </a:pPr>
+            <a:r>
+              <a:rPr lang="en-US" dirty="0" smtClean="0"/>
+              <a:t>we loop until the address X produces the expected output (called reference)</a:t>
+            </a:r>
+          </a:p>
+          <a:p>
+            <a:pPr marL="285750" indent="-285750">
+              <a:buFontTx/>
+              <a:buChar char="-"/>
+            </a:pPr>
+            <a:endParaRPr lang="en-US" dirty="0"/>
+          </a:p>
+          <a:p>
+            <a:r>
+              <a:rPr lang="en-US" dirty="0" smtClean="0"/>
+              <a:t>Be careful, several addresses could produce this output!</a:t>
+            </a:r>
+          </a:p>
+        </p:txBody>
+      </p:sp>
     </p:spTree>
     <p:extLst>
       <p:ext uri="{BB962C8B-B14F-4D97-AF65-F5344CB8AC3E}">
@@ -4368,9 +4713,199 @@
   <p:timing>
     <p:tnLst>
       <p:par>
-        <p:cTn id="1" dur="indefinite" restart="never" nodeType="tmRoot"/>
+        <p:cTn id="1" dur="indefinite" restart="never" nodeType="tmRoot">
+          <p:childTnLst>
+            <p:seq concurrent="1" nextAc="seek">
+              <p:cTn id="2" dur="indefinite" nodeType="mainSeq">
+                <p:childTnLst>
+                  <p:par>
+                    <p:cTn id="3" fill="hold">
+                      <p:stCondLst>
+                        <p:cond delay="indefinite"/>
+                      </p:stCondLst>
+                      <p:childTnLst>
+                        <p:par>
+                          <p:cTn id="4" fill="hold">
+                            <p:stCondLst>
+                              <p:cond delay="0"/>
+                            </p:stCondLst>
+                            <p:childTnLst>
+                              <p:par>
+                                <p:cTn id="5" presetID="1" presetClass="entr" presetSubtype="0" fill="hold" grpId="0" nodeType="clickEffect">
+                                  <p:stCondLst>
+                                    <p:cond delay="0"/>
+                                  </p:stCondLst>
+                                  <p:childTnLst>
+                                    <p:set>
+                                      <p:cBhvr>
+                                        <p:cTn id="6" dur="1" fill="hold">
+                                          <p:stCondLst>
+                                            <p:cond delay="0"/>
+                                          </p:stCondLst>
+                                        </p:cTn>
+                                        <p:tgtEl>
+                                          <p:spTgt spid="5"/>
+                                        </p:tgtEl>
+                                        <p:attrNameLst>
+                                          <p:attrName>style.visibility</p:attrName>
+                                        </p:attrNameLst>
+                                      </p:cBhvr>
+                                      <p:to>
+                                        <p:strVal val="visible"/>
+                                      </p:to>
+                                    </p:set>
+                                  </p:childTnLst>
+                                </p:cTn>
+                              </p:par>
+                            </p:childTnLst>
+                          </p:cTn>
+                        </p:par>
+                      </p:childTnLst>
+                    </p:cTn>
+                  </p:par>
+                  <p:par>
+                    <p:cTn id="7" fill="hold">
+                      <p:stCondLst>
+                        <p:cond delay="indefinite"/>
+                      </p:stCondLst>
+                      <p:childTnLst>
+                        <p:par>
+                          <p:cTn id="8" fill="hold">
+                            <p:stCondLst>
+                              <p:cond delay="0"/>
+                            </p:stCondLst>
+                            <p:childTnLst>
+                              <p:par>
+                                <p:cTn id="9" presetID="1" presetClass="entr" presetSubtype="0" fill="hold" nodeType="clickEffect">
+                                  <p:stCondLst>
+                                    <p:cond delay="0"/>
+                                  </p:stCondLst>
+                                  <p:childTnLst>
+                                    <p:set>
+                                      <p:cBhvr>
+                                        <p:cTn id="10" dur="1" fill="hold">
+                                          <p:stCondLst>
+                                            <p:cond delay="0"/>
+                                          </p:stCondLst>
+                                        </p:cTn>
+                                        <p:tgtEl>
+                                          <p:spTgt spid="2"/>
+                                        </p:tgtEl>
+                                        <p:attrNameLst>
+                                          <p:attrName>style.visibility</p:attrName>
+                                        </p:attrNameLst>
+                                      </p:cBhvr>
+                                      <p:to>
+                                        <p:strVal val="visible"/>
+                                      </p:to>
+                                    </p:set>
+                                  </p:childTnLst>
+                                </p:cTn>
+                              </p:par>
+                              <p:par>
+                                <p:cTn id="11" presetID="1" presetClass="entr" presetSubtype="0" fill="hold" grpId="0" nodeType="withEffect">
+                                  <p:stCondLst>
+                                    <p:cond delay="0"/>
+                                  </p:stCondLst>
+                                  <p:childTnLst>
+                                    <p:set>
+                                      <p:cBhvr>
+                                        <p:cTn id="12" dur="1" fill="hold">
+                                          <p:stCondLst>
+                                            <p:cond delay="0"/>
+                                          </p:stCondLst>
+                                        </p:cTn>
+                                        <p:tgtEl>
+                                          <p:spTgt spid="3"/>
+                                        </p:tgtEl>
+                                        <p:attrNameLst>
+                                          <p:attrName>style.visibility</p:attrName>
+                                        </p:attrNameLst>
+                                      </p:cBhvr>
+                                      <p:to>
+                                        <p:strVal val="visible"/>
+                                      </p:to>
+                                    </p:set>
+                                  </p:childTnLst>
+                                </p:cTn>
+                              </p:par>
+                            </p:childTnLst>
+                          </p:cTn>
+                        </p:par>
+                      </p:childTnLst>
+                    </p:cTn>
+                  </p:par>
+                  <p:par>
+                    <p:cTn id="13" fill="hold">
+                      <p:stCondLst>
+                        <p:cond delay="indefinite"/>
+                      </p:stCondLst>
+                      <p:childTnLst>
+                        <p:par>
+                          <p:cTn id="14" fill="hold">
+                            <p:stCondLst>
+                              <p:cond delay="0"/>
+                            </p:stCondLst>
+                            <p:childTnLst>
+                              <p:par>
+                                <p:cTn id="15" presetID="1" presetClass="entr" presetSubtype="0" fill="hold" grpId="0" nodeType="clickEffect">
+                                  <p:stCondLst>
+                                    <p:cond delay="0"/>
+                                  </p:stCondLst>
+                                  <p:childTnLst>
+                                    <p:set>
+                                      <p:cBhvr>
+                                        <p:cTn id="16" dur="1" fill="hold">
+                                          <p:stCondLst>
+                                            <p:cond delay="0"/>
+                                          </p:stCondLst>
+                                        </p:cTn>
+                                        <p:tgtEl>
+                                          <p:spTgt spid="8"/>
+                                        </p:tgtEl>
+                                        <p:attrNameLst>
+                                          <p:attrName>style.visibility</p:attrName>
+                                        </p:attrNameLst>
+                                      </p:cBhvr>
+                                      <p:to>
+                                        <p:strVal val="visible"/>
+                                      </p:to>
+                                    </p:set>
+                                  </p:childTnLst>
+                                </p:cTn>
+                              </p:par>
+                            </p:childTnLst>
+                          </p:cTn>
+                        </p:par>
+                      </p:childTnLst>
+                    </p:cTn>
+                  </p:par>
+                </p:childTnLst>
+              </p:cTn>
+              <p:prevCondLst>
+                <p:cond evt="onPrev" delay="0">
+                  <p:tgtEl>
+                    <p:sldTgt/>
+                  </p:tgtEl>
+                </p:cond>
+              </p:prevCondLst>
+              <p:nextCondLst>
+                <p:cond evt="onNext" delay="0">
+                  <p:tgtEl>
+                    <p:sldTgt/>
+                  </p:tgtEl>
+                </p:cond>
+              </p:nextCondLst>
+            </p:seq>
+          </p:childTnLst>
+        </p:cTn>
       </p:par>
     </p:tnLst>
+    <p:bldLst>
+      <p:bldP spid="5" grpId="0"/>
+      <p:bldP spid="3" grpId="0"/>
+      <p:bldP spid="8" grpId="0"/>
+    </p:bldLst>
   </p:timing>
 </p:sld>
 </file>
@@ -4486,10 +5021,643 @@
           </a:prstGeom>
         </p:spPr>
       </p:pic>
+      <p:sp>
+        <p:nvSpPr>
+          <p:cNvPr id="5" name="TextBox 4"/>
+          <p:cNvSpPr txBox="1"/>
+          <p:nvPr/>
+        </p:nvSpPr>
+        <p:spPr>
+          <a:xfrm>
+            <a:off x="1340642" y="0"/>
+            <a:ext cx="9072564" cy="584775"/>
+          </a:xfrm>
+          <a:prstGeom prst="rect">
+            <a:avLst/>
+          </a:prstGeom>
+          <a:noFill/>
+        </p:spPr>
+        <p:txBody>
+          <a:bodyPr wrap="square" rtlCol="0">
+            <a:spAutoFit/>
+          </a:bodyPr>
+          <a:lstStyle/>
+          <a:p>
+            <a:pPr algn="ctr"/>
+            <a:r>
+              <a:rPr lang="en-US" sz="3200" dirty="0" smtClean="0"/>
+              <a:t>The stop gadget</a:t>
+            </a:r>
+            <a:endParaRPr lang="en-US" sz="3200" dirty="0"/>
+          </a:p>
+        </p:txBody>
+      </p:sp>
+      <p:pic>
+        <p:nvPicPr>
+          <p:cNvPr id="2" name="Picture 1"/>
+          <p:cNvPicPr>
+            <a:picLocks noChangeAspect="1"/>
+          </p:cNvPicPr>
+          <p:nvPr/>
+        </p:nvPicPr>
+        <p:blipFill>
+          <a:blip r:embed="rId3">
+            <a:extLst>
+              <a:ext uri="{28A0092B-C50C-407E-A947-70E740481C1C}">
+                <a14:useLocalDpi xmlns:a14="http://schemas.microsoft.com/office/drawing/2010/main" val="0"/>
+              </a:ext>
+            </a:extLst>
+          </a:blip>
+          <a:stretch>
+            <a:fillRect/>
+          </a:stretch>
+        </p:blipFill>
+        <p:spPr>
+          <a:xfrm>
+            <a:off x="2277954" y="1146675"/>
+            <a:ext cx="7197940" cy="2634366"/>
+          </a:xfrm>
+          <a:prstGeom prst="rect">
+            <a:avLst/>
+          </a:prstGeom>
+        </p:spPr>
+      </p:pic>
+      <p:sp>
+        <p:nvSpPr>
+          <p:cNvPr id="6" name="TextBox 5"/>
+          <p:cNvSpPr txBox="1"/>
+          <p:nvPr/>
+        </p:nvSpPr>
+        <p:spPr>
+          <a:xfrm>
+            <a:off x="3944765" y="3411709"/>
+            <a:ext cx="3864318" cy="369332"/>
+          </a:xfrm>
+          <a:prstGeom prst="rect">
+            <a:avLst/>
+          </a:prstGeom>
+          <a:noFill/>
+        </p:spPr>
+        <p:txBody>
+          <a:bodyPr wrap="square" rtlCol="0">
+            <a:spAutoFit/>
+          </a:bodyPr>
+          <a:lstStyle/>
+          <a:p>
+            <a:pPr algn="ctr"/>
+            <a:r>
+              <a:rPr lang="en-US" dirty="0" smtClean="0"/>
+              <a:t>[DEMO </a:t>
+            </a:r>
+            <a:r>
+              <a:rPr lang="en-US" dirty="0" smtClean="0"/>
+              <a:t>STOP GADGET]</a:t>
+            </a:r>
+            <a:endParaRPr lang="en-US" dirty="0"/>
+          </a:p>
+        </p:txBody>
+      </p:sp>
+      <p:sp>
+        <p:nvSpPr>
+          <p:cNvPr id="3" name="TextBox 2"/>
+          <p:cNvSpPr txBox="1"/>
+          <p:nvPr/>
+        </p:nvSpPr>
+        <p:spPr>
+          <a:xfrm>
+            <a:off x="2882663" y="4267200"/>
+            <a:ext cx="5988521" cy="646331"/>
+          </a:xfrm>
+          <a:prstGeom prst="rect">
+            <a:avLst/>
+          </a:prstGeom>
+          <a:noFill/>
+        </p:spPr>
+        <p:txBody>
+          <a:bodyPr wrap="square" rtlCol="0">
+            <a:spAutoFit/>
+          </a:bodyPr>
+          <a:lstStyle/>
+          <a:p>
+            <a:r>
+              <a:rPr lang="en-US" dirty="0" smtClean="0"/>
+              <a:t>We know that, if we trigger the reference used for this stop gadget, it means we hit one of those addresses</a:t>
+            </a:r>
+            <a:endParaRPr lang="en-US" dirty="0"/>
+          </a:p>
+        </p:txBody>
+      </p:sp>
+      <p:sp>
+        <p:nvSpPr>
+          <p:cNvPr id="9" name="TextBox 8"/>
+          <p:cNvSpPr txBox="1"/>
+          <p:nvPr/>
+        </p:nvSpPr>
+        <p:spPr>
+          <a:xfrm>
+            <a:off x="3944765" y="5259649"/>
+            <a:ext cx="5371651" cy="954107"/>
+          </a:xfrm>
+          <a:prstGeom prst="rect">
+            <a:avLst/>
+          </a:prstGeom>
+          <a:noFill/>
+        </p:spPr>
+        <p:txBody>
+          <a:bodyPr wrap="square" rtlCol="0">
+            <a:spAutoFit/>
+          </a:bodyPr>
+          <a:lstStyle/>
+          <a:p>
+            <a:r>
+              <a:rPr lang="en-US" sz="2800" dirty="0" smtClean="0"/>
+              <a:t>We have a reliable way to know when we control RIP!</a:t>
+            </a:r>
+            <a:endParaRPr lang="en-US" sz="2800" dirty="0"/>
+          </a:p>
+        </p:txBody>
+      </p:sp>
+      <p:sp>
+        <p:nvSpPr>
+          <p:cNvPr id="7" name="Right Arrow 6"/>
+          <p:cNvSpPr/>
+          <p:nvPr/>
+        </p:nvSpPr>
+        <p:spPr>
+          <a:xfrm>
+            <a:off x="2549611" y="5475092"/>
+            <a:ext cx="1050133" cy="523220"/>
+          </a:xfrm>
+          <a:prstGeom prst="rightArrow">
+            <a:avLst/>
+          </a:prstGeom>
+          <a:solidFill>
+            <a:schemeClr val="tx2">
+              <a:lumMod val="20000"/>
+              <a:lumOff val="80000"/>
+            </a:schemeClr>
+          </a:solidFill>
+          <a:ln>
+            <a:solidFill>
+              <a:schemeClr val="accent2"/>
+            </a:solidFill>
+          </a:ln>
+        </p:spPr>
+        <p:style>
+          <a:lnRef idx="2">
+            <a:schemeClr val="accent1">
+              <a:shade val="50000"/>
+            </a:schemeClr>
+          </a:lnRef>
+          <a:fillRef idx="1">
+            <a:schemeClr val="accent1"/>
+          </a:fillRef>
+          <a:effectRef idx="0">
+            <a:schemeClr val="accent1"/>
+          </a:effectRef>
+          <a:fontRef idx="minor">
+            <a:schemeClr val="lt1"/>
+          </a:fontRef>
+        </p:style>
+        <p:txBody>
+          <a:bodyPr rtlCol="0" anchor="ctr"/>
+          <a:lstStyle/>
+          <a:p>
+            <a:pPr algn="ctr"/>
+            <a:endParaRPr lang="en-US"/>
+          </a:p>
+        </p:txBody>
+      </p:sp>
     </p:spTree>
     <p:extLst>
       <p:ext uri="{BB962C8B-B14F-4D97-AF65-F5344CB8AC3E}">
         <p14:creationId xmlns:p14="http://schemas.microsoft.com/office/powerpoint/2010/main" val="1942445374"/>
+      </p:ext>
+    </p:extLst>
+  </p:cSld>
+  <p:clrMapOvr>
+    <a:masterClrMapping/>
+  </p:clrMapOvr>
+  <p:timing>
+    <p:tnLst>
+      <p:par>
+        <p:cTn id="1" dur="indefinite" restart="never" nodeType="tmRoot">
+          <p:childTnLst>
+            <p:seq concurrent="1" nextAc="seek">
+              <p:cTn id="2" dur="indefinite" nodeType="mainSeq">
+                <p:childTnLst>
+                  <p:par>
+                    <p:cTn id="3" fill="hold">
+                      <p:stCondLst>
+                        <p:cond delay="indefinite"/>
+                      </p:stCondLst>
+                      <p:childTnLst>
+                        <p:par>
+                          <p:cTn id="4" fill="hold">
+                            <p:stCondLst>
+                              <p:cond delay="0"/>
+                            </p:stCondLst>
+                            <p:childTnLst>
+                              <p:par>
+                                <p:cTn id="5" presetID="1" presetClass="entr" presetSubtype="0" fill="hold" grpId="0" nodeType="clickEffect">
+                                  <p:stCondLst>
+                                    <p:cond delay="0"/>
+                                  </p:stCondLst>
+                                  <p:childTnLst>
+                                    <p:set>
+                                      <p:cBhvr>
+                                        <p:cTn id="6" dur="1" fill="hold">
+                                          <p:stCondLst>
+                                            <p:cond delay="0"/>
+                                          </p:stCondLst>
+                                        </p:cTn>
+                                        <p:tgtEl>
+                                          <p:spTgt spid="6"/>
+                                        </p:tgtEl>
+                                        <p:attrNameLst>
+                                          <p:attrName>style.visibility</p:attrName>
+                                        </p:attrNameLst>
+                                      </p:cBhvr>
+                                      <p:to>
+                                        <p:strVal val="visible"/>
+                                      </p:to>
+                                    </p:set>
+                                  </p:childTnLst>
+                                </p:cTn>
+                              </p:par>
+                            </p:childTnLst>
+                          </p:cTn>
+                        </p:par>
+                      </p:childTnLst>
+                    </p:cTn>
+                  </p:par>
+                  <p:par>
+                    <p:cTn id="7" fill="hold">
+                      <p:stCondLst>
+                        <p:cond delay="indefinite"/>
+                      </p:stCondLst>
+                      <p:childTnLst>
+                        <p:par>
+                          <p:cTn id="8" fill="hold">
+                            <p:stCondLst>
+                              <p:cond delay="0"/>
+                            </p:stCondLst>
+                            <p:childTnLst>
+                              <p:par>
+                                <p:cTn id="9" presetID="1" presetClass="exit" presetSubtype="0" fill="hold" grpId="1" nodeType="clickEffect">
+                                  <p:stCondLst>
+                                    <p:cond delay="0"/>
+                                  </p:stCondLst>
+                                  <p:childTnLst>
+                                    <p:set>
+                                      <p:cBhvr>
+                                        <p:cTn id="10" dur="1" fill="hold">
+                                          <p:stCondLst>
+                                            <p:cond delay="0"/>
+                                          </p:stCondLst>
+                                        </p:cTn>
+                                        <p:tgtEl>
+                                          <p:spTgt spid="6"/>
+                                        </p:tgtEl>
+                                        <p:attrNameLst>
+                                          <p:attrName>style.visibility</p:attrName>
+                                        </p:attrNameLst>
+                                      </p:cBhvr>
+                                      <p:to>
+                                        <p:strVal val="hidden"/>
+                                      </p:to>
+                                    </p:set>
+                                  </p:childTnLst>
+                                </p:cTn>
+                              </p:par>
+                            </p:childTnLst>
+                          </p:cTn>
+                        </p:par>
+                        <p:par>
+                          <p:cTn id="11" fill="hold">
+                            <p:stCondLst>
+                              <p:cond delay="0"/>
+                            </p:stCondLst>
+                            <p:childTnLst>
+                              <p:par>
+                                <p:cTn id="12" presetID="1" presetClass="entr" presetSubtype="0" fill="hold" nodeType="afterEffect">
+                                  <p:stCondLst>
+                                    <p:cond delay="0"/>
+                                  </p:stCondLst>
+                                  <p:childTnLst>
+                                    <p:set>
+                                      <p:cBhvr>
+                                        <p:cTn id="13" dur="1" fill="hold">
+                                          <p:stCondLst>
+                                            <p:cond delay="0"/>
+                                          </p:stCondLst>
+                                        </p:cTn>
+                                        <p:tgtEl>
+                                          <p:spTgt spid="2"/>
+                                        </p:tgtEl>
+                                        <p:attrNameLst>
+                                          <p:attrName>style.visibility</p:attrName>
+                                        </p:attrNameLst>
+                                      </p:cBhvr>
+                                      <p:to>
+                                        <p:strVal val="visible"/>
+                                      </p:to>
+                                    </p:set>
+                                  </p:childTnLst>
+                                </p:cTn>
+                              </p:par>
+                            </p:childTnLst>
+                          </p:cTn>
+                        </p:par>
+                        <p:par>
+                          <p:cTn id="14" fill="hold">
+                            <p:stCondLst>
+                              <p:cond delay="0"/>
+                            </p:stCondLst>
+                            <p:childTnLst>
+                              <p:par>
+                                <p:cTn id="15" presetID="1" presetClass="entr" presetSubtype="0" fill="hold" grpId="0" nodeType="afterEffect">
+                                  <p:stCondLst>
+                                    <p:cond delay="0"/>
+                                  </p:stCondLst>
+                                  <p:childTnLst>
+                                    <p:set>
+                                      <p:cBhvr>
+                                        <p:cTn id="16" dur="1" fill="hold">
+                                          <p:stCondLst>
+                                            <p:cond delay="0"/>
+                                          </p:stCondLst>
+                                        </p:cTn>
+                                        <p:tgtEl>
+                                          <p:spTgt spid="3"/>
+                                        </p:tgtEl>
+                                        <p:attrNameLst>
+                                          <p:attrName>style.visibility</p:attrName>
+                                        </p:attrNameLst>
+                                      </p:cBhvr>
+                                      <p:to>
+                                        <p:strVal val="visible"/>
+                                      </p:to>
+                                    </p:set>
+                                  </p:childTnLst>
+                                </p:cTn>
+                              </p:par>
+                            </p:childTnLst>
+                          </p:cTn>
+                        </p:par>
+                      </p:childTnLst>
+                    </p:cTn>
+                  </p:par>
+                  <p:par>
+                    <p:cTn id="17" fill="hold">
+                      <p:stCondLst>
+                        <p:cond delay="indefinite"/>
+                      </p:stCondLst>
+                      <p:childTnLst>
+                        <p:par>
+                          <p:cTn id="18" fill="hold">
+                            <p:stCondLst>
+                              <p:cond delay="0"/>
+                            </p:stCondLst>
+                            <p:childTnLst>
+                              <p:par>
+                                <p:cTn id="19" presetID="1" presetClass="entr" presetSubtype="0" fill="hold" grpId="0" nodeType="clickEffect">
+                                  <p:stCondLst>
+                                    <p:cond delay="0"/>
+                                  </p:stCondLst>
+                                  <p:childTnLst>
+                                    <p:set>
+                                      <p:cBhvr>
+                                        <p:cTn id="20" dur="1" fill="hold">
+                                          <p:stCondLst>
+                                            <p:cond delay="0"/>
+                                          </p:stCondLst>
+                                        </p:cTn>
+                                        <p:tgtEl>
+                                          <p:spTgt spid="9"/>
+                                        </p:tgtEl>
+                                        <p:attrNameLst>
+                                          <p:attrName>style.visibility</p:attrName>
+                                        </p:attrNameLst>
+                                      </p:cBhvr>
+                                      <p:to>
+                                        <p:strVal val="visible"/>
+                                      </p:to>
+                                    </p:set>
+                                  </p:childTnLst>
+                                </p:cTn>
+                              </p:par>
+                              <p:par>
+                                <p:cTn id="21" presetID="1" presetClass="entr" presetSubtype="0" fill="hold" grpId="0" nodeType="withEffect">
+                                  <p:stCondLst>
+                                    <p:cond delay="0"/>
+                                  </p:stCondLst>
+                                  <p:childTnLst>
+                                    <p:set>
+                                      <p:cBhvr>
+                                        <p:cTn id="22" dur="1" fill="hold">
+                                          <p:stCondLst>
+                                            <p:cond delay="0"/>
+                                          </p:stCondLst>
+                                        </p:cTn>
+                                        <p:tgtEl>
+                                          <p:spTgt spid="7"/>
+                                        </p:tgtEl>
+                                        <p:attrNameLst>
+                                          <p:attrName>style.visibility</p:attrName>
+                                        </p:attrNameLst>
+                                      </p:cBhvr>
+                                      <p:to>
+                                        <p:strVal val="visible"/>
+                                      </p:to>
+                                    </p:set>
+                                  </p:childTnLst>
+                                </p:cTn>
+                              </p:par>
+                            </p:childTnLst>
+                          </p:cTn>
+                        </p:par>
+                      </p:childTnLst>
+                    </p:cTn>
+                  </p:par>
+                </p:childTnLst>
+              </p:cTn>
+              <p:prevCondLst>
+                <p:cond evt="onPrev" delay="0">
+                  <p:tgtEl>
+                    <p:sldTgt/>
+                  </p:tgtEl>
+                </p:cond>
+              </p:prevCondLst>
+              <p:nextCondLst>
+                <p:cond evt="onNext" delay="0">
+                  <p:tgtEl>
+                    <p:sldTgt/>
+                  </p:tgtEl>
+                </p:cond>
+              </p:nextCondLst>
+            </p:seq>
+          </p:childTnLst>
+        </p:cTn>
+      </p:par>
+    </p:tnLst>
+    <p:bldLst>
+      <p:bldP spid="6" grpId="0"/>
+      <p:bldP spid="6" grpId="1"/>
+      <p:bldP spid="3" grpId="0"/>
+      <p:bldP spid="9" grpId="0"/>
+      <p:bldP spid="7" grpId="0" animBg="1"/>
+    </p:bldLst>
+  </p:timing>
+</p:sld>
+</file>
+
+<file path=ppt/slides/slide13.xml><?xml version="1.0" encoding="utf-8"?>
+<p:sld xmlns:a="http://schemas.openxmlformats.org/drawingml/2006/main" xmlns:r="http://schemas.openxmlformats.org/officeDocument/2006/relationships" xmlns:p="http://schemas.openxmlformats.org/presentationml/2006/main">
+  <p:cSld>
+    <p:spTree>
+      <p:nvGrpSpPr>
+        <p:cNvPr id="1" name=""/>
+        <p:cNvGrpSpPr/>
+        <p:nvPr/>
+      </p:nvGrpSpPr>
+      <p:grpSpPr>
+        <a:xfrm>
+          <a:off x="0" y="0"/>
+          <a:ext cx="0" cy="0"/>
+          <a:chOff x="0" y="0"/>
+          <a:chExt cx="0" cy="0"/>
+        </a:xfrm>
+      </p:grpSpPr>
+      <p:sp>
+        <p:nvSpPr>
+          <p:cNvPr id="12" name="Rectangle 11"/>
+          <p:cNvSpPr/>
+          <p:nvPr/>
+        </p:nvSpPr>
+        <p:spPr>
+          <a:xfrm>
+            <a:off x="457199" y="0"/>
+            <a:ext cx="10839451" cy="628649"/>
+          </a:xfrm>
+          <a:prstGeom prst="rect">
+            <a:avLst/>
+          </a:prstGeom>
+          <a:gradFill flip="none" rotWithShape="1">
+            <a:gsLst>
+              <a:gs pos="52000">
+                <a:schemeClr val="accent1">
+                  <a:lumMod val="60000"/>
+                  <a:lumOff val="40000"/>
+                </a:schemeClr>
+              </a:gs>
+              <a:gs pos="100000">
+                <a:schemeClr val="tx2">
+                  <a:lumMod val="60000"/>
+                  <a:lumOff val="40000"/>
+                </a:schemeClr>
+              </a:gs>
+              <a:gs pos="0">
+                <a:schemeClr val="accent1"/>
+              </a:gs>
+            </a:gsLst>
+            <a:lin ang="10800000" scaled="1"/>
+            <a:tileRect/>
+          </a:gradFill>
+          <a:ln>
+            <a:noFill/>
+          </a:ln>
+        </p:spPr>
+        <p:style>
+          <a:lnRef idx="2">
+            <a:schemeClr val="accent1">
+              <a:shade val="50000"/>
+            </a:schemeClr>
+          </a:lnRef>
+          <a:fillRef idx="1">
+            <a:schemeClr val="accent1"/>
+          </a:fillRef>
+          <a:effectRef idx="0">
+            <a:schemeClr val="accent1"/>
+          </a:effectRef>
+          <a:fontRef idx="minor">
+            <a:schemeClr val="lt1"/>
+          </a:fontRef>
+        </p:style>
+        <p:txBody>
+          <a:bodyPr rtlCol="0" anchor="ctr"/>
+          <a:lstStyle/>
+          <a:p>
+            <a:pPr algn="ctr"/>
+            <a:endParaRPr lang="en-US" sz="3200"/>
+          </a:p>
+        </p:txBody>
+      </p:sp>
+      <p:pic>
+        <p:nvPicPr>
+          <p:cNvPr id="10" name="Picture 9"/>
+          <p:cNvPicPr>
+            <a:picLocks noChangeAspect="1"/>
+          </p:cNvPicPr>
+          <p:nvPr/>
+        </p:nvPicPr>
+        <p:blipFill>
+          <a:blip r:embed="rId2" cstate="print">
+            <a:extLst>
+              <a:ext uri="{28A0092B-C50C-407E-A947-70E740481C1C}">
+                <a14:useLocalDpi xmlns:a14="http://schemas.microsoft.com/office/drawing/2010/main" val="0"/>
+              </a:ext>
+            </a:extLst>
+          </a:blip>
+          <a:stretch>
+            <a:fillRect/>
+          </a:stretch>
+        </p:blipFill>
+        <p:spPr>
+          <a:xfrm>
+            <a:off x="11325199" y="116740"/>
+            <a:ext cx="866801" cy="731428"/>
+          </a:xfrm>
+          <a:prstGeom prst="rect">
+            <a:avLst/>
+          </a:prstGeom>
+        </p:spPr>
+      </p:pic>
+      <p:sp>
+        <p:nvSpPr>
+          <p:cNvPr id="4" name="TextBox 3"/>
+          <p:cNvSpPr txBox="1"/>
+          <p:nvPr/>
+        </p:nvSpPr>
+        <p:spPr>
+          <a:xfrm>
+            <a:off x="1340642" y="0"/>
+            <a:ext cx="9072564" cy="584775"/>
+          </a:xfrm>
+          <a:prstGeom prst="rect">
+            <a:avLst/>
+          </a:prstGeom>
+          <a:noFill/>
+        </p:spPr>
+        <p:txBody>
+          <a:bodyPr wrap="square" rtlCol="0">
+            <a:spAutoFit/>
+          </a:bodyPr>
+          <a:lstStyle/>
+          <a:p>
+            <a:pPr algn="ctr"/>
+            <a:r>
+              <a:rPr lang="en-US" sz="3200" dirty="0" smtClean="0"/>
+              <a:t>The BROP gadget</a:t>
+            </a:r>
+            <a:endParaRPr lang="en-US" sz="3200" dirty="0"/>
+          </a:p>
+        </p:txBody>
+      </p:sp>
+    </p:spTree>
+    <p:extLst>
+      <p:ext uri="{BB962C8B-B14F-4D97-AF65-F5344CB8AC3E}">
+        <p14:creationId xmlns:p14="http://schemas.microsoft.com/office/powerpoint/2010/main" val="3741726166"/>
       </p:ext>
     </p:extLst>
   </p:cSld>
@@ -4506,7 +5674,269 @@
 </p:sld>
 </file>
 
-<file path=ppt/slides/slide13.xml><?xml version="1.0" encoding="utf-8"?>
+<file path=ppt/slides/slide14.xml><?xml version="1.0" encoding="utf-8"?>
+<p:sld xmlns:a="http://schemas.openxmlformats.org/drawingml/2006/main" xmlns:r="http://schemas.openxmlformats.org/officeDocument/2006/relationships" xmlns:p="http://schemas.openxmlformats.org/presentationml/2006/main">
+  <p:cSld>
+    <p:spTree>
+      <p:nvGrpSpPr>
+        <p:cNvPr id="1" name=""/>
+        <p:cNvGrpSpPr/>
+        <p:nvPr/>
+      </p:nvGrpSpPr>
+      <p:grpSpPr>
+        <a:xfrm>
+          <a:off x="0" y="0"/>
+          <a:ext cx="0" cy="0"/>
+          <a:chOff x="0" y="0"/>
+          <a:chExt cx="0" cy="0"/>
+        </a:xfrm>
+      </p:grpSpPr>
+      <p:sp>
+        <p:nvSpPr>
+          <p:cNvPr id="12" name="Rectangle 11"/>
+          <p:cNvSpPr/>
+          <p:nvPr/>
+        </p:nvSpPr>
+        <p:spPr>
+          <a:xfrm>
+            <a:off x="457199" y="0"/>
+            <a:ext cx="10839451" cy="628649"/>
+          </a:xfrm>
+          <a:prstGeom prst="rect">
+            <a:avLst/>
+          </a:prstGeom>
+          <a:gradFill flip="none" rotWithShape="1">
+            <a:gsLst>
+              <a:gs pos="52000">
+                <a:schemeClr val="accent1">
+                  <a:lumMod val="60000"/>
+                  <a:lumOff val="40000"/>
+                </a:schemeClr>
+              </a:gs>
+              <a:gs pos="100000">
+                <a:schemeClr val="tx2">
+                  <a:lumMod val="60000"/>
+                  <a:lumOff val="40000"/>
+                </a:schemeClr>
+              </a:gs>
+              <a:gs pos="0">
+                <a:schemeClr val="accent1"/>
+              </a:gs>
+            </a:gsLst>
+            <a:lin ang="10800000" scaled="1"/>
+            <a:tileRect/>
+          </a:gradFill>
+          <a:ln>
+            <a:noFill/>
+          </a:ln>
+        </p:spPr>
+        <p:style>
+          <a:lnRef idx="2">
+            <a:schemeClr val="accent1">
+              <a:shade val="50000"/>
+            </a:schemeClr>
+          </a:lnRef>
+          <a:fillRef idx="1">
+            <a:schemeClr val="accent1"/>
+          </a:fillRef>
+          <a:effectRef idx="0">
+            <a:schemeClr val="accent1"/>
+          </a:effectRef>
+          <a:fontRef idx="minor">
+            <a:schemeClr val="lt1"/>
+          </a:fontRef>
+        </p:style>
+        <p:txBody>
+          <a:bodyPr rtlCol="0" anchor="ctr"/>
+          <a:lstStyle/>
+          <a:p>
+            <a:pPr algn="ctr"/>
+            <a:endParaRPr lang="en-US" sz="3200"/>
+          </a:p>
+        </p:txBody>
+      </p:sp>
+      <p:pic>
+        <p:nvPicPr>
+          <p:cNvPr id="10" name="Picture 9"/>
+          <p:cNvPicPr>
+            <a:picLocks noChangeAspect="1"/>
+          </p:cNvPicPr>
+          <p:nvPr/>
+        </p:nvPicPr>
+        <p:blipFill>
+          <a:blip r:embed="rId2" cstate="print">
+            <a:extLst>
+              <a:ext uri="{28A0092B-C50C-407E-A947-70E740481C1C}">
+                <a14:useLocalDpi xmlns:a14="http://schemas.microsoft.com/office/drawing/2010/main" val="0"/>
+              </a:ext>
+            </a:extLst>
+          </a:blip>
+          <a:stretch>
+            <a:fillRect/>
+          </a:stretch>
+        </p:blipFill>
+        <p:spPr>
+          <a:xfrm>
+            <a:off x="11325199" y="116740"/>
+            <a:ext cx="866801" cy="731428"/>
+          </a:xfrm>
+          <a:prstGeom prst="rect">
+            <a:avLst/>
+          </a:prstGeom>
+        </p:spPr>
+      </p:pic>
+    </p:spTree>
+    <p:extLst>
+      <p:ext uri="{BB962C8B-B14F-4D97-AF65-F5344CB8AC3E}">
+        <p14:creationId xmlns:p14="http://schemas.microsoft.com/office/powerpoint/2010/main" val="3953935316"/>
+      </p:ext>
+    </p:extLst>
+  </p:cSld>
+  <p:clrMapOvr>
+    <a:masterClrMapping/>
+  </p:clrMapOvr>
+  <p:timing>
+    <p:tnLst>
+      <p:par>
+        <p:cTn id="1" dur="indefinite" restart="never" nodeType="tmRoot"/>
+      </p:par>
+    </p:tnLst>
+  </p:timing>
+</p:sld>
+</file>
+
+<file path=ppt/slides/slide15.xml><?xml version="1.0" encoding="utf-8"?>
+<p:sld xmlns:a="http://schemas.openxmlformats.org/drawingml/2006/main" xmlns:r="http://schemas.openxmlformats.org/officeDocument/2006/relationships" xmlns:p="http://schemas.openxmlformats.org/presentationml/2006/main">
+  <p:cSld>
+    <p:spTree>
+      <p:nvGrpSpPr>
+        <p:cNvPr id="1" name=""/>
+        <p:cNvGrpSpPr/>
+        <p:nvPr/>
+      </p:nvGrpSpPr>
+      <p:grpSpPr>
+        <a:xfrm>
+          <a:off x="0" y="0"/>
+          <a:ext cx="0" cy="0"/>
+          <a:chOff x="0" y="0"/>
+          <a:chExt cx="0" cy="0"/>
+        </a:xfrm>
+      </p:grpSpPr>
+      <p:sp>
+        <p:nvSpPr>
+          <p:cNvPr id="12" name="Rectangle 11"/>
+          <p:cNvSpPr/>
+          <p:nvPr/>
+        </p:nvSpPr>
+        <p:spPr>
+          <a:xfrm>
+            <a:off x="457199" y="0"/>
+            <a:ext cx="10839451" cy="628649"/>
+          </a:xfrm>
+          <a:prstGeom prst="rect">
+            <a:avLst/>
+          </a:prstGeom>
+          <a:gradFill flip="none" rotWithShape="1">
+            <a:gsLst>
+              <a:gs pos="52000">
+                <a:schemeClr val="accent1">
+                  <a:lumMod val="60000"/>
+                  <a:lumOff val="40000"/>
+                </a:schemeClr>
+              </a:gs>
+              <a:gs pos="100000">
+                <a:schemeClr val="tx2">
+                  <a:lumMod val="60000"/>
+                  <a:lumOff val="40000"/>
+                </a:schemeClr>
+              </a:gs>
+              <a:gs pos="0">
+                <a:schemeClr val="accent1"/>
+              </a:gs>
+            </a:gsLst>
+            <a:lin ang="10800000" scaled="1"/>
+            <a:tileRect/>
+          </a:gradFill>
+          <a:ln>
+            <a:noFill/>
+          </a:ln>
+        </p:spPr>
+        <p:style>
+          <a:lnRef idx="2">
+            <a:schemeClr val="accent1">
+              <a:shade val="50000"/>
+            </a:schemeClr>
+          </a:lnRef>
+          <a:fillRef idx="1">
+            <a:schemeClr val="accent1"/>
+          </a:fillRef>
+          <a:effectRef idx="0">
+            <a:schemeClr val="accent1"/>
+          </a:effectRef>
+          <a:fontRef idx="minor">
+            <a:schemeClr val="lt1"/>
+          </a:fontRef>
+        </p:style>
+        <p:txBody>
+          <a:bodyPr rtlCol="0" anchor="ctr"/>
+          <a:lstStyle/>
+          <a:p>
+            <a:pPr algn="ctr"/>
+            <a:endParaRPr lang="en-US" sz="3200"/>
+          </a:p>
+        </p:txBody>
+      </p:sp>
+      <p:pic>
+        <p:nvPicPr>
+          <p:cNvPr id="10" name="Picture 9"/>
+          <p:cNvPicPr>
+            <a:picLocks noChangeAspect="1"/>
+          </p:cNvPicPr>
+          <p:nvPr/>
+        </p:nvPicPr>
+        <p:blipFill>
+          <a:blip r:embed="rId2" cstate="print">
+            <a:extLst>
+              <a:ext uri="{28A0092B-C50C-407E-A947-70E740481C1C}">
+                <a14:useLocalDpi xmlns:a14="http://schemas.microsoft.com/office/drawing/2010/main" val="0"/>
+              </a:ext>
+            </a:extLst>
+          </a:blip>
+          <a:stretch>
+            <a:fillRect/>
+          </a:stretch>
+        </p:blipFill>
+        <p:spPr>
+          <a:xfrm>
+            <a:off x="11325199" y="116740"/>
+            <a:ext cx="866801" cy="731428"/>
+          </a:xfrm>
+          <a:prstGeom prst="rect">
+            <a:avLst/>
+          </a:prstGeom>
+        </p:spPr>
+      </p:pic>
+    </p:spTree>
+    <p:extLst>
+      <p:ext uri="{BB962C8B-B14F-4D97-AF65-F5344CB8AC3E}">
+        <p14:creationId xmlns:p14="http://schemas.microsoft.com/office/powerpoint/2010/main" val="850396411"/>
+      </p:ext>
+    </p:extLst>
+  </p:cSld>
+  <p:clrMapOvr>
+    <a:masterClrMapping/>
+  </p:clrMapOvr>
+  <p:timing>
+    <p:tnLst>
+      <p:par>
+        <p:cTn id="1" dur="indefinite" restart="never" nodeType="tmRoot"/>
+      </p:par>
+    </p:tnLst>
+  </p:timing>
+</p:sld>
+</file>
+
+<file path=ppt/slides/slide16.xml><?xml version="1.0" encoding="utf-8"?>
 <p:sld xmlns:a="http://schemas.openxmlformats.org/drawingml/2006/main" xmlns:r="http://schemas.openxmlformats.org/officeDocument/2006/relationships" xmlns:p="http://schemas.openxmlformats.org/presentationml/2006/main">
   <p:cSld>
     <p:spTree>
@@ -4900,11 +6330,11 @@
   <p:clrMapOvr>
     <a:masterClrMapping/>
   </p:clrMapOvr>
-  <mc:AlternateContent xmlns:mc="http://schemas.openxmlformats.org/markup-compatibility/2006">
-    <mc:Choice xmlns:p14="http://schemas.microsoft.com/office/powerpoint/2010/main" Requires="p14">
+  <mc:AlternateContent xmlns:mc="http://schemas.openxmlformats.org/markup-compatibility/2006" xmlns:p14="http://schemas.microsoft.com/office/powerpoint/2010/main">
+    <mc:Choice Requires="p14">
       <p:transition p14:dur="10"/>
     </mc:Choice>
-    <mc:Fallback>
+    <mc:Fallback xmlns="">
       <p:transition/>
     </mc:Fallback>
   </mc:AlternateContent>
@@ -5275,7 +6705,7 @@
         </p:nvSpPr>
         <p:spPr>
           <a:xfrm>
-            <a:off x="4497085" y="848168"/>
+            <a:off x="4521799" y="3500752"/>
             <a:ext cx="2759674" cy="369332"/>
           </a:xfrm>
           <a:prstGeom prst="rect">
@@ -6123,10 +7553,1940 @@
           </a:p>
         </p:txBody>
       </p:sp>
+      <p:sp>
+        <p:nvSpPr>
+          <p:cNvPr id="9" name="TextBox 8"/>
+          <p:cNvSpPr txBox="1"/>
+          <p:nvPr/>
+        </p:nvSpPr>
+        <p:spPr>
+          <a:xfrm>
+            <a:off x="4497087" y="3436422"/>
+            <a:ext cx="2759674" cy="369332"/>
+          </a:xfrm>
+          <a:prstGeom prst="rect">
+            <a:avLst/>
+          </a:prstGeom>
+          <a:noFill/>
+        </p:spPr>
+        <p:txBody>
+          <a:bodyPr wrap="square" rtlCol="0">
+            <a:spAutoFit/>
+          </a:bodyPr>
+          <a:lstStyle/>
+          <a:p>
+            <a:pPr algn="ctr"/>
+            <a:r>
+              <a:rPr lang="en-US" dirty="0" smtClean="0"/>
+              <a:t>[DEMO </a:t>
+            </a:r>
+            <a:r>
+              <a:rPr lang="en-US" dirty="0" smtClean="0"/>
+              <a:t>FMT]</a:t>
+            </a:r>
+            <a:endParaRPr lang="en-US" dirty="0"/>
+          </a:p>
+        </p:txBody>
+      </p:sp>
     </p:spTree>
     <p:extLst>
       <p:ext uri="{BB962C8B-B14F-4D97-AF65-F5344CB8AC3E}">
         <p14:creationId xmlns:p14="http://schemas.microsoft.com/office/powerpoint/2010/main" val="199772230"/>
+      </p:ext>
+    </p:extLst>
+  </p:cSld>
+  <p:clrMapOvr>
+    <a:masterClrMapping/>
+  </p:clrMapOvr>
+  <p:timing>
+    <p:tnLst>
+      <p:par>
+        <p:cTn id="1" dur="indefinite" restart="never" nodeType="tmRoot">
+          <p:childTnLst>
+            <p:seq concurrent="1" nextAc="seek">
+              <p:cTn id="2" dur="indefinite" nodeType="mainSeq">
+                <p:childTnLst>
+                  <p:par>
+                    <p:cTn id="3" fill="hold">
+                      <p:stCondLst>
+                        <p:cond delay="indefinite"/>
+                      </p:stCondLst>
+                      <p:childTnLst>
+                        <p:par>
+                          <p:cTn id="4" fill="hold">
+                            <p:stCondLst>
+                              <p:cond delay="0"/>
+                            </p:stCondLst>
+                            <p:childTnLst>
+                              <p:par>
+                                <p:cTn id="5" presetID="1" presetClass="entr" presetSubtype="0" fill="hold" grpId="0" nodeType="clickEffect">
+                                  <p:stCondLst>
+                                    <p:cond delay="0"/>
+                                  </p:stCondLst>
+                                  <p:childTnLst>
+                                    <p:set>
+                                      <p:cBhvr>
+                                        <p:cTn id="6" dur="1" fill="hold">
+                                          <p:stCondLst>
+                                            <p:cond delay="0"/>
+                                          </p:stCondLst>
+                                        </p:cTn>
+                                        <p:tgtEl>
+                                          <p:spTgt spid="5"/>
+                                        </p:tgtEl>
+                                        <p:attrNameLst>
+                                          <p:attrName>style.visibility</p:attrName>
+                                        </p:attrNameLst>
+                                      </p:cBhvr>
+                                      <p:to>
+                                        <p:strVal val="visible"/>
+                                      </p:to>
+                                    </p:set>
+                                  </p:childTnLst>
+                                </p:cTn>
+                              </p:par>
+                            </p:childTnLst>
+                          </p:cTn>
+                        </p:par>
+                      </p:childTnLst>
+                    </p:cTn>
+                  </p:par>
+                  <p:par>
+                    <p:cTn id="7" fill="hold">
+                      <p:stCondLst>
+                        <p:cond delay="indefinite"/>
+                      </p:stCondLst>
+                      <p:childTnLst>
+                        <p:par>
+                          <p:cTn id="8" fill="hold">
+                            <p:stCondLst>
+                              <p:cond delay="0"/>
+                            </p:stCondLst>
+                            <p:childTnLst>
+                              <p:par>
+                                <p:cTn id="9" presetID="1" presetClass="entr" presetSubtype="0" fill="hold" grpId="0" nodeType="clickEffect">
+                                  <p:stCondLst>
+                                    <p:cond delay="0"/>
+                                  </p:stCondLst>
+                                  <p:childTnLst>
+                                    <p:set>
+                                      <p:cBhvr>
+                                        <p:cTn id="10" dur="1" fill="hold">
+                                          <p:stCondLst>
+                                            <p:cond delay="0"/>
+                                          </p:stCondLst>
+                                        </p:cTn>
+                                        <p:tgtEl>
+                                          <p:spTgt spid="9"/>
+                                        </p:tgtEl>
+                                        <p:attrNameLst>
+                                          <p:attrName>style.visibility</p:attrName>
+                                        </p:attrNameLst>
+                                      </p:cBhvr>
+                                      <p:to>
+                                        <p:strVal val="visible"/>
+                                      </p:to>
+                                    </p:set>
+                                  </p:childTnLst>
+                                </p:cTn>
+                              </p:par>
+                            </p:childTnLst>
+                          </p:cTn>
+                        </p:par>
+                      </p:childTnLst>
+                    </p:cTn>
+                  </p:par>
+                  <p:par>
+                    <p:cTn id="11" fill="hold">
+                      <p:stCondLst>
+                        <p:cond delay="indefinite"/>
+                      </p:stCondLst>
+                      <p:childTnLst>
+                        <p:par>
+                          <p:cTn id="12" fill="hold">
+                            <p:stCondLst>
+                              <p:cond delay="0"/>
+                            </p:stCondLst>
+                            <p:childTnLst>
+                              <p:par>
+                                <p:cTn id="13" presetID="1" presetClass="exit" presetSubtype="0" fill="hold" grpId="1" nodeType="clickEffect">
+                                  <p:stCondLst>
+                                    <p:cond delay="0"/>
+                                  </p:stCondLst>
+                                  <p:childTnLst>
+                                    <p:set>
+                                      <p:cBhvr>
+                                        <p:cTn id="14" dur="1" fill="hold">
+                                          <p:stCondLst>
+                                            <p:cond delay="0"/>
+                                          </p:stCondLst>
+                                        </p:cTn>
+                                        <p:tgtEl>
+                                          <p:spTgt spid="9"/>
+                                        </p:tgtEl>
+                                        <p:attrNameLst>
+                                          <p:attrName>style.visibility</p:attrName>
+                                        </p:attrNameLst>
+                                      </p:cBhvr>
+                                      <p:to>
+                                        <p:strVal val="hidden"/>
+                                      </p:to>
+                                    </p:set>
+                                  </p:childTnLst>
+                                </p:cTn>
+                              </p:par>
+                            </p:childTnLst>
+                          </p:cTn>
+                        </p:par>
+                        <p:par>
+                          <p:cTn id="15" fill="hold">
+                            <p:stCondLst>
+                              <p:cond delay="0"/>
+                            </p:stCondLst>
+                            <p:childTnLst>
+                              <p:par>
+                                <p:cTn id="16" presetID="1" presetClass="entr" presetSubtype="0" fill="hold" nodeType="afterEffect">
+                                  <p:stCondLst>
+                                    <p:cond delay="0"/>
+                                  </p:stCondLst>
+                                  <p:childTnLst>
+                                    <p:set>
+                                      <p:cBhvr>
+                                        <p:cTn id="17" dur="1" fill="hold">
+                                          <p:stCondLst>
+                                            <p:cond delay="0"/>
+                                          </p:stCondLst>
+                                        </p:cTn>
+                                        <p:tgtEl>
+                                          <p:spTgt spid="2"/>
+                                        </p:tgtEl>
+                                        <p:attrNameLst>
+                                          <p:attrName>style.visibility</p:attrName>
+                                        </p:attrNameLst>
+                                      </p:cBhvr>
+                                      <p:to>
+                                        <p:strVal val="visible"/>
+                                      </p:to>
+                                    </p:set>
+                                  </p:childTnLst>
+                                </p:cTn>
+                              </p:par>
+                            </p:childTnLst>
+                          </p:cTn>
+                        </p:par>
+                        <p:par>
+                          <p:cTn id="18" fill="hold">
+                            <p:stCondLst>
+                              <p:cond delay="0"/>
+                            </p:stCondLst>
+                            <p:childTnLst>
+                              <p:par>
+                                <p:cTn id="19" presetID="1" presetClass="entr" presetSubtype="0" fill="hold" grpId="0" nodeType="afterEffect">
+                                  <p:stCondLst>
+                                    <p:cond delay="0"/>
+                                  </p:stCondLst>
+                                  <p:childTnLst>
+                                    <p:set>
+                                      <p:cBhvr>
+                                        <p:cTn id="20" dur="1" fill="hold">
+                                          <p:stCondLst>
+                                            <p:cond delay="0"/>
+                                          </p:stCondLst>
+                                        </p:cTn>
+                                        <p:tgtEl>
+                                          <p:spTgt spid="7"/>
+                                        </p:tgtEl>
+                                        <p:attrNameLst>
+                                          <p:attrName>style.visibility</p:attrName>
+                                        </p:attrNameLst>
+                                      </p:cBhvr>
+                                      <p:to>
+                                        <p:strVal val="visible"/>
+                                      </p:to>
+                                    </p:set>
+                                  </p:childTnLst>
+                                </p:cTn>
+                              </p:par>
+                            </p:childTnLst>
+                          </p:cTn>
+                        </p:par>
+                        <p:par>
+                          <p:cTn id="21" fill="hold">
+                            <p:stCondLst>
+                              <p:cond delay="0"/>
+                            </p:stCondLst>
+                            <p:childTnLst>
+                              <p:par>
+                                <p:cTn id="22" presetID="1" presetClass="entr" presetSubtype="0" fill="hold" grpId="0" nodeType="afterEffect">
+                                  <p:stCondLst>
+                                    <p:cond delay="0"/>
+                                  </p:stCondLst>
+                                  <p:childTnLst>
+                                    <p:set>
+                                      <p:cBhvr>
+                                        <p:cTn id="23" dur="1" fill="hold">
+                                          <p:stCondLst>
+                                            <p:cond delay="0"/>
+                                          </p:stCondLst>
+                                        </p:cTn>
+                                        <p:tgtEl>
+                                          <p:spTgt spid="3"/>
+                                        </p:tgtEl>
+                                        <p:attrNameLst>
+                                          <p:attrName>style.visibility</p:attrName>
+                                        </p:attrNameLst>
+                                      </p:cBhvr>
+                                      <p:to>
+                                        <p:strVal val="visible"/>
+                                      </p:to>
+                                    </p:set>
+                                  </p:childTnLst>
+                                </p:cTn>
+                              </p:par>
+                            </p:childTnLst>
+                          </p:cTn>
+                        </p:par>
+                      </p:childTnLst>
+                    </p:cTn>
+                  </p:par>
+                </p:childTnLst>
+              </p:cTn>
+              <p:prevCondLst>
+                <p:cond evt="onPrev" delay="0">
+                  <p:tgtEl>
+                    <p:sldTgt/>
+                  </p:tgtEl>
+                </p:cond>
+              </p:prevCondLst>
+              <p:nextCondLst>
+                <p:cond evt="onNext" delay="0">
+                  <p:tgtEl>
+                    <p:sldTgt/>
+                  </p:tgtEl>
+                </p:cond>
+              </p:nextCondLst>
+            </p:seq>
+          </p:childTnLst>
+        </p:cTn>
+      </p:par>
+    </p:tnLst>
+    <p:bldLst>
+      <p:bldP spid="5" grpId="0"/>
+      <p:bldP spid="7" grpId="0"/>
+      <p:bldP spid="3" grpId="0" animBg="1"/>
+      <p:bldP spid="9" grpId="0"/>
+      <p:bldP spid="9" grpId="1"/>
+    </p:bldLst>
+  </p:timing>
+</p:sld>
+</file>
+
+<file path=ppt/slides/slide6.xml><?xml version="1.0" encoding="utf-8"?>
+<p:sld xmlns:a="http://schemas.openxmlformats.org/drawingml/2006/main" xmlns:r="http://schemas.openxmlformats.org/officeDocument/2006/relationships" xmlns:p="http://schemas.openxmlformats.org/presentationml/2006/main">
+  <p:cSld>
+    <p:spTree>
+      <p:nvGrpSpPr>
+        <p:cNvPr id="1" name=""/>
+        <p:cNvGrpSpPr/>
+        <p:nvPr/>
+      </p:nvGrpSpPr>
+      <p:grpSpPr>
+        <a:xfrm>
+          <a:off x="0" y="0"/>
+          <a:ext cx="0" cy="0"/>
+          <a:chOff x="0" y="0"/>
+          <a:chExt cx="0" cy="0"/>
+        </a:xfrm>
+      </p:grpSpPr>
+      <p:sp>
+        <p:nvSpPr>
+          <p:cNvPr id="12" name="Rectangle 11"/>
+          <p:cNvSpPr/>
+          <p:nvPr/>
+        </p:nvSpPr>
+        <p:spPr>
+          <a:xfrm>
+            <a:off x="457199" y="0"/>
+            <a:ext cx="10839451" cy="628649"/>
+          </a:xfrm>
+          <a:prstGeom prst="rect">
+            <a:avLst/>
+          </a:prstGeom>
+          <a:gradFill flip="none" rotWithShape="1">
+            <a:gsLst>
+              <a:gs pos="52000">
+                <a:schemeClr val="accent1">
+                  <a:lumMod val="60000"/>
+                  <a:lumOff val="40000"/>
+                </a:schemeClr>
+              </a:gs>
+              <a:gs pos="100000">
+                <a:schemeClr val="tx2">
+                  <a:lumMod val="60000"/>
+                  <a:lumOff val="40000"/>
+                </a:schemeClr>
+              </a:gs>
+              <a:gs pos="0">
+                <a:schemeClr val="accent1"/>
+              </a:gs>
+            </a:gsLst>
+            <a:lin ang="10800000" scaled="1"/>
+            <a:tileRect/>
+          </a:gradFill>
+          <a:ln>
+            <a:noFill/>
+          </a:ln>
+        </p:spPr>
+        <p:style>
+          <a:lnRef idx="2">
+            <a:schemeClr val="accent1">
+              <a:shade val="50000"/>
+            </a:schemeClr>
+          </a:lnRef>
+          <a:fillRef idx="1">
+            <a:schemeClr val="accent1"/>
+          </a:fillRef>
+          <a:effectRef idx="0">
+            <a:schemeClr val="accent1"/>
+          </a:effectRef>
+          <a:fontRef idx="minor">
+            <a:schemeClr val="lt1"/>
+          </a:fontRef>
+        </p:style>
+        <p:txBody>
+          <a:bodyPr rtlCol="0" anchor="ctr"/>
+          <a:lstStyle/>
+          <a:p>
+            <a:pPr algn="ctr"/>
+            <a:endParaRPr lang="en-US" sz="3200"/>
+          </a:p>
+        </p:txBody>
+      </p:sp>
+      <p:pic>
+        <p:nvPicPr>
+          <p:cNvPr id="10" name="Picture 9"/>
+          <p:cNvPicPr>
+            <a:picLocks noChangeAspect="1"/>
+          </p:cNvPicPr>
+          <p:nvPr/>
+        </p:nvPicPr>
+        <p:blipFill>
+          <a:blip r:embed="rId2" cstate="print">
+            <a:extLst>
+              <a:ext uri="{28A0092B-C50C-407E-A947-70E740481C1C}">
+                <a14:useLocalDpi xmlns:a14="http://schemas.microsoft.com/office/drawing/2010/main" val="0"/>
+              </a:ext>
+            </a:extLst>
+          </a:blip>
+          <a:stretch>
+            <a:fillRect/>
+          </a:stretch>
+        </p:blipFill>
+        <p:spPr>
+          <a:xfrm>
+            <a:off x="11325199" y="116740"/>
+            <a:ext cx="866801" cy="731428"/>
+          </a:xfrm>
+          <a:prstGeom prst="rect">
+            <a:avLst/>
+          </a:prstGeom>
+        </p:spPr>
+      </p:pic>
+      <p:sp>
+        <p:nvSpPr>
+          <p:cNvPr id="4" name="TextBox 3"/>
+          <p:cNvSpPr txBox="1"/>
+          <p:nvPr/>
+        </p:nvSpPr>
+        <p:spPr>
+          <a:xfrm>
+            <a:off x="1443036" y="0"/>
+            <a:ext cx="9072564" cy="584775"/>
+          </a:xfrm>
+          <a:prstGeom prst="rect">
+            <a:avLst/>
+          </a:prstGeom>
+          <a:noFill/>
+        </p:spPr>
+        <p:txBody>
+          <a:bodyPr wrap="square" rtlCol="0">
+            <a:spAutoFit/>
+          </a:bodyPr>
+          <a:lstStyle/>
+          <a:p>
+            <a:pPr algn="ctr"/>
+            <a:r>
+              <a:rPr lang="en-US" sz="3200" dirty="0" smtClean="0"/>
+              <a:t>What’s a stack buffer overflow?</a:t>
+            </a:r>
+            <a:endParaRPr lang="en-US" sz="3200" dirty="0"/>
+          </a:p>
+        </p:txBody>
+      </p:sp>
+      <p:pic>
+        <p:nvPicPr>
+          <p:cNvPr id="2" name="Picture 1"/>
+          <p:cNvPicPr>
+            <a:picLocks noChangeAspect="1"/>
+          </p:cNvPicPr>
+          <p:nvPr/>
+        </p:nvPicPr>
+        <p:blipFill>
+          <a:blip r:embed="rId3">
+            <a:extLst>
+              <a:ext uri="{28A0092B-C50C-407E-A947-70E740481C1C}">
+                <a14:useLocalDpi xmlns:a14="http://schemas.microsoft.com/office/drawing/2010/main" val="0"/>
+              </a:ext>
+            </a:extLst>
+          </a:blip>
+          <a:stretch>
+            <a:fillRect/>
+          </a:stretch>
+        </p:blipFill>
+        <p:spPr>
+          <a:xfrm>
+            <a:off x="549679" y="1181100"/>
+            <a:ext cx="5470121" cy="5084662"/>
+          </a:xfrm>
+          <a:prstGeom prst="rect">
+            <a:avLst/>
+          </a:prstGeom>
+        </p:spPr>
+      </p:pic>
+      <p:sp>
+        <p:nvSpPr>
+          <p:cNvPr id="6" name="TextBox 5"/>
+          <p:cNvSpPr txBox="1"/>
+          <p:nvPr/>
+        </p:nvSpPr>
+        <p:spPr>
+          <a:xfrm>
+            <a:off x="6176963" y="1601955"/>
+            <a:ext cx="4676774" cy="646331"/>
+          </a:xfrm>
+          <a:prstGeom prst="rect">
+            <a:avLst/>
+          </a:prstGeom>
+          <a:noFill/>
+        </p:spPr>
+        <p:txBody>
+          <a:bodyPr wrap="square" rtlCol="0">
+            <a:spAutoFit/>
+          </a:bodyPr>
+          <a:lstStyle/>
+          <a:p>
+            <a:pPr marL="285750" indent="-285750">
+              <a:buFont typeface="Arial" panose="020B0604020202020204" pitchFamily="34" charset="0"/>
+              <a:buChar char="•"/>
+            </a:pPr>
+            <a:r>
+              <a:rPr lang="en-US" dirty="0" smtClean="0"/>
+              <a:t>Occurs when we do not check if the user input fits in the buffer it went in</a:t>
+            </a:r>
+            <a:endParaRPr lang="en-US" dirty="0"/>
+          </a:p>
+        </p:txBody>
+      </p:sp>
+      <p:sp>
+        <p:nvSpPr>
+          <p:cNvPr id="7" name="TextBox 6"/>
+          <p:cNvSpPr txBox="1"/>
+          <p:nvPr/>
+        </p:nvSpPr>
+        <p:spPr>
+          <a:xfrm>
+            <a:off x="6176963" y="2659926"/>
+            <a:ext cx="4878215" cy="646331"/>
+          </a:xfrm>
+          <a:prstGeom prst="rect">
+            <a:avLst/>
+          </a:prstGeom>
+          <a:noFill/>
+        </p:spPr>
+        <p:txBody>
+          <a:bodyPr wrap="square" rtlCol="0">
+            <a:spAutoFit/>
+          </a:bodyPr>
+          <a:lstStyle/>
+          <a:p>
+            <a:pPr marL="285750" indent="-285750">
+              <a:buFont typeface="Arial" panose="020B0604020202020204" pitchFamily="34" charset="0"/>
+              <a:buChar char="•"/>
+            </a:pPr>
+            <a:r>
+              <a:rPr lang="en-US" dirty="0" smtClean="0"/>
+              <a:t>If there is no protection such as canary, we can overwrite data behind the buffer</a:t>
+            </a:r>
+            <a:endParaRPr lang="en-US" dirty="0"/>
+          </a:p>
+        </p:txBody>
+      </p:sp>
+      <p:sp>
+        <p:nvSpPr>
+          <p:cNvPr id="8" name="TextBox 7"/>
+          <p:cNvSpPr txBox="1"/>
+          <p:nvPr/>
+        </p:nvSpPr>
+        <p:spPr>
+          <a:xfrm>
+            <a:off x="6176963" y="3717897"/>
+            <a:ext cx="4991100" cy="923330"/>
+          </a:xfrm>
+          <a:prstGeom prst="rect">
+            <a:avLst/>
+          </a:prstGeom>
+          <a:noFill/>
+        </p:spPr>
+        <p:txBody>
+          <a:bodyPr wrap="square" rtlCol="0">
+            <a:spAutoFit/>
+          </a:bodyPr>
+          <a:lstStyle/>
+          <a:p>
+            <a:pPr marL="285750" indent="-285750">
+              <a:buFont typeface="Arial" panose="020B0604020202020204" pitchFamily="34" charset="0"/>
+              <a:buChar char="•"/>
+            </a:pPr>
+            <a:r>
+              <a:rPr lang="en-US" dirty="0" smtClean="0"/>
+              <a:t>It means that we can take control of execution flow because the return address we jump on is located on the stack</a:t>
+            </a:r>
+            <a:endParaRPr lang="en-US" dirty="0"/>
+          </a:p>
+        </p:txBody>
+      </p:sp>
+      <p:sp>
+        <p:nvSpPr>
+          <p:cNvPr id="9" name="TextBox 8"/>
+          <p:cNvSpPr txBox="1"/>
+          <p:nvPr/>
+        </p:nvSpPr>
+        <p:spPr>
+          <a:xfrm>
+            <a:off x="6249237" y="5186763"/>
+            <a:ext cx="4532226" cy="461665"/>
+          </a:xfrm>
+          <a:prstGeom prst="rect">
+            <a:avLst/>
+          </a:prstGeom>
+          <a:noFill/>
+          <a:ln>
+            <a:solidFill>
+              <a:schemeClr val="tx1"/>
+            </a:solidFill>
+          </a:ln>
+        </p:spPr>
+        <p:txBody>
+          <a:bodyPr wrap="square" rtlCol="0">
+            <a:spAutoFit/>
+          </a:bodyPr>
+          <a:lstStyle/>
+          <a:p>
+            <a:r>
+              <a:rPr lang="en-US" sz="2400" dirty="0" smtClean="0"/>
+              <a:t>RET is equivalent to POP RIP</a:t>
+            </a:r>
+            <a:endParaRPr lang="en-US" sz="2400" dirty="0"/>
+          </a:p>
+        </p:txBody>
+      </p:sp>
+    </p:spTree>
+    <p:extLst>
+      <p:ext uri="{BB962C8B-B14F-4D97-AF65-F5344CB8AC3E}">
+        <p14:creationId xmlns:p14="http://schemas.microsoft.com/office/powerpoint/2010/main" val="3101180952"/>
+      </p:ext>
+    </p:extLst>
+  </p:cSld>
+  <p:clrMapOvr>
+    <a:masterClrMapping/>
+  </p:clrMapOvr>
+  <p:timing>
+    <p:tnLst>
+      <p:par>
+        <p:cTn id="1" dur="indefinite" restart="never" nodeType="tmRoot">
+          <p:childTnLst>
+            <p:seq concurrent="1" nextAc="seek">
+              <p:cTn id="2" dur="indefinite" nodeType="mainSeq">
+                <p:childTnLst>
+                  <p:par>
+                    <p:cTn id="3" fill="hold">
+                      <p:stCondLst>
+                        <p:cond delay="indefinite"/>
+                      </p:stCondLst>
+                      <p:childTnLst>
+                        <p:par>
+                          <p:cTn id="4" fill="hold">
+                            <p:stCondLst>
+                              <p:cond delay="0"/>
+                            </p:stCondLst>
+                            <p:childTnLst>
+                              <p:par>
+                                <p:cTn id="5" presetID="1" presetClass="entr" presetSubtype="0" fill="hold" nodeType="clickEffect">
+                                  <p:stCondLst>
+                                    <p:cond delay="0"/>
+                                  </p:stCondLst>
+                                  <p:childTnLst>
+                                    <p:set>
+                                      <p:cBhvr>
+                                        <p:cTn id="6" dur="1" fill="hold">
+                                          <p:stCondLst>
+                                            <p:cond delay="0"/>
+                                          </p:stCondLst>
+                                        </p:cTn>
+                                        <p:tgtEl>
+                                          <p:spTgt spid="2"/>
+                                        </p:tgtEl>
+                                        <p:attrNameLst>
+                                          <p:attrName>style.visibility</p:attrName>
+                                        </p:attrNameLst>
+                                      </p:cBhvr>
+                                      <p:to>
+                                        <p:strVal val="visible"/>
+                                      </p:to>
+                                    </p:set>
+                                  </p:childTnLst>
+                                </p:cTn>
+                              </p:par>
+                            </p:childTnLst>
+                          </p:cTn>
+                        </p:par>
+                      </p:childTnLst>
+                    </p:cTn>
+                  </p:par>
+                  <p:par>
+                    <p:cTn id="7" fill="hold">
+                      <p:stCondLst>
+                        <p:cond delay="indefinite"/>
+                      </p:stCondLst>
+                      <p:childTnLst>
+                        <p:par>
+                          <p:cTn id="8" fill="hold">
+                            <p:stCondLst>
+                              <p:cond delay="0"/>
+                            </p:stCondLst>
+                            <p:childTnLst>
+                              <p:par>
+                                <p:cTn id="9" presetID="1" presetClass="entr" presetSubtype="0" fill="hold" grpId="0" nodeType="clickEffect">
+                                  <p:stCondLst>
+                                    <p:cond delay="0"/>
+                                  </p:stCondLst>
+                                  <p:childTnLst>
+                                    <p:set>
+                                      <p:cBhvr>
+                                        <p:cTn id="10" dur="1" fill="hold">
+                                          <p:stCondLst>
+                                            <p:cond delay="0"/>
+                                          </p:stCondLst>
+                                        </p:cTn>
+                                        <p:tgtEl>
+                                          <p:spTgt spid="6"/>
+                                        </p:tgtEl>
+                                        <p:attrNameLst>
+                                          <p:attrName>style.visibility</p:attrName>
+                                        </p:attrNameLst>
+                                      </p:cBhvr>
+                                      <p:to>
+                                        <p:strVal val="visible"/>
+                                      </p:to>
+                                    </p:set>
+                                  </p:childTnLst>
+                                </p:cTn>
+                              </p:par>
+                            </p:childTnLst>
+                          </p:cTn>
+                        </p:par>
+                      </p:childTnLst>
+                    </p:cTn>
+                  </p:par>
+                  <p:par>
+                    <p:cTn id="11" fill="hold">
+                      <p:stCondLst>
+                        <p:cond delay="indefinite"/>
+                      </p:stCondLst>
+                      <p:childTnLst>
+                        <p:par>
+                          <p:cTn id="12" fill="hold">
+                            <p:stCondLst>
+                              <p:cond delay="0"/>
+                            </p:stCondLst>
+                            <p:childTnLst>
+                              <p:par>
+                                <p:cTn id="13" presetID="1" presetClass="entr" presetSubtype="0" fill="hold" grpId="0" nodeType="clickEffect">
+                                  <p:stCondLst>
+                                    <p:cond delay="0"/>
+                                  </p:stCondLst>
+                                  <p:childTnLst>
+                                    <p:set>
+                                      <p:cBhvr>
+                                        <p:cTn id="14" dur="1" fill="hold">
+                                          <p:stCondLst>
+                                            <p:cond delay="0"/>
+                                          </p:stCondLst>
+                                        </p:cTn>
+                                        <p:tgtEl>
+                                          <p:spTgt spid="7"/>
+                                        </p:tgtEl>
+                                        <p:attrNameLst>
+                                          <p:attrName>style.visibility</p:attrName>
+                                        </p:attrNameLst>
+                                      </p:cBhvr>
+                                      <p:to>
+                                        <p:strVal val="visible"/>
+                                      </p:to>
+                                    </p:set>
+                                  </p:childTnLst>
+                                </p:cTn>
+                              </p:par>
+                            </p:childTnLst>
+                          </p:cTn>
+                        </p:par>
+                      </p:childTnLst>
+                    </p:cTn>
+                  </p:par>
+                  <p:par>
+                    <p:cTn id="15" fill="hold">
+                      <p:stCondLst>
+                        <p:cond delay="indefinite"/>
+                      </p:stCondLst>
+                      <p:childTnLst>
+                        <p:par>
+                          <p:cTn id="16" fill="hold">
+                            <p:stCondLst>
+                              <p:cond delay="0"/>
+                            </p:stCondLst>
+                            <p:childTnLst>
+                              <p:par>
+                                <p:cTn id="17" presetID="1" presetClass="entr" presetSubtype="0" fill="hold" grpId="0" nodeType="clickEffect">
+                                  <p:stCondLst>
+                                    <p:cond delay="0"/>
+                                  </p:stCondLst>
+                                  <p:childTnLst>
+                                    <p:set>
+                                      <p:cBhvr>
+                                        <p:cTn id="18" dur="1" fill="hold">
+                                          <p:stCondLst>
+                                            <p:cond delay="0"/>
+                                          </p:stCondLst>
+                                        </p:cTn>
+                                        <p:tgtEl>
+                                          <p:spTgt spid="8"/>
+                                        </p:tgtEl>
+                                        <p:attrNameLst>
+                                          <p:attrName>style.visibility</p:attrName>
+                                        </p:attrNameLst>
+                                      </p:cBhvr>
+                                      <p:to>
+                                        <p:strVal val="visible"/>
+                                      </p:to>
+                                    </p:set>
+                                  </p:childTnLst>
+                                </p:cTn>
+                              </p:par>
+                              <p:par>
+                                <p:cTn id="19" presetID="1" presetClass="entr" presetSubtype="0" fill="hold" grpId="0" nodeType="withEffect">
+                                  <p:stCondLst>
+                                    <p:cond delay="0"/>
+                                  </p:stCondLst>
+                                  <p:childTnLst>
+                                    <p:set>
+                                      <p:cBhvr>
+                                        <p:cTn id="20" dur="1" fill="hold">
+                                          <p:stCondLst>
+                                            <p:cond delay="0"/>
+                                          </p:stCondLst>
+                                        </p:cTn>
+                                        <p:tgtEl>
+                                          <p:spTgt spid="9"/>
+                                        </p:tgtEl>
+                                        <p:attrNameLst>
+                                          <p:attrName>style.visibility</p:attrName>
+                                        </p:attrNameLst>
+                                      </p:cBhvr>
+                                      <p:to>
+                                        <p:strVal val="visible"/>
+                                      </p:to>
+                                    </p:set>
+                                  </p:childTnLst>
+                                </p:cTn>
+                              </p:par>
+                            </p:childTnLst>
+                          </p:cTn>
+                        </p:par>
+                      </p:childTnLst>
+                    </p:cTn>
+                  </p:par>
+                </p:childTnLst>
+              </p:cTn>
+              <p:prevCondLst>
+                <p:cond evt="onPrev" delay="0">
+                  <p:tgtEl>
+                    <p:sldTgt/>
+                  </p:tgtEl>
+                </p:cond>
+              </p:prevCondLst>
+              <p:nextCondLst>
+                <p:cond evt="onNext" delay="0">
+                  <p:tgtEl>
+                    <p:sldTgt/>
+                  </p:tgtEl>
+                </p:cond>
+              </p:nextCondLst>
+            </p:seq>
+          </p:childTnLst>
+        </p:cTn>
+      </p:par>
+    </p:tnLst>
+    <p:bldLst>
+      <p:bldP spid="6" grpId="0"/>
+      <p:bldP spid="7" grpId="0"/>
+      <p:bldP spid="8" grpId="0"/>
+      <p:bldP spid="9" grpId="0" animBg="1"/>
+    </p:bldLst>
+  </p:timing>
+</p:sld>
+</file>
+
+<file path=ppt/slides/slide7.xml><?xml version="1.0" encoding="utf-8"?>
+<p:sld xmlns:a="http://schemas.openxmlformats.org/drawingml/2006/main" xmlns:r="http://schemas.openxmlformats.org/officeDocument/2006/relationships" xmlns:p="http://schemas.openxmlformats.org/presentationml/2006/main">
+  <p:cSld>
+    <p:spTree>
+      <p:nvGrpSpPr>
+        <p:cNvPr id="1" name=""/>
+        <p:cNvGrpSpPr/>
+        <p:nvPr/>
+      </p:nvGrpSpPr>
+      <p:grpSpPr>
+        <a:xfrm>
+          <a:off x="0" y="0"/>
+          <a:ext cx="0" cy="0"/>
+          <a:chOff x="0" y="0"/>
+          <a:chExt cx="0" cy="0"/>
+        </a:xfrm>
+      </p:grpSpPr>
+      <p:sp>
+        <p:nvSpPr>
+          <p:cNvPr id="12" name="Rectangle 11"/>
+          <p:cNvSpPr/>
+          <p:nvPr/>
+        </p:nvSpPr>
+        <p:spPr>
+          <a:xfrm>
+            <a:off x="457199" y="0"/>
+            <a:ext cx="10839451" cy="628649"/>
+          </a:xfrm>
+          <a:prstGeom prst="rect">
+            <a:avLst/>
+          </a:prstGeom>
+          <a:gradFill flip="none" rotWithShape="1">
+            <a:gsLst>
+              <a:gs pos="52000">
+                <a:schemeClr val="accent1">
+                  <a:lumMod val="60000"/>
+                  <a:lumOff val="40000"/>
+                </a:schemeClr>
+              </a:gs>
+              <a:gs pos="100000">
+                <a:schemeClr val="tx2">
+                  <a:lumMod val="60000"/>
+                  <a:lumOff val="40000"/>
+                </a:schemeClr>
+              </a:gs>
+              <a:gs pos="0">
+                <a:schemeClr val="accent1"/>
+              </a:gs>
+            </a:gsLst>
+            <a:lin ang="10800000" scaled="1"/>
+            <a:tileRect/>
+          </a:gradFill>
+          <a:ln>
+            <a:noFill/>
+          </a:ln>
+        </p:spPr>
+        <p:style>
+          <a:lnRef idx="2">
+            <a:schemeClr val="accent1">
+              <a:shade val="50000"/>
+            </a:schemeClr>
+          </a:lnRef>
+          <a:fillRef idx="1">
+            <a:schemeClr val="accent1"/>
+          </a:fillRef>
+          <a:effectRef idx="0">
+            <a:schemeClr val="accent1"/>
+          </a:effectRef>
+          <a:fontRef idx="minor">
+            <a:schemeClr val="lt1"/>
+          </a:fontRef>
+        </p:style>
+        <p:txBody>
+          <a:bodyPr rtlCol="0" anchor="ctr"/>
+          <a:lstStyle/>
+          <a:p>
+            <a:pPr algn="ctr"/>
+            <a:endParaRPr lang="en-US" sz="3200"/>
+          </a:p>
+        </p:txBody>
+      </p:sp>
+      <p:pic>
+        <p:nvPicPr>
+          <p:cNvPr id="10" name="Picture 9"/>
+          <p:cNvPicPr>
+            <a:picLocks noChangeAspect="1"/>
+          </p:cNvPicPr>
+          <p:nvPr/>
+        </p:nvPicPr>
+        <p:blipFill>
+          <a:blip r:embed="rId2" cstate="print">
+            <a:extLst>
+              <a:ext uri="{28A0092B-C50C-407E-A947-70E740481C1C}">
+                <a14:useLocalDpi xmlns:a14="http://schemas.microsoft.com/office/drawing/2010/main" val="0"/>
+              </a:ext>
+            </a:extLst>
+          </a:blip>
+          <a:stretch>
+            <a:fillRect/>
+          </a:stretch>
+        </p:blipFill>
+        <p:spPr>
+          <a:xfrm>
+            <a:off x="11325199" y="116740"/>
+            <a:ext cx="866801" cy="731428"/>
+          </a:xfrm>
+          <a:prstGeom prst="rect">
+            <a:avLst/>
+          </a:prstGeom>
+        </p:spPr>
+      </p:pic>
+      <p:sp>
+        <p:nvSpPr>
+          <p:cNvPr id="5" name="TextBox 4"/>
+          <p:cNvSpPr txBox="1"/>
+          <p:nvPr/>
+        </p:nvSpPr>
+        <p:spPr>
+          <a:xfrm>
+            <a:off x="1340642" y="0"/>
+            <a:ext cx="9072564" cy="584775"/>
+          </a:xfrm>
+          <a:prstGeom prst="rect">
+            <a:avLst/>
+          </a:prstGeom>
+          <a:noFill/>
+        </p:spPr>
+        <p:txBody>
+          <a:bodyPr wrap="square" rtlCol="0">
+            <a:spAutoFit/>
+          </a:bodyPr>
+          <a:lstStyle/>
+          <a:p>
+            <a:pPr algn="ctr"/>
+            <a:r>
+              <a:rPr lang="en-US" sz="3200" dirty="0" smtClean="0"/>
+              <a:t>Recon</a:t>
+            </a:r>
+            <a:endParaRPr lang="en-US" sz="3200" dirty="0"/>
+          </a:p>
+        </p:txBody>
+      </p:sp>
+      <p:sp>
+        <p:nvSpPr>
+          <p:cNvPr id="6" name="TextBox 5"/>
+          <p:cNvSpPr txBox="1"/>
+          <p:nvPr/>
+        </p:nvSpPr>
+        <p:spPr>
+          <a:xfrm>
+            <a:off x="2894345" y="943825"/>
+            <a:ext cx="6748463" cy="1477328"/>
+          </a:xfrm>
+          <a:prstGeom prst="rect">
+            <a:avLst/>
+          </a:prstGeom>
+          <a:noFill/>
+        </p:spPr>
+        <p:txBody>
+          <a:bodyPr wrap="square" rtlCol="0">
+            <a:spAutoFit/>
+          </a:bodyPr>
+          <a:lstStyle/>
+          <a:p>
+            <a:pPr marL="285750" indent="-285750">
+              <a:buFont typeface="Arial" panose="020B0604020202020204" pitchFamily="34" charset="0"/>
+              <a:buChar char="•"/>
+            </a:pPr>
+            <a:r>
+              <a:rPr lang="en-US" dirty="0" smtClean="0"/>
+              <a:t>Increment input size until program crashes</a:t>
+            </a:r>
+          </a:p>
+          <a:p>
+            <a:pPr marL="285750" indent="-285750">
+              <a:buFont typeface="Arial" panose="020B0604020202020204" pitchFamily="34" charset="0"/>
+              <a:buChar char="•"/>
+            </a:pPr>
+            <a:endParaRPr lang="en-US" dirty="0"/>
+          </a:p>
+          <a:p>
+            <a:pPr marL="285750" indent="-285750">
+              <a:buFont typeface="Arial" panose="020B0604020202020204" pitchFamily="34" charset="0"/>
+              <a:buChar char="•"/>
+            </a:pPr>
+            <a:r>
+              <a:rPr lang="en-US" dirty="0"/>
+              <a:t>C</a:t>
+            </a:r>
+            <a:r>
+              <a:rPr lang="en-US" dirty="0" smtClean="0"/>
+              <a:t>heck the protections:</a:t>
+            </a:r>
+          </a:p>
+          <a:p>
+            <a:pPr marL="742950" lvl="1" indent="-285750">
+              <a:buFont typeface="Arial" panose="020B0604020202020204" pitchFamily="34" charset="0"/>
+              <a:buChar char="•"/>
+            </a:pPr>
+            <a:r>
+              <a:rPr lang="en-US" dirty="0" smtClean="0"/>
+              <a:t>on the binary (PIE, canary) </a:t>
+            </a:r>
+            <a:endParaRPr lang="en-US" dirty="0"/>
+          </a:p>
+          <a:p>
+            <a:pPr marL="742950" lvl="1" indent="-285750">
+              <a:buFont typeface="Arial" panose="020B0604020202020204" pitchFamily="34" charset="0"/>
+              <a:buChar char="•"/>
+            </a:pPr>
+            <a:r>
+              <a:rPr lang="en-US" dirty="0"/>
+              <a:t>o</a:t>
+            </a:r>
+            <a:r>
+              <a:rPr lang="en-US" dirty="0" smtClean="0"/>
+              <a:t>n the server (ASLR)</a:t>
+            </a:r>
+            <a:endParaRPr lang="en-US" dirty="0"/>
+          </a:p>
+        </p:txBody>
+      </p:sp>
+      <p:pic>
+        <p:nvPicPr>
+          <p:cNvPr id="2" name="Picture 1"/>
+          <p:cNvPicPr>
+            <a:picLocks noChangeAspect="1"/>
+          </p:cNvPicPr>
+          <p:nvPr/>
+        </p:nvPicPr>
+        <p:blipFill>
+          <a:blip r:embed="rId3">
+            <a:extLst>
+              <a:ext uri="{28A0092B-C50C-407E-A947-70E740481C1C}">
+                <a14:useLocalDpi xmlns:a14="http://schemas.microsoft.com/office/drawing/2010/main" val="0"/>
+              </a:ext>
+            </a:extLst>
+          </a:blip>
+          <a:stretch>
+            <a:fillRect/>
+          </a:stretch>
+        </p:blipFill>
+        <p:spPr>
+          <a:xfrm>
+            <a:off x="2282487" y="2672962"/>
+            <a:ext cx="7360321" cy="2566988"/>
+          </a:xfrm>
+          <a:prstGeom prst="rect">
+            <a:avLst/>
+          </a:prstGeom>
+        </p:spPr>
+      </p:pic>
+      <p:sp>
+        <p:nvSpPr>
+          <p:cNvPr id="8" name="TextBox 7"/>
+          <p:cNvSpPr txBox="1"/>
+          <p:nvPr/>
+        </p:nvSpPr>
+        <p:spPr>
+          <a:xfrm>
+            <a:off x="3731388" y="5555126"/>
+            <a:ext cx="5438802" cy="830997"/>
+          </a:xfrm>
+          <a:prstGeom prst="rect">
+            <a:avLst/>
+          </a:prstGeom>
+          <a:noFill/>
+        </p:spPr>
+        <p:txBody>
+          <a:bodyPr wrap="square" rtlCol="0">
+            <a:spAutoFit/>
+          </a:bodyPr>
+          <a:lstStyle/>
+          <a:p>
+            <a:r>
+              <a:rPr lang="en-US" sz="2400" dirty="0" smtClean="0"/>
+              <a:t>Program crashes after 40 bytes</a:t>
+            </a:r>
+          </a:p>
+          <a:p>
+            <a:r>
+              <a:rPr lang="en-US" sz="2400" dirty="0" smtClean="0"/>
+              <a:t>= (probably stack) buffer overflow</a:t>
+            </a:r>
+            <a:endParaRPr lang="en-US" sz="2400" dirty="0"/>
+          </a:p>
+        </p:txBody>
+      </p:sp>
+      <p:sp>
+        <p:nvSpPr>
+          <p:cNvPr id="9" name="Right Arrow 8"/>
+          <p:cNvSpPr/>
+          <p:nvPr/>
+        </p:nvSpPr>
+        <p:spPr>
+          <a:xfrm>
+            <a:off x="2368212" y="5648055"/>
+            <a:ext cx="885825" cy="645141"/>
+          </a:xfrm>
+          <a:prstGeom prst="rightArrow">
+            <a:avLst/>
+          </a:prstGeom>
+          <a:solidFill>
+            <a:schemeClr val="tx2">
+              <a:lumMod val="20000"/>
+              <a:lumOff val="80000"/>
+            </a:schemeClr>
+          </a:solidFill>
+          <a:ln>
+            <a:solidFill>
+              <a:schemeClr val="accent2"/>
+            </a:solidFill>
+          </a:ln>
+        </p:spPr>
+        <p:style>
+          <a:lnRef idx="2">
+            <a:schemeClr val="accent1">
+              <a:shade val="50000"/>
+            </a:schemeClr>
+          </a:lnRef>
+          <a:fillRef idx="1">
+            <a:schemeClr val="accent1"/>
+          </a:fillRef>
+          <a:effectRef idx="0">
+            <a:schemeClr val="accent1"/>
+          </a:effectRef>
+          <a:fontRef idx="minor">
+            <a:schemeClr val="lt1"/>
+          </a:fontRef>
+        </p:style>
+        <p:txBody>
+          <a:bodyPr rtlCol="0" anchor="ctr"/>
+          <a:lstStyle/>
+          <a:p>
+            <a:pPr algn="ctr"/>
+            <a:endParaRPr lang="en-US"/>
+          </a:p>
+        </p:txBody>
+      </p:sp>
+      <p:sp>
+        <p:nvSpPr>
+          <p:cNvPr id="11" name="TextBox 10"/>
+          <p:cNvSpPr txBox="1"/>
+          <p:nvPr/>
+        </p:nvSpPr>
+        <p:spPr>
+          <a:xfrm>
+            <a:off x="4497087" y="3436422"/>
+            <a:ext cx="2759674" cy="646331"/>
+          </a:xfrm>
+          <a:prstGeom prst="rect">
+            <a:avLst/>
+          </a:prstGeom>
+          <a:noFill/>
+        </p:spPr>
+        <p:txBody>
+          <a:bodyPr wrap="square" rtlCol="0">
+            <a:spAutoFit/>
+          </a:bodyPr>
+          <a:lstStyle/>
+          <a:p>
+            <a:pPr algn="ctr"/>
+            <a:r>
+              <a:rPr lang="en-US" dirty="0" smtClean="0"/>
+              <a:t>[DEMO </a:t>
+            </a:r>
+            <a:r>
+              <a:rPr lang="en-US" dirty="0" smtClean="0"/>
+              <a:t>PADDING + DEMO LEAKADDR]</a:t>
+            </a:r>
+            <a:endParaRPr lang="en-US" dirty="0"/>
+          </a:p>
+        </p:txBody>
+      </p:sp>
+    </p:spTree>
+    <p:extLst>
+      <p:ext uri="{BB962C8B-B14F-4D97-AF65-F5344CB8AC3E}">
+        <p14:creationId xmlns:p14="http://schemas.microsoft.com/office/powerpoint/2010/main" val="3301776107"/>
+      </p:ext>
+    </p:extLst>
+  </p:cSld>
+  <p:clrMapOvr>
+    <a:masterClrMapping/>
+  </p:clrMapOvr>
+  <p:timing>
+    <p:tnLst>
+      <p:par>
+        <p:cTn id="1" dur="indefinite" restart="never" nodeType="tmRoot">
+          <p:childTnLst>
+            <p:seq concurrent="1" nextAc="seek">
+              <p:cTn id="2" dur="indefinite" nodeType="mainSeq">
+                <p:childTnLst>
+                  <p:par>
+                    <p:cTn id="3" fill="hold">
+                      <p:stCondLst>
+                        <p:cond delay="indefinite"/>
+                      </p:stCondLst>
+                      <p:childTnLst>
+                        <p:par>
+                          <p:cTn id="4" fill="hold">
+                            <p:stCondLst>
+                              <p:cond delay="0"/>
+                            </p:stCondLst>
+                            <p:childTnLst>
+                              <p:par>
+                                <p:cTn id="5" presetID="1" presetClass="entr" presetSubtype="0" fill="hold" grpId="0" nodeType="clickEffect">
+                                  <p:stCondLst>
+                                    <p:cond delay="0"/>
+                                  </p:stCondLst>
+                                  <p:childTnLst>
+                                    <p:set>
+                                      <p:cBhvr>
+                                        <p:cTn id="6" dur="1" fill="hold">
+                                          <p:stCondLst>
+                                            <p:cond delay="0"/>
+                                          </p:stCondLst>
+                                        </p:cTn>
+                                        <p:tgtEl>
+                                          <p:spTgt spid="6"/>
+                                        </p:tgtEl>
+                                        <p:attrNameLst>
+                                          <p:attrName>style.visibility</p:attrName>
+                                        </p:attrNameLst>
+                                      </p:cBhvr>
+                                      <p:to>
+                                        <p:strVal val="visible"/>
+                                      </p:to>
+                                    </p:set>
+                                  </p:childTnLst>
+                                </p:cTn>
+                              </p:par>
+                            </p:childTnLst>
+                          </p:cTn>
+                        </p:par>
+                      </p:childTnLst>
+                    </p:cTn>
+                  </p:par>
+                  <p:par>
+                    <p:cTn id="7" fill="hold">
+                      <p:stCondLst>
+                        <p:cond delay="indefinite"/>
+                      </p:stCondLst>
+                      <p:childTnLst>
+                        <p:par>
+                          <p:cTn id="8" fill="hold">
+                            <p:stCondLst>
+                              <p:cond delay="0"/>
+                            </p:stCondLst>
+                            <p:childTnLst>
+                              <p:par>
+                                <p:cTn id="9" presetID="1" presetClass="entr" presetSubtype="0" fill="hold" grpId="0" nodeType="clickEffect">
+                                  <p:stCondLst>
+                                    <p:cond delay="0"/>
+                                  </p:stCondLst>
+                                  <p:childTnLst>
+                                    <p:set>
+                                      <p:cBhvr>
+                                        <p:cTn id="10" dur="1" fill="hold">
+                                          <p:stCondLst>
+                                            <p:cond delay="0"/>
+                                          </p:stCondLst>
+                                        </p:cTn>
+                                        <p:tgtEl>
+                                          <p:spTgt spid="11"/>
+                                        </p:tgtEl>
+                                        <p:attrNameLst>
+                                          <p:attrName>style.visibility</p:attrName>
+                                        </p:attrNameLst>
+                                      </p:cBhvr>
+                                      <p:to>
+                                        <p:strVal val="visible"/>
+                                      </p:to>
+                                    </p:set>
+                                  </p:childTnLst>
+                                </p:cTn>
+                              </p:par>
+                            </p:childTnLst>
+                          </p:cTn>
+                        </p:par>
+                      </p:childTnLst>
+                    </p:cTn>
+                  </p:par>
+                  <p:par>
+                    <p:cTn id="11" fill="hold">
+                      <p:stCondLst>
+                        <p:cond delay="indefinite"/>
+                      </p:stCondLst>
+                      <p:childTnLst>
+                        <p:par>
+                          <p:cTn id="12" fill="hold">
+                            <p:stCondLst>
+                              <p:cond delay="0"/>
+                            </p:stCondLst>
+                            <p:childTnLst>
+                              <p:par>
+                                <p:cTn id="13" presetID="1" presetClass="exit" presetSubtype="0" fill="hold" grpId="1" nodeType="clickEffect">
+                                  <p:stCondLst>
+                                    <p:cond delay="0"/>
+                                  </p:stCondLst>
+                                  <p:childTnLst>
+                                    <p:set>
+                                      <p:cBhvr>
+                                        <p:cTn id="14" dur="1" fill="hold">
+                                          <p:stCondLst>
+                                            <p:cond delay="0"/>
+                                          </p:stCondLst>
+                                        </p:cTn>
+                                        <p:tgtEl>
+                                          <p:spTgt spid="11"/>
+                                        </p:tgtEl>
+                                        <p:attrNameLst>
+                                          <p:attrName>style.visibility</p:attrName>
+                                        </p:attrNameLst>
+                                      </p:cBhvr>
+                                      <p:to>
+                                        <p:strVal val="hidden"/>
+                                      </p:to>
+                                    </p:set>
+                                  </p:childTnLst>
+                                </p:cTn>
+                              </p:par>
+                            </p:childTnLst>
+                          </p:cTn>
+                        </p:par>
+                        <p:par>
+                          <p:cTn id="15" fill="hold">
+                            <p:stCondLst>
+                              <p:cond delay="0"/>
+                            </p:stCondLst>
+                            <p:childTnLst>
+                              <p:par>
+                                <p:cTn id="16" presetID="1" presetClass="entr" presetSubtype="0" fill="hold" nodeType="afterEffect">
+                                  <p:stCondLst>
+                                    <p:cond delay="0"/>
+                                  </p:stCondLst>
+                                  <p:childTnLst>
+                                    <p:set>
+                                      <p:cBhvr>
+                                        <p:cTn id="17" dur="1" fill="hold">
+                                          <p:stCondLst>
+                                            <p:cond delay="0"/>
+                                          </p:stCondLst>
+                                        </p:cTn>
+                                        <p:tgtEl>
+                                          <p:spTgt spid="2"/>
+                                        </p:tgtEl>
+                                        <p:attrNameLst>
+                                          <p:attrName>style.visibility</p:attrName>
+                                        </p:attrNameLst>
+                                      </p:cBhvr>
+                                      <p:to>
+                                        <p:strVal val="visible"/>
+                                      </p:to>
+                                    </p:set>
+                                  </p:childTnLst>
+                                </p:cTn>
+                              </p:par>
+                            </p:childTnLst>
+                          </p:cTn>
+                        </p:par>
+                        <p:par>
+                          <p:cTn id="18" fill="hold">
+                            <p:stCondLst>
+                              <p:cond delay="0"/>
+                            </p:stCondLst>
+                            <p:childTnLst>
+                              <p:par>
+                                <p:cTn id="19" presetID="1" presetClass="entr" presetSubtype="0" fill="hold" grpId="0" nodeType="afterEffect">
+                                  <p:stCondLst>
+                                    <p:cond delay="0"/>
+                                  </p:stCondLst>
+                                  <p:childTnLst>
+                                    <p:set>
+                                      <p:cBhvr>
+                                        <p:cTn id="20" dur="1" fill="hold">
+                                          <p:stCondLst>
+                                            <p:cond delay="0"/>
+                                          </p:stCondLst>
+                                        </p:cTn>
+                                        <p:tgtEl>
+                                          <p:spTgt spid="8"/>
+                                        </p:tgtEl>
+                                        <p:attrNameLst>
+                                          <p:attrName>style.visibility</p:attrName>
+                                        </p:attrNameLst>
+                                      </p:cBhvr>
+                                      <p:to>
+                                        <p:strVal val="visible"/>
+                                      </p:to>
+                                    </p:set>
+                                  </p:childTnLst>
+                                </p:cTn>
+                              </p:par>
+                            </p:childTnLst>
+                          </p:cTn>
+                        </p:par>
+                        <p:par>
+                          <p:cTn id="21" fill="hold">
+                            <p:stCondLst>
+                              <p:cond delay="0"/>
+                            </p:stCondLst>
+                            <p:childTnLst>
+                              <p:par>
+                                <p:cTn id="22" presetID="1" presetClass="entr" presetSubtype="0" fill="hold" grpId="0" nodeType="afterEffect">
+                                  <p:stCondLst>
+                                    <p:cond delay="0"/>
+                                  </p:stCondLst>
+                                  <p:childTnLst>
+                                    <p:set>
+                                      <p:cBhvr>
+                                        <p:cTn id="23" dur="1" fill="hold">
+                                          <p:stCondLst>
+                                            <p:cond delay="0"/>
+                                          </p:stCondLst>
+                                        </p:cTn>
+                                        <p:tgtEl>
+                                          <p:spTgt spid="9"/>
+                                        </p:tgtEl>
+                                        <p:attrNameLst>
+                                          <p:attrName>style.visibility</p:attrName>
+                                        </p:attrNameLst>
+                                      </p:cBhvr>
+                                      <p:to>
+                                        <p:strVal val="visible"/>
+                                      </p:to>
+                                    </p:set>
+                                  </p:childTnLst>
+                                </p:cTn>
+                              </p:par>
+                            </p:childTnLst>
+                          </p:cTn>
+                        </p:par>
+                      </p:childTnLst>
+                    </p:cTn>
+                  </p:par>
+                </p:childTnLst>
+              </p:cTn>
+              <p:prevCondLst>
+                <p:cond evt="onPrev" delay="0">
+                  <p:tgtEl>
+                    <p:sldTgt/>
+                  </p:tgtEl>
+                </p:cond>
+              </p:prevCondLst>
+              <p:nextCondLst>
+                <p:cond evt="onNext" delay="0">
+                  <p:tgtEl>
+                    <p:sldTgt/>
+                  </p:tgtEl>
+                </p:cond>
+              </p:nextCondLst>
+            </p:seq>
+          </p:childTnLst>
+        </p:cTn>
+      </p:par>
+    </p:tnLst>
+    <p:bldLst>
+      <p:bldP spid="6" grpId="0"/>
+      <p:bldP spid="8" grpId="0"/>
+      <p:bldP spid="9" grpId="0" animBg="1"/>
+      <p:bldP spid="11" grpId="0"/>
+      <p:bldP spid="11" grpId="1"/>
+    </p:bldLst>
+  </p:timing>
+</p:sld>
+</file>
+
+<file path=ppt/slides/slide8.xml><?xml version="1.0" encoding="utf-8"?>
+<p:sld xmlns:a="http://schemas.openxmlformats.org/drawingml/2006/main" xmlns:r="http://schemas.openxmlformats.org/officeDocument/2006/relationships" xmlns:p="http://schemas.openxmlformats.org/presentationml/2006/main">
+  <p:cSld>
+    <p:spTree>
+      <p:nvGrpSpPr>
+        <p:cNvPr id="1" name=""/>
+        <p:cNvGrpSpPr/>
+        <p:nvPr/>
+      </p:nvGrpSpPr>
+      <p:grpSpPr>
+        <a:xfrm>
+          <a:off x="0" y="0"/>
+          <a:ext cx="0" cy="0"/>
+          <a:chOff x="0" y="0"/>
+          <a:chExt cx="0" cy="0"/>
+        </a:xfrm>
+      </p:grpSpPr>
+      <p:pic>
+        <p:nvPicPr>
+          <p:cNvPr id="2" name="Picture 1"/>
+          <p:cNvPicPr>
+            <a:picLocks noChangeAspect="1"/>
+          </p:cNvPicPr>
+          <p:nvPr/>
+        </p:nvPicPr>
+        <p:blipFill rotWithShape="1">
+          <a:blip r:embed="rId2">
+            <a:extLst>
+              <a:ext uri="{28A0092B-C50C-407E-A947-70E740481C1C}">
+                <a14:useLocalDpi xmlns:a14="http://schemas.microsoft.com/office/drawing/2010/main" val="0"/>
+              </a:ext>
+            </a:extLst>
+          </a:blip>
+          <a:srcRect l="1797" t="12990" r="3214" b="16156"/>
+          <a:stretch/>
+        </p:blipFill>
+        <p:spPr>
+          <a:xfrm>
+            <a:off x="2469806" y="2991922"/>
+            <a:ext cx="6814236" cy="3000765"/>
+          </a:xfrm>
+          <a:prstGeom prst="rect">
+            <a:avLst/>
+          </a:prstGeom>
+        </p:spPr>
+      </p:pic>
+      <p:sp>
+        <p:nvSpPr>
+          <p:cNvPr id="12" name="Rectangle 11"/>
+          <p:cNvSpPr/>
+          <p:nvPr/>
+        </p:nvSpPr>
+        <p:spPr>
+          <a:xfrm>
+            <a:off x="457199" y="0"/>
+            <a:ext cx="10839451" cy="628649"/>
+          </a:xfrm>
+          <a:prstGeom prst="rect">
+            <a:avLst/>
+          </a:prstGeom>
+          <a:gradFill flip="none" rotWithShape="1">
+            <a:gsLst>
+              <a:gs pos="52000">
+                <a:schemeClr val="accent1">
+                  <a:lumMod val="60000"/>
+                  <a:lumOff val="40000"/>
+                </a:schemeClr>
+              </a:gs>
+              <a:gs pos="100000">
+                <a:schemeClr val="tx2">
+                  <a:lumMod val="60000"/>
+                  <a:lumOff val="40000"/>
+                </a:schemeClr>
+              </a:gs>
+              <a:gs pos="0">
+                <a:schemeClr val="accent1"/>
+              </a:gs>
+            </a:gsLst>
+            <a:lin ang="10800000" scaled="1"/>
+            <a:tileRect/>
+          </a:gradFill>
+          <a:ln>
+            <a:noFill/>
+          </a:ln>
+        </p:spPr>
+        <p:style>
+          <a:lnRef idx="2">
+            <a:schemeClr val="accent1">
+              <a:shade val="50000"/>
+            </a:schemeClr>
+          </a:lnRef>
+          <a:fillRef idx="1">
+            <a:schemeClr val="accent1"/>
+          </a:fillRef>
+          <a:effectRef idx="0">
+            <a:schemeClr val="accent1"/>
+          </a:effectRef>
+          <a:fontRef idx="minor">
+            <a:schemeClr val="lt1"/>
+          </a:fontRef>
+        </p:style>
+        <p:txBody>
+          <a:bodyPr rtlCol="0" anchor="ctr"/>
+          <a:lstStyle/>
+          <a:p>
+            <a:pPr algn="ctr"/>
+            <a:endParaRPr lang="en-US" sz="3200"/>
+          </a:p>
+        </p:txBody>
+      </p:sp>
+      <p:pic>
+        <p:nvPicPr>
+          <p:cNvPr id="10" name="Picture 9"/>
+          <p:cNvPicPr>
+            <a:picLocks noChangeAspect="1"/>
+          </p:cNvPicPr>
+          <p:nvPr/>
+        </p:nvPicPr>
+        <p:blipFill>
+          <a:blip r:embed="rId3" cstate="print">
+            <a:extLst>
+              <a:ext uri="{28A0092B-C50C-407E-A947-70E740481C1C}">
+                <a14:useLocalDpi xmlns:a14="http://schemas.microsoft.com/office/drawing/2010/main" val="0"/>
+              </a:ext>
+            </a:extLst>
+          </a:blip>
+          <a:stretch>
+            <a:fillRect/>
+          </a:stretch>
+        </p:blipFill>
+        <p:spPr>
+          <a:xfrm>
+            <a:off x="11325199" y="116740"/>
+            <a:ext cx="866801" cy="731428"/>
+          </a:xfrm>
+          <a:prstGeom prst="rect">
+            <a:avLst/>
+          </a:prstGeom>
+        </p:spPr>
+      </p:pic>
+      <p:sp>
+        <p:nvSpPr>
+          <p:cNvPr id="4" name="TextBox 3"/>
+          <p:cNvSpPr txBox="1"/>
+          <p:nvPr/>
+        </p:nvSpPr>
+        <p:spPr>
+          <a:xfrm>
+            <a:off x="1340642" y="0"/>
+            <a:ext cx="9072564" cy="584775"/>
+          </a:xfrm>
+          <a:prstGeom prst="rect">
+            <a:avLst/>
+          </a:prstGeom>
+          <a:noFill/>
+        </p:spPr>
+        <p:txBody>
+          <a:bodyPr wrap="square" rtlCol="0">
+            <a:spAutoFit/>
+          </a:bodyPr>
+          <a:lstStyle/>
+          <a:p>
+            <a:pPr algn="ctr"/>
+            <a:r>
+              <a:rPr lang="en-US" sz="3200" dirty="0" smtClean="0"/>
+              <a:t>Reca</a:t>
+            </a:r>
+            <a:r>
+              <a:rPr lang="en-US" sz="3200" dirty="0"/>
+              <a:t>p</a:t>
+            </a:r>
+          </a:p>
+        </p:txBody>
+      </p:sp>
+      <p:sp>
+        <p:nvSpPr>
+          <p:cNvPr id="5" name="TextBox 4"/>
+          <p:cNvSpPr txBox="1"/>
+          <p:nvPr/>
+        </p:nvSpPr>
+        <p:spPr>
+          <a:xfrm>
+            <a:off x="2324725" y="765790"/>
+            <a:ext cx="8021305" cy="2031325"/>
+          </a:xfrm>
+          <a:prstGeom prst="rect">
+            <a:avLst/>
+          </a:prstGeom>
+          <a:noFill/>
+        </p:spPr>
+        <p:txBody>
+          <a:bodyPr wrap="square" rtlCol="0">
+            <a:spAutoFit/>
+          </a:bodyPr>
+          <a:lstStyle/>
+          <a:p>
+            <a:pPr marL="285750" indent="-285750">
+              <a:buFont typeface="Arial" panose="020B0604020202020204" pitchFamily="34" charset="0"/>
+              <a:buChar char="•"/>
+            </a:pPr>
+            <a:r>
+              <a:rPr lang="en-US" dirty="0" smtClean="0"/>
+              <a:t>x86-64 addresses = </a:t>
+            </a:r>
+            <a:r>
+              <a:rPr lang="en-US" dirty="0" smtClean="0">
+                <a:solidFill>
+                  <a:srgbClr val="FF0000"/>
+                </a:solidFill>
+              </a:rPr>
+              <a:t>64-bit</a:t>
+            </a:r>
+            <a:r>
+              <a:rPr lang="en-US" dirty="0" smtClean="0"/>
+              <a:t> executable running</a:t>
+            </a:r>
+            <a:endParaRPr lang="en-US" dirty="0"/>
+          </a:p>
+          <a:p>
+            <a:pPr marL="285750" indent="-285750">
+              <a:buFont typeface="Arial" panose="020B0604020202020204" pitchFamily="34" charset="0"/>
+              <a:buChar char="•"/>
+            </a:pPr>
+            <a:r>
+              <a:rPr lang="en-US" dirty="0" smtClean="0"/>
+              <a:t>We always leak the same bytes which looks like an address:</a:t>
+            </a:r>
+          </a:p>
+          <a:p>
+            <a:pPr marL="742950" lvl="1" indent="-285750">
+              <a:buFont typeface="Arial" panose="020B0604020202020204" pitchFamily="34" charset="0"/>
+              <a:buChar char="•"/>
+            </a:pPr>
+            <a:r>
+              <a:rPr lang="en-US" dirty="0" smtClean="0">
+                <a:solidFill>
+                  <a:srgbClr val="FF0000"/>
+                </a:solidFill>
+              </a:rPr>
+              <a:t>PIE off</a:t>
+            </a:r>
+          </a:p>
+          <a:p>
+            <a:pPr marL="742950" lvl="1" indent="-285750">
+              <a:buFont typeface="Arial" panose="020B0604020202020204" pitchFamily="34" charset="0"/>
+              <a:buChar char="•"/>
+            </a:pPr>
+            <a:r>
+              <a:rPr lang="en-US" dirty="0">
+                <a:solidFill>
+                  <a:srgbClr val="FF0000"/>
+                </a:solidFill>
+              </a:rPr>
+              <a:t>n</a:t>
+            </a:r>
+            <a:r>
+              <a:rPr lang="en-US" dirty="0" smtClean="0">
+                <a:solidFill>
+                  <a:srgbClr val="FF0000"/>
+                </a:solidFill>
+              </a:rPr>
+              <a:t>o canary</a:t>
+            </a:r>
+            <a:endParaRPr lang="en-US" dirty="0" smtClean="0"/>
+          </a:p>
+          <a:p>
+            <a:pPr marL="285750" indent="-285750">
+              <a:buFont typeface="Arial" panose="020B0604020202020204" pitchFamily="34" charset="0"/>
+              <a:buChar char="•"/>
+            </a:pPr>
+            <a:r>
+              <a:rPr lang="en-US" dirty="0" smtClean="0"/>
+              <a:t>The stack addresses are randomized = </a:t>
+            </a:r>
+            <a:r>
+              <a:rPr lang="en-US" dirty="0" smtClean="0">
+                <a:solidFill>
+                  <a:srgbClr val="FF0000"/>
+                </a:solidFill>
+              </a:rPr>
+              <a:t>ASLR on</a:t>
+            </a:r>
+            <a:endParaRPr lang="en-US" dirty="0"/>
+          </a:p>
+          <a:p>
+            <a:pPr marL="285750" indent="-285750">
+              <a:buFont typeface="Arial" panose="020B0604020202020204" pitchFamily="34" charset="0"/>
+              <a:buChar char="•"/>
+            </a:pPr>
+            <a:r>
+              <a:rPr lang="en-US" dirty="0" smtClean="0"/>
+              <a:t>Crash after 40 bytes, trash in buffer = </a:t>
+            </a:r>
+            <a:r>
+              <a:rPr lang="en-US" dirty="0" smtClean="0">
+                <a:solidFill>
+                  <a:srgbClr val="FF0000"/>
+                </a:solidFill>
+              </a:rPr>
+              <a:t>char </a:t>
+            </a:r>
+            <a:r>
+              <a:rPr lang="en-US" dirty="0">
+                <a:solidFill>
+                  <a:srgbClr val="FF0000"/>
+                </a:solidFill>
+              </a:rPr>
+              <a:t>b</a:t>
+            </a:r>
+            <a:r>
+              <a:rPr lang="en-US" dirty="0" smtClean="0">
+                <a:solidFill>
+                  <a:srgbClr val="FF0000"/>
+                </a:solidFill>
+              </a:rPr>
+              <a:t>uffer[32];</a:t>
+            </a:r>
+            <a:endParaRPr lang="en-US" dirty="0"/>
+          </a:p>
+          <a:p>
+            <a:pPr marL="285750" indent="-285750">
+              <a:buFont typeface="Arial" panose="020B0604020202020204" pitchFamily="34" charset="0"/>
+              <a:buChar char="•"/>
+            </a:pPr>
+            <a:r>
+              <a:rPr lang="en-US" dirty="0" smtClean="0"/>
+              <a:t>Does not print “ </a:t>
+            </a:r>
+            <a:r>
+              <a:rPr lang="en-US" i="1" dirty="0" smtClean="0"/>
+              <a:t>Bye! </a:t>
+            </a:r>
+            <a:r>
+              <a:rPr lang="en-US" dirty="0" smtClean="0"/>
+              <a:t>” when it crashes = intermediate function</a:t>
+            </a:r>
+            <a:endParaRPr lang="en-US" dirty="0"/>
+          </a:p>
+        </p:txBody>
+      </p:sp>
+      <p:sp>
+        <p:nvSpPr>
+          <p:cNvPr id="3" name="TextBox 2"/>
+          <p:cNvSpPr txBox="1"/>
+          <p:nvPr/>
+        </p:nvSpPr>
+        <p:spPr>
+          <a:xfrm>
+            <a:off x="4004068" y="6187494"/>
+            <a:ext cx="4201297" cy="369332"/>
+          </a:xfrm>
+          <a:prstGeom prst="rect">
+            <a:avLst/>
+          </a:prstGeom>
+          <a:noFill/>
+        </p:spPr>
+        <p:txBody>
+          <a:bodyPr wrap="square" rtlCol="0">
+            <a:spAutoFit/>
+          </a:bodyPr>
+          <a:lstStyle/>
+          <a:p>
+            <a:r>
+              <a:rPr lang="en-US" i="1" dirty="0" smtClean="0"/>
+              <a:t>Ok cool bro, but what’s next?</a:t>
+            </a:r>
+            <a:endParaRPr lang="en-US" i="1" dirty="0"/>
+          </a:p>
+        </p:txBody>
+      </p:sp>
+    </p:spTree>
+    <p:extLst>
+      <p:ext uri="{BB962C8B-B14F-4D97-AF65-F5344CB8AC3E}">
+        <p14:creationId xmlns:p14="http://schemas.microsoft.com/office/powerpoint/2010/main" val="3297735021"/>
       </p:ext>
     </p:extLst>
   </p:cSld>
@@ -6225,35 +9585,26 @@
                                   </p:childTnLst>
                                 </p:cTn>
                               </p:par>
+                            </p:childTnLst>
+                          </p:cTn>
+                        </p:par>
+                      </p:childTnLst>
+                    </p:cTn>
+                  </p:par>
+                  <p:par>
+                    <p:cTn id="11" fill="hold">
+                      <p:stCondLst>
+                        <p:cond delay="indefinite"/>
+                      </p:stCondLst>
+                      <p:childTnLst>
+                        <p:par>
+                          <p:cTn id="12" fill="hold">
+                            <p:stCondLst>
+                              <p:cond delay="0"/>
+                            </p:stCondLst>
+                            <p:childTnLst>
                               <p:par>
-                                <p:cTn id="11" presetID="1" presetClass="entr" presetSubtype="0" fill="hold" grpId="0" nodeType="withEffect">
-                                  <p:stCondLst>
-                                    <p:cond delay="0"/>
-                                  </p:stCondLst>
-                                  <p:childTnLst>
-                                    <p:set>
-                                      <p:cBhvr>
-                                        <p:cTn id="12" dur="1" fill="hold">
-                                          <p:stCondLst>
-                                            <p:cond delay="0"/>
-                                          </p:stCondLst>
-                                        </p:cTn>
-                                        <p:tgtEl>
-                                          <p:spTgt spid="7"/>
-                                        </p:tgtEl>
-                                        <p:attrNameLst>
-                                          <p:attrName>style.visibility</p:attrName>
-                                        </p:attrNameLst>
-                                      </p:cBhvr>
-                                      <p:to>
-                                        <p:strVal val="visible"/>
-                                      </p:to>
-                                    </p:set>
-                                  </p:childTnLst>
-                                </p:cTn>
-                              </p:par>
-                              <p:par>
-                                <p:cTn id="13" presetID="1" presetClass="entr" presetSubtype="0" fill="hold" grpId="0" nodeType="withEffect">
+                                <p:cTn id="13" presetID="1" presetClass="entr" presetSubtype="0" fill="hold" grpId="0" nodeType="clickEffect">
                                   <p:stCondLst>
                                     <p:cond delay="0"/>
                                   </p:stCondLst>
@@ -6308,14 +9659,13 @@
     </p:tnLst>
     <p:bldLst>
       <p:bldP spid="5" grpId="0"/>
-      <p:bldP spid="7" grpId="0"/>
-      <p:bldP spid="3" grpId="0" animBg="1"/>
+      <p:bldP spid="3" grpId="0"/>
     </p:bldLst>
   </p:timing>
 </p:sld>
 </file>
 
-<file path=ppt/slides/slide6.xml><?xml version="1.0" encoding="utf-8"?>
+<file path=ppt/slides/slide9.xml><?xml version="1.0" encoding="utf-8"?>
 <p:sld xmlns:a="http://schemas.openxmlformats.org/drawingml/2006/main" xmlns:r="http://schemas.openxmlformats.org/officeDocument/2006/relationships" xmlns:p="http://schemas.openxmlformats.org/presentationml/2006/main">
   <p:cSld>
     <p:spTree>
@@ -6434,7 +9784,7 @@
         </p:nvSpPr>
         <p:spPr>
           <a:xfrm>
-            <a:off x="1443036" y="0"/>
+            <a:off x="1340642" y="0"/>
             <a:ext cx="9072564" cy="584775"/>
           </a:xfrm>
           <a:prstGeom prst="rect">
@@ -6451,15 +9801,91 @@
             <a:pPr algn="ctr"/>
             <a:r>
               <a:rPr lang="en-US" sz="3200" dirty="0" smtClean="0"/>
-              <a:t>What’s a stack buffer overflow?</a:t>
+              <a:t>Return Oriented Programming</a:t>
             </a:r>
             <a:endParaRPr lang="en-US" sz="3200" dirty="0"/>
+          </a:p>
+        </p:txBody>
+      </p:sp>
+      <p:sp>
+        <p:nvSpPr>
+          <p:cNvPr id="3" name="TextBox 2"/>
+          <p:cNvSpPr txBox="1"/>
+          <p:nvPr/>
+        </p:nvSpPr>
+        <p:spPr>
+          <a:xfrm>
+            <a:off x="2034746" y="1351005"/>
+            <a:ext cx="7809470" cy="1754326"/>
+          </a:xfrm>
+          <a:prstGeom prst="rect">
+            <a:avLst/>
+          </a:prstGeom>
+          <a:noFill/>
+        </p:spPr>
+        <p:txBody>
+          <a:bodyPr wrap="square" rtlCol="0">
+            <a:spAutoFit/>
+          </a:bodyPr>
+          <a:lstStyle/>
+          <a:p>
+            <a:pPr marL="285750" indent="-285750">
+              <a:buFont typeface="Arial" panose="020B0604020202020204" pitchFamily="34" charset="0"/>
+              <a:buChar char="•"/>
+            </a:pPr>
+            <a:r>
+              <a:rPr lang="en-US" dirty="0" smtClean="0"/>
+              <a:t>Once we control the execution flow = we control RIP</a:t>
+            </a:r>
+          </a:p>
+          <a:p>
+            <a:pPr marL="285750" indent="-285750">
+              <a:buFont typeface="Arial" panose="020B0604020202020204" pitchFamily="34" charset="0"/>
+              <a:buChar char="•"/>
+            </a:pPr>
+            <a:endParaRPr lang="en-US" dirty="0"/>
+          </a:p>
+          <a:p>
+            <a:pPr marL="285750" indent="-285750">
+              <a:buFont typeface="Arial" panose="020B0604020202020204" pitchFamily="34" charset="0"/>
+              <a:buChar char="•"/>
+            </a:pPr>
+            <a:r>
+              <a:rPr lang="en-US" dirty="0" smtClean="0"/>
+              <a:t>Use </a:t>
+            </a:r>
+            <a:r>
+              <a:rPr lang="en-US" i="1" dirty="0" smtClean="0"/>
+              <a:t>gadgets</a:t>
+            </a:r>
+            <a:r>
+              <a:rPr lang="en-US" dirty="0" smtClean="0"/>
+              <a:t> to execute instructions sequences from the binary itself and jump somewhere else using RET</a:t>
+            </a:r>
+            <a:endParaRPr lang="en-US" i="1" dirty="0" smtClean="0"/>
+          </a:p>
+          <a:p>
+            <a:pPr marL="285750" indent="-285750">
+              <a:buFont typeface="Arial" panose="020B0604020202020204" pitchFamily="34" charset="0"/>
+              <a:buChar char="•"/>
+            </a:pPr>
+            <a:endParaRPr lang="en-US" i="1" dirty="0"/>
+          </a:p>
+          <a:p>
+            <a:pPr marL="285750" indent="-285750">
+              <a:buFont typeface="Arial" panose="020B0604020202020204" pitchFamily="34" charset="0"/>
+              <a:buChar char="•"/>
+            </a:pPr>
+            <a:r>
+              <a:rPr lang="en-US" dirty="0" smtClean="0"/>
+              <a:t>We control the stack values with the stack buffer overflow!</a:t>
+            </a:r>
           </a:p>
         </p:txBody>
       </p:sp>
       <p:pic>
         <p:nvPicPr>
-          <p:cNvPr id="2" name="Picture 1"/>
+          <p:cNvPr id="5" name="Picture 4"/>
           <p:cNvPicPr>
             <a:picLocks noChangeAspect="1"/>
           </p:cNvPicPr>
@@ -6479,8 +9905,8 @@
         </p:blipFill>
         <p:spPr>
           <a:xfrm>
-            <a:off x="549679" y="1181100"/>
-            <a:ext cx="5470121" cy="5084662"/>
+            <a:off x="1070059" y="4562694"/>
+            <a:ext cx="9712584" cy="868857"/>
           </a:xfrm>
           <a:prstGeom prst="rect">
             <a:avLst/>
@@ -6489,14 +9915,14 @@
       </p:pic>
       <p:sp>
         <p:nvSpPr>
-          <p:cNvPr id="6" name="TextBox 5"/>
+          <p:cNvPr id="8" name="TextBox 7"/>
           <p:cNvSpPr txBox="1"/>
           <p:nvPr/>
         </p:nvSpPr>
         <p:spPr>
           <a:xfrm>
-            <a:off x="6176963" y="1601955"/>
-            <a:ext cx="4676774" cy="646331"/>
+            <a:off x="1070059" y="3593898"/>
+            <a:ext cx="9704172" cy="646331"/>
           </a:xfrm>
           <a:prstGeom prst="rect">
             <a:avLst/>
@@ -6509,500 +9935,18 @@
           </a:bodyPr>
           <a:lstStyle/>
           <a:p>
-            <a:pPr marL="285750" indent="-285750">
-              <a:buFont typeface="Arial" panose="020B0604020202020204" pitchFamily="34" charset="0"/>
-              <a:buChar char="•"/>
-            </a:pPr>
             <a:r>
               <a:rPr lang="en-US" dirty="0" smtClean="0"/>
-              <a:t>Occurs when we do not check if the user input fits in the buffer it went in</a:t>
+              <a:t>For instance, this gadgets allows the attacker to control RDI, which is the first argument in the x64 calling convention.</a:t>
             </a:r>
             <a:endParaRPr lang="en-US" dirty="0"/>
-          </a:p>
-        </p:txBody>
-      </p:sp>
-      <p:sp>
-        <p:nvSpPr>
-          <p:cNvPr id="7" name="TextBox 6"/>
-          <p:cNvSpPr txBox="1"/>
-          <p:nvPr/>
-        </p:nvSpPr>
-        <p:spPr>
-          <a:xfrm>
-            <a:off x="6176963" y="2659926"/>
-            <a:ext cx="4878215" cy="646331"/>
-          </a:xfrm>
-          <a:prstGeom prst="rect">
-            <a:avLst/>
-          </a:prstGeom>
-          <a:noFill/>
-        </p:spPr>
-        <p:txBody>
-          <a:bodyPr wrap="square" rtlCol="0">
-            <a:spAutoFit/>
-          </a:bodyPr>
-          <a:lstStyle/>
-          <a:p>
-            <a:pPr marL="285750" indent="-285750">
-              <a:buFont typeface="Arial" panose="020B0604020202020204" pitchFamily="34" charset="0"/>
-              <a:buChar char="•"/>
-            </a:pPr>
-            <a:r>
-              <a:rPr lang="en-US" dirty="0" smtClean="0"/>
-              <a:t>If there is no protection such as </a:t>
-            </a:r>
-            <a:r>
-              <a:rPr lang="en-US" dirty="0" smtClean="0"/>
-              <a:t>canary, </a:t>
-            </a:r>
-            <a:r>
-              <a:rPr lang="en-US" dirty="0" smtClean="0"/>
-              <a:t>we can overwrite data behind the buffer</a:t>
-            </a:r>
-            <a:endParaRPr lang="en-US" dirty="0"/>
-          </a:p>
-        </p:txBody>
-      </p:sp>
-      <p:sp>
-        <p:nvSpPr>
-          <p:cNvPr id="8" name="TextBox 7"/>
-          <p:cNvSpPr txBox="1"/>
-          <p:nvPr/>
-        </p:nvSpPr>
-        <p:spPr>
-          <a:xfrm>
-            <a:off x="6176963" y="3717897"/>
-            <a:ext cx="4991100" cy="923330"/>
-          </a:xfrm>
-          <a:prstGeom prst="rect">
-            <a:avLst/>
-          </a:prstGeom>
-          <a:noFill/>
-        </p:spPr>
-        <p:txBody>
-          <a:bodyPr wrap="square" rtlCol="0">
-            <a:spAutoFit/>
-          </a:bodyPr>
-          <a:lstStyle/>
-          <a:p>
-            <a:pPr marL="285750" indent="-285750">
-              <a:buFont typeface="Arial" panose="020B0604020202020204" pitchFamily="34" charset="0"/>
-              <a:buChar char="•"/>
-            </a:pPr>
-            <a:r>
-              <a:rPr lang="en-US" dirty="0" smtClean="0"/>
-              <a:t>It means that we can take control of execution flow because the return address we jump on is located on the stack</a:t>
-            </a:r>
-            <a:endParaRPr lang="en-US" dirty="0"/>
-          </a:p>
-        </p:txBody>
-      </p:sp>
-      <p:sp>
-        <p:nvSpPr>
-          <p:cNvPr id="9" name="TextBox 8"/>
-          <p:cNvSpPr txBox="1"/>
-          <p:nvPr/>
-        </p:nvSpPr>
-        <p:spPr>
-          <a:xfrm>
-            <a:off x="6249237" y="5186763"/>
-            <a:ext cx="4532226" cy="461665"/>
-          </a:xfrm>
-          <a:prstGeom prst="rect">
-            <a:avLst/>
-          </a:prstGeom>
-          <a:noFill/>
-          <a:ln>
-            <a:solidFill>
-              <a:schemeClr val="tx1"/>
-            </a:solidFill>
-          </a:ln>
-        </p:spPr>
-        <p:txBody>
-          <a:bodyPr wrap="square" rtlCol="0">
-            <a:spAutoFit/>
-          </a:bodyPr>
-          <a:lstStyle/>
-          <a:p>
-            <a:r>
-              <a:rPr lang="en-US" sz="2400" dirty="0" smtClean="0"/>
-              <a:t>RET </a:t>
-            </a:r>
-            <a:r>
-              <a:rPr lang="en-US" sz="2400" dirty="0" smtClean="0"/>
-              <a:t>is equivalent to </a:t>
-            </a:r>
-            <a:r>
-              <a:rPr lang="en-US" sz="2400" dirty="0" smtClean="0"/>
-              <a:t>POP RIP</a:t>
-            </a:r>
-            <a:endParaRPr lang="en-US" sz="2400" dirty="0"/>
           </a:p>
         </p:txBody>
       </p:sp>
     </p:spTree>
     <p:extLst>
       <p:ext uri="{BB962C8B-B14F-4D97-AF65-F5344CB8AC3E}">
-        <p14:creationId xmlns:p14="http://schemas.microsoft.com/office/powerpoint/2010/main" val="3101180952"/>
-      </p:ext>
-    </p:extLst>
-  </p:cSld>
-  <p:clrMapOvr>
-    <a:masterClrMapping/>
-  </p:clrMapOvr>
-  <p:timing>
-    <p:tnLst>
-      <p:par>
-        <p:cTn id="1" dur="indefinite" restart="never" nodeType="tmRoot"/>
-      </p:par>
-    </p:tnLst>
-  </p:timing>
-</p:sld>
-</file>
-
-<file path=ppt/slides/slide7.xml><?xml version="1.0" encoding="utf-8"?>
-<p:sld xmlns:a="http://schemas.openxmlformats.org/drawingml/2006/main" xmlns:r="http://schemas.openxmlformats.org/officeDocument/2006/relationships" xmlns:p="http://schemas.openxmlformats.org/presentationml/2006/main">
-  <p:cSld>
-    <p:spTree>
-      <p:nvGrpSpPr>
-        <p:cNvPr id="1" name=""/>
-        <p:cNvGrpSpPr/>
-        <p:nvPr/>
-      </p:nvGrpSpPr>
-      <p:grpSpPr>
-        <a:xfrm>
-          <a:off x="0" y="0"/>
-          <a:ext cx="0" cy="0"/>
-          <a:chOff x="0" y="0"/>
-          <a:chExt cx="0" cy="0"/>
-        </a:xfrm>
-      </p:grpSpPr>
-      <p:sp>
-        <p:nvSpPr>
-          <p:cNvPr id="12" name="Rectangle 11"/>
-          <p:cNvSpPr/>
-          <p:nvPr/>
-        </p:nvSpPr>
-        <p:spPr>
-          <a:xfrm>
-            <a:off x="457199" y="0"/>
-            <a:ext cx="10839451" cy="628649"/>
-          </a:xfrm>
-          <a:prstGeom prst="rect">
-            <a:avLst/>
-          </a:prstGeom>
-          <a:gradFill flip="none" rotWithShape="1">
-            <a:gsLst>
-              <a:gs pos="52000">
-                <a:schemeClr val="accent1">
-                  <a:lumMod val="60000"/>
-                  <a:lumOff val="40000"/>
-                </a:schemeClr>
-              </a:gs>
-              <a:gs pos="100000">
-                <a:schemeClr val="tx2">
-                  <a:lumMod val="60000"/>
-                  <a:lumOff val="40000"/>
-                </a:schemeClr>
-              </a:gs>
-              <a:gs pos="0">
-                <a:schemeClr val="accent1"/>
-              </a:gs>
-            </a:gsLst>
-            <a:lin ang="10800000" scaled="1"/>
-            <a:tileRect/>
-          </a:gradFill>
-          <a:ln>
-            <a:noFill/>
-          </a:ln>
-        </p:spPr>
-        <p:style>
-          <a:lnRef idx="2">
-            <a:schemeClr val="accent1">
-              <a:shade val="50000"/>
-            </a:schemeClr>
-          </a:lnRef>
-          <a:fillRef idx="1">
-            <a:schemeClr val="accent1"/>
-          </a:fillRef>
-          <a:effectRef idx="0">
-            <a:schemeClr val="accent1"/>
-          </a:effectRef>
-          <a:fontRef idx="minor">
-            <a:schemeClr val="lt1"/>
-          </a:fontRef>
-        </p:style>
-        <p:txBody>
-          <a:bodyPr rtlCol="0" anchor="ctr"/>
-          <a:lstStyle/>
-          <a:p>
-            <a:pPr algn="ctr"/>
-            <a:endParaRPr lang="en-US" sz="3200"/>
-          </a:p>
-        </p:txBody>
-      </p:sp>
-      <p:pic>
-        <p:nvPicPr>
-          <p:cNvPr id="10" name="Picture 9"/>
-          <p:cNvPicPr>
-            <a:picLocks noChangeAspect="1"/>
-          </p:cNvPicPr>
-          <p:nvPr/>
-        </p:nvPicPr>
-        <p:blipFill>
-          <a:blip r:embed="rId2" cstate="print">
-            <a:extLst>
-              <a:ext uri="{28A0092B-C50C-407E-A947-70E740481C1C}">
-                <a14:useLocalDpi xmlns:a14="http://schemas.microsoft.com/office/drawing/2010/main" val="0"/>
-              </a:ext>
-            </a:extLst>
-          </a:blip>
-          <a:stretch>
-            <a:fillRect/>
-          </a:stretch>
-        </p:blipFill>
-        <p:spPr>
-          <a:xfrm>
-            <a:off x="11325199" y="116740"/>
-            <a:ext cx="866801" cy="731428"/>
-          </a:xfrm>
-          <a:prstGeom prst="rect">
-            <a:avLst/>
-          </a:prstGeom>
-        </p:spPr>
-      </p:pic>
-      <p:sp>
-        <p:nvSpPr>
-          <p:cNvPr id="5" name="TextBox 4"/>
-          <p:cNvSpPr txBox="1"/>
-          <p:nvPr/>
-        </p:nvSpPr>
-        <p:spPr>
-          <a:xfrm>
-            <a:off x="1340642" y="0"/>
-            <a:ext cx="9072564" cy="584775"/>
-          </a:xfrm>
-          <a:prstGeom prst="rect">
-            <a:avLst/>
-          </a:prstGeom>
-          <a:noFill/>
-        </p:spPr>
-        <p:txBody>
-          <a:bodyPr wrap="square" rtlCol="0">
-            <a:spAutoFit/>
-          </a:bodyPr>
-          <a:lstStyle/>
-          <a:p>
-            <a:pPr algn="ctr"/>
-            <a:r>
-              <a:rPr lang="en-US" sz="3200" dirty="0" smtClean="0"/>
-              <a:t>Recon</a:t>
-            </a:r>
-            <a:endParaRPr lang="en-US" sz="3200" dirty="0"/>
-          </a:p>
-        </p:txBody>
-      </p:sp>
-      <p:sp>
-        <p:nvSpPr>
-          <p:cNvPr id="6" name="TextBox 5"/>
-          <p:cNvSpPr txBox="1"/>
-          <p:nvPr/>
-        </p:nvSpPr>
-        <p:spPr>
-          <a:xfrm>
-            <a:off x="2894345" y="943825"/>
-            <a:ext cx="6748463" cy="1477328"/>
-          </a:xfrm>
-          <a:prstGeom prst="rect">
-            <a:avLst/>
-          </a:prstGeom>
-          <a:noFill/>
-        </p:spPr>
-        <p:txBody>
-          <a:bodyPr wrap="square" rtlCol="0">
-            <a:spAutoFit/>
-          </a:bodyPr>
-          <a:lstStyle/>
-          <a:p>
-            <a:pPr marL="285750" indent="-285750">
-              <a:buFont typeface="Arial" panose="020B0604020202020204" pitchFamily="34" charset="0"/>
-              <a:buChar char="•"/>
-            </a:pPr>
-            <a:r>
-              <a:rPr lang="en-US" dirty="0" smtClean="0"/>
-              <a:t>Increment input size until program crashes</a:t>
-            </a:r>
-          </a:p>
-          <a:p>
-            <a:pPr marL="285750" indent="-285750">
-              <a:buFont typeface="Arial" panose="020B0604020202020204" pitchFamily="34" charset="0"/>
-              <a:buChar char="•"/>
-            </a:pPr>
-            <a:endParaRPr lang="en-US" dirty="0"/>
-          </a:p>
-          <a:p>
-            <a:pPr marL="285750" indent="-285750">
-              <a:buFont typeface="Arial" panose="020B0604020202020204" pitchFamily="34" charset="0"/>
-              <a:buChar char="•"/>
-            </a:pPr>
-            <a:r>
-              <a:rPr lang="en-US" dirty="0"/>
-              <a:t>C</a:t>
-            </a:r>
-            <a:r>
-              <a:rPr lang="en-US" dirty="0" smtClean="0"/>
-              <a:t>heck the protections:</a:t>
-            </a:r>
-          </a:p>
-          <a:p>
-            <a:pPr marL="742950" lvl="1" indent="-285750">
-              <a:buFont typeface="Arial" panose="020B0604020202020204" pitchFamily="34" charset="0"/>
-              <a:buChar char="•"/>
-            </a:pPr>
-            <a:r>
-              <a:rPr lang="en-US" dirty="0" smtClean="0"/>
-              <a:t>on the binary (PIE, canary) </a:t>
-            </a:r>
-            <a:endParaRPr lang="en-US" dirty="0"/>
-          </a:p>
-          <a:p>
-            <a:pPr marL="742950" lvl="1" indent="-285750">
-              <a:buFont typeface="Arial" panose="020B0604020202020204" pitchFamily="34" charset="0"/>
-              <a:buChar char="•"/>
-            </a:pPr>
-            <a:r>
-              <a:rPr lang="en-US" dirty="0"/>
-              <a:t>o</a:t>
-            </a:r>
-            <a:r>
-              <a:rPr lang="en-US" dirty="0" smtClean="0"/>
-              <a:t>n the server (ASLR)</a:t>
-            </a:r>
-            <a:endParaRPr lang="en-US" dirty="0"/>
-          </a:p>
-        </p:txBody>
-      </p:sp>
-      <p:pic>
-        <p:nvPicPr>
-          <p:cNvPr id="2" name="Picture 1"/>
-          <p:cNvPicPr>
-            <a:picLocks noChangeAspect="1"/>
-          </p:cNvPicPr>
-          <p:nvPr/>
-        </p:nvPicPr>
-        <p:blipFill>
-          <a:blip r:embed="rId3">
-            <a:extLst>
-              <a:ext uri="{28A0092B-C50C-407E-A947-70E740481C1C}">
-                <a14:useLocalDpi xmlns:a14="http://schemas.microsoft.com/office/drawing/2010/main" val="0"/>
-              </a:ext>
-            </a:extLst>
-          </a:blip>
-          <a:stretch>
-            <a:fillRect/>
-          </a:stretch>
-        </p:blipFill>
-        <p:spPr>
-          <a:xfrm>
-            <a:off x="2282487" y="2672962"/>
-            <a:ext cx="7360321" cy="2566988"/>
-          </a:xfrm>
-          <a:prstGeom prst="rect">
-            <a:avLst/>
-          </a:prstGeom>
-        </p:spPr>
-      </p:pic>
-      <p:sp>
-        <p:nvSpPr>
-          <p:cNvPr id="8" name="TextBox 7"/>
-          <p:cNvSpPr txBox="1"/>
-          <p:nvPr/>
-        </p:nvSpPr>
-        <p:spPr>
-          <a:xfrm>
-            <a:off x="3731388" y="5555126"/>
-            <a:ext cx="5438802" cy="830997"/>
-          </a:xfrm>
-          <a:prstGeom prst="rect">
-            <a:avLst/>
-          </a:prstGeom>
-          <a:noFill/>
-        </p:spPr>
-        <p:txBody>
-          <a:bodyPr wrap="square" rtlCol="0">
-            <a:spAutoFit/>
-          </a:bodyPr>
-          <a:lstStyle/>
-          <a:p>
-            <a:r>
-              <a:rPr lang="en-US" sz="2400" dirty="0" smtClean="0"/>
-              <a:t>Program crashes after 40 bytes</a:t>
-            </a:r>
-          </a:p>
-          <a:p>
-            <a:r>
-              <a:rPr lang="en-US" sz="2400" dirty="0" smtClean="0"/>
-              <a:t>= (probably stack) buffer overflow</a:t>
-            </a:r>
-            <a:endParaRPr lang="en-US" sz="2400" dirty="0"/>
-          </a:p>
-        </p:txBody>
-      </p:sp>
-      <p:sp>
-        <p:nvSpPr>
-          <p:cNvPr id="9" name="Right Arrow 8"/>
-          <p:cNvSpPr/>
-          <p:nvPr/>
-        </p:nvSpPr>
-        <p:spPr>
-          <a:xfrm>
-            <a:off x="2368212" y="5648055"/>
-            <a:ext cx="885825" cy="645141"/>
-          </a:xfrm>
-          <a:prstGeom prst="rightArrow">
-            <a:avLst/>
-          </a:prstGeom>
-          <a:solidFill>
-            <a:schemeClr val="tx2">
-              <a:lumMod val="20000"/>
-              <a:lumOff val="80000"/>
-            </a:schemeClr>
-          </a:solidFill>
-          <a:ln>
-            <a:solidFill>
-              <a:schemeClr val="accent2"/>
-            </a:solidFill>
-          </a:ln>
-        </p:spPr>
-        <p:style>
-          <a:lnRef idx="2">
-            <a:schemeClr val="accent1">
-              <a:shade val="50000"/>
-            </a:schemeClr>
-          </a:lnRef>
-          <a:fillRef idx="1">
-            <a:schemeClr val="accent1"/>
-          </a:fillRef>
-          <a:effectRef idx="0">
-            <a:schemeClr val="accent1"/>
-          </a:effectRef>
-          <a:fontRef idx="minor">
-            <a:schemeClr val="lt1"/>
-          </a:fontRef>
-        </p:style>
-        <p:txBody>
-          <a:bodyPr rtlCol="0" anchor="ctr"/>
-          <a:lstStyle/>
-          <a:p>
-            <a:pPr algn="ctr"/>
-            <a:endParaRPr lang="en-US"/>
-          </a:p>
-        </p:txBody>
-      </p:sp>
-    </p:spTree>
-    <p:extLst>
-      <p:ext uri="{BB962C8B-B14F-4D97-AF65-F5344CB8AC3E}">
-        <p14:creationId xmlns:p14="http://schemas.microsoft.com/office/powerpoint/2010/main" val="3301776107"/>
+        <p14:creationId xmlns:p14="http://schemas.microsoft.com/office/powerpoint/2010/main" val="3476725745"/>
       </p:ext>
     </p:extLst>
   </p:cSld>
@@ -7030,7 +9974,7 @@
                             </p:stCondLst>
                             <p:childTnLst>
                               <p:par>
-                                <p:cTn id="5" presetID="1" presetClass="entr" presetSubtype="0" fill="hold" nodeType="clickEffect">
+                                <p:cTn id="5" presetID="1" presetClass="entr" presetSubtype="0" fill="hold" grpId="0" nodeType="clickEffect">
                                   <p:stCondLst>
                                     <p:cond delay="0"/>
                                   </p:stCondLst>
@@ -7043,7 +9987,52 @@
                                           </p:stCondLst>
                                         </p:cTn>
                                         <p:tgtEl>
-                                          <p:spTgt spid="2"/>
+                                          <p:spTgt spid="3"/>
+                                        </p:tgtEl>
+                                        <p:attrNameLst>
+                                          <p:attrName>style.visibility</p:attrName>
+                                        </p:attrNameLst>
+                                      </p:cBhvr>
+                                      <p:to>
+                                        <p:strVal val="visible"/>
+                                      </p:to>
+                                    </p:set>
+                                  </p:childTnLst>
+                                </p:cTn>
+                              </p:par>
+                            </p:childTnLst>
+                          </p:cTn>
+                        </p:par>
+                      </p:childTnLst>
+                    </p:cTn>
+                  </p:par>
+                  <p:par>
+                    <p:cTn id="7" fill="hold">
+                      <p:stCondLst>
+                        <p:cond delay="indefinite"/>
+                      </p:stCondLst>
+                      <p:childTnLst>
+                        <p:par>
+                          <p:cTn id="8" fill="hold">
+                            <p:stCondLst>
+                              <p:cond delay="0"/>
+                            </p:stCondLst>
+                            <p:childTnLst>
+                              <p:par>
+                                <p:cTn id="9" presetID="1" presetClass="entr" presetSubtype="0" fill="hold" nodeType="clickEffect">
+                                  <p:stCondLst>
+                                    <p:cond delay="0"/>
+                                  </p:stCondLst>
+                                  <p:childTnLst>
+                                    <p:set>
+                                      <p:cBhvr>
+                                        <p:cTn id="10" dur="1" fill="hold">
+                                          <p:stCondLst>
+                                            <p:cond delay="0"/>
+                                          </p:stCondLst>
+                                        </p:cTn>
+                                        <p:tgtEl>
+                                          <p:spTgt spid="5"/>
                                         </p:tgtEl>
                                         <p:attrNameLst>
                                           <p:attrName>style.visibility</p:attrName>
@@ -7057,47 +10046,20 @@
                                 </p:cTn>
                               </p:par>
                               <p:par>
-                                <p:cTn id="7" presetID="1" presetClass="entr" presetSubtype="0" fill="hold" grpId="0" nodeType="withEffect">
+                                <p:cTn id="11" presetID="1" presetClass="entr" presetSubtype="0" fill="hold" grpId="0" nodeType="withEffect">
                                   <p:stCondLst>
                                     <p:cond delay="0"/>
                                   </p:stCondLst>
                                   <p:childTnLst>
                                     <p:set>
                                       <p:cBhvr>
-                                        <p:cTn id="8" dur="1" fill="hold">
+                                        <p:cTn id="12" dur="1" fill="hold">
                                           <p:stCondLst>
                                             <p:cond delay="0"/>
                                           </p:stCondLst>
                                         </p:cTn>
                                         <p:tgtEl>
                                           <p:spTgt spid="8"/>
-                                        </p:tgtEl>
-                                        <p:attrNameLst>
-                                          <p:attrName>style.visibility</p:attrName>
-                                        </p:attrNameLst>
-                                      </p:cBhvr>
-                                      <p:to>
-                                        <p:strVal val="visible"/>
-                                      </p:to>
-                                    </p:set>
-                                  </p:childTnLst>
-                                </p:cTn>
-                              </p:par>
-                              <p:par>
-                                <p:cTn id="9" presetID="1" presetClass="entr" presetSubtype="0" fill="hold" grpId="0" nodeType="withEffect">
-                                  <p:stCondLst>
-                                    <p:cond delay="0"/>
-                                  </p:stCondLst>
-                                  <p:childTnLst>
-                                    <p:set>
-                                      <p:cBhvr>
-                                        <p:cTn id="10" dur="1" fill="hold">
-                                          <p:stCondLst>
-                                            <p:cond delay="0"/>
-                                          </p:stCondLst>
-                                        </p:cTn>
-                                        <p:tgtEl>
-                                          <p:spTgt spid="9"/>
                                         </p:tgtEl>
                                         <p:attrNameLst>
                                           <p:attrName>style.visibility</p:attrName>
@@ -7138,705 +10100,9 @@
       </p:par>
     </p:tnLst>
     <p:bldLst>
+      <p:bldP spid="3" grpId="0"/>
       <p:bldP spid="8" grpId="0"/>
-      <p:bldP spid="9" grpId="0" animBg="1"/>
     </p:bldLst>
-  </p:timing>
-</p:sld>
-</file>
-
-<file path=ppt/slides/slide8.xml><?xml version="1.0" encoding="utf-8"?>
-<p:sld xmlns:a="http://schemas.openxmlformats.org/drawingml/2006/main" xmlns:r="http://schemas.openxmlformats.org/officeDocument/2006/relationships" xmlns:p="http://schemas.openxmlformats.org/presentationml/2006/main">
-  <p:cSld>
-    <p:spTree>
-      <p:nvGrpSpPr>
-        <p:cNvPr id="1" name=""/>
-        <p:cNvGrpSpPr/>
-        <p:nvPr/>
-      </p:nvGrpSpPr>
-      <p:grpSpPr>
-        <a:xfrm>
-          <a:off x="0" y="0"/>
-          <a:ext cx="0" cy="0"/>
-          <a:chOff x="0" y="0"/>
-          <a:chExt cx="0" cy="0"/>
-        </a:xfrm>
-      </p:grpSpPr>
-      <p:pic>
-        <p:nvPicPr>
-          <p:cNvPr id="2" name="Picture 1"/>
-          <p:cNvPicPr>
-            <a:picLocks noChangeAspect="1"/>
-          </p:cNvPicPr>
-          <p:nvPr/>
-        </p:nvPicPr>
-        <p:blipFill rotWithShape="1">
-          <a:blip r:embed="rId2">
-            <a:extLst>
-              <a:ext uri="{28A0092B-C50C-407E-A947-70E740481C1C}">
-                <a14:useLocalDpi xmlns:a14="http://schemas.microsoft.com/office/drawing/2010/main" val="0"/>
-              </a:ext>
-            </a:extLst>
-          </a:blip>
-          <a:srcRect l="1797" t="12990" r="3214" b="16156"/>
-          <a:stretch/>
-        </p:blipFill>
-        <p:spPr>
-          <a:xfrm>
-            <a:off x="2469806" y="2991922"/>
-            <a:ext cx="6814236" cy="3000765"/>
-          </a:xfrm>
-          <a:prstGeom prst="rect">
-            <a:avLst/>
-          </a:prstGeom>
-        </p:spPr>
-      </p:pic>
-      <p:sp>
-        <p:nvSpPr>
-          <p:cNvPr id="12" name="Rectangle 11"/>
-          <p:cNvSpPr/>
-          <p:nvPr/>
-        </p:nvSpPr>
-        <p:spPr>
-          <a:xfrm>
-            <a:off x="457199" y="0"/>
-            <a:ext cx="10839451" cy="628649"/>
-          </a:xfrm>
-          <a:prstGeom prst="rect">
-            <a:avLst/>
-          </a:prstGeom>
-          <a:gradFill flip="none" rotWithShape="1">
-            <a:gsLst>
-              <a:gs pos="52000">
-                <a:schemeClr val="accent1">
-                  <a:lumMod val="60000"/>
-                  <a:lumOff val="40000"/>
-                </a:schemeClr>
-              </a:gs>
-              <a:gs pos="100000">
-                <a:schemeClr val="tx2">
-                  <a:lumMod val="60000"/>
-                  <a:lumOff val="40000"/>
-                </a:schemeClr>
-              </a:gs>
-              <a:gs pos="0">
-                <a:schemeClr val="accent1"/>
-              </a:gs>
-            </a:gsLst>
-            <a:lin ang="10800000" scaled="1"/>
-            <a:tileRect/>
-          </a:gradFill>
-          <a:ln>
-            <a:noFill/>
-          </a:ln>
-        </p:spPr>
-        <p:style>
-          <a:lnRef idx="2">
-            <a:schemeClr val="accent1">
-              <a:shade val="50000"/>
-            </a:schemeClr>
-          </a:lnRef>
-          <a:fillRef idx="1">
-            <a:schemeClr val="accent1"/>
-          </a:fillRef>
-          <a:effectRef idx="0">
-            <a:schemeClr val="accent1"/>
-          </a:effectRef>
-          <a:fontRef idx="minor">
-            <a:schemeClr val="lt1"/>
-          </a:fontRef>
-        </p:style>
-        <p:txBody>
-          <a:bodyPr rtlCol="0" anchor="ctr"/>
-          <a:lstStyle/>
-          <a:p>
-            <a:pPr algn="ctr"/>
-            <a:endParaRPr lang="en-US" sz="3200"/>
-          </a:p>
-        </p:txBody>
-      </p:sp>
-      <p:pic>
-        <p:nvPicPr>
-          <p:cNvPr id="10" name="Picture 9"/>
-          <p:cNvPicPr>
-            <a:picLocks noChangeAspect="1"/>
-          </p:cNvPicPr>
-          <p:nvPr/>
-        </p:nvPicPr>
-        <p:blipFill>
-          <a:blip r:embed="rId3" cstate="print">
-            <a:extLst>
-              <a:ext uri="{28A0092B-C50C-407E-A947-70E740481C1C}">
-                <a14:useLocalDpi xmlns:a14="http://schemas.microsoft.com/office/drawing/2010/main" val="0"/>
-              </a:ext>
-            </a:extLst>
-          </a:blip>
-          <a:stretch>
-            <a:fillRect/>
-          </a:stretch>
-        </p:blipFill>
-        <p:spPr>
-          <a:xfrm>
-            <a:off x="11325199" y="116740"/>
-            <a:ext cx="866801" cy="731428"/>
-          </a:xfrm>
-          <a:prstGeom prst="rect">
-            <a:avLst/>
-          </a:prstGeom>
-        </p:spPr>
-      </p:pic>
-      <p:sp>
-        <p:nvSpPr>
-          <p:cNvPr id="4" name="TextBox 3"/>
-          <p:cNvSpPr txBox="1"/>
-          <p:nvPr/>
-        </p:nvSpPr>
-        <p:spPr>
-          <a:xfrm>
-            <a:off x="1340642" y="0"/>
-            <a:ext cx="9072564" cy="584775"/>
-          </a:xfrm>
-          <a:prstGeom prst="rect">
-            <a:avLst/>
-          </a:prstGeom>
-          <a:noFill/>
-        </p:spPr>
-        <p:txBody>
-          <a:bodyPr wrap="square" rtlCol="0">
-            <a:spAutoFit/>
-          </a:bodyPr>
-          <a:lstStyle/>
-          <a:p>
-            <a:pPr algn="ctr"/>
-            <a:r>
-              <a:rPr lang="en-US" sz="3200" dirty="0" smtClean="0"/>
-              <a:t>Reca</a:t>
-            </a:r>
-            <a:r>
-              <a:rPr lang="en-US" sz="3200" dirty="0"/>
-              <a:t>p</a:t>
-            </a:r>
-          </a:p>
-        </p:txBody>
-      </p:sp>
-      <p:sp>
-        <p:nvSpPr>
-          <p:cNvPr id="5" name="TextBox 4"/>
-          <p:cNvSpPr txBox="1"/>
-          <p:nvPr/>
-        </p:nvSpPr>
-        <p:spPr>
-          <a:xfrm>
-            <a:off x="2324725" y="765790"/>
-            <a:ext cx="8021305" cy="2031325"/>
-          </a:xfrm>
-          <a:prstGeom prst="rect">
-            <a:avLst/>
-          </a:prstGeom>
-          <a:noFill/>
-        </p:spPr>
-        <p:txBody>
-          <a:bodyPr wrap="square" rtlCol="0">
-            <a:spAutoFit/>
-          </a:bodyPr>
-          <a:lstStyle/>
-          <a:p>
-            <a:pPr marL="285750" indent="-285750">
-              <a:buFont typeface="Arial" panose="020B0604020202020204" pitchFamily="34" charset="0"/>
-              <a:buChar char="•"/>
-            </a:pPr>
-            <a:r>
-              <a:rPr lang="en-US" dirty="0" smtClean="0"/>
-              <a:t>x86-64 addresses = </a:t>
-            </a:r>
-            <a:r>
-              <a:rPr lang="en-US" dirty="0" smtClean="0">
-                <a:solidFill>
-                  <a:srgbClr val="FF0000"/>
-                </a:solidFill>
-              </a:rPr>
-              <a:t>64-bit</a:t>
-            </a:r>
-            <a:r>
-              <a:rPr lang="en-US" dirty="0" smtClean="0"/>
-              <a:t> executable running</a:t>
-            </a:r>
-            <a:endParaRPr lang="en-US" dirty="0"/>
-          </a:p>
-          <a:p>
-            <a:pPr marL="285750" indent="-285750">
-              <a:buFont typeface="Arial" panose="020B0604020202020204" pitchFamily="34" charset="0"/>
-              <a:buChar char="•"/>
-            </a:pPr>
-            <a:r>
-              <a:rPr lang="en-US" dirty="0" smtClean="0"/>
-              <a:t>We always leak the same bytes which looks like an address:</a:t>
-            </a:r>
-          </a:p>
-          <a:p>
-            <a:pPr marL="742950" lvl="1" indent="-285750">
-              <a:buFont typeface="Arial" panose="020B0604020202020204" pitchFamily="34" charset="0"/>
-              <a:buChar char="•"/>
-            </a:pPr>
-            <a:r>
-              <a:rPr lang="en-US" dirty="0" smtClean="0">
-                <a:solidFill>
-                  <a:srgbClr val="FF0000"/>
-                </a:solidFill>
-              </a:rPr>
-              <a:t>PIE off</a:t>
-            </a:r>
-          </a:p>
-          <a:p>
-            <a:pPr marL="742950" lvl="1" indent="-285750">
-              <a:buFont typeface="Arial" panose="020B0604020202020204" pitchFamily="34" charset="0"/>
-              <a:buChar char="•"/>
-            </a:pPr>
-            <a:r>
-              <a:rPr lang="en-US" dirty="0">
-                <a:solidFill>
-                  <a:srgbClr val="FF0000"/>
-                </a:solidFill>
-              </a:rPr>
-              <a:t>n</a:t>
-            </a:r>
-            <a:r>
-              <a:rPr lang="en-US" dirty="0" smtClean="0">
-                <a:solidFill>
-                  <a:srgbClr val="FF0000"/>
-                </a:solidFill>
-              </a:rPr>
-              <a:t>o canary</a:t>
-            </a:r>
-            <a:endParaRPr lang="en-US" dirty="0" smtClean="0"/>
-          </a:p>
-          <a:p>
-            <a:pPr marL="285750" indent="-285750">
-              <a:buFont typeface="Arial" panose="020B0604020202020204" pitchFamily="34" charset="0"/>
-              <a:buChar char="•"/>
-            </a:pPr>
-            <a:r>
-              <a:rPr lang="en-US" dirty="0" smtClean="0"/>
-              <a:t>The stack addresses are </a:t>
-            </a:r>
-            <a:r>
-              <a:rPr lang="en-US" dirty="0" smtClean="0"/>
-              <a:t>randomized </a:t>
-            </a:r>
-            <a:r>
-              <a:rPr lang="en-US" dirty="0" smtClean="0"/>
-              <a:t>= </a:t>
-            </a:r>
-            <a:r>
-              <a:rPr lang="en-US" dirty="0" smtClean="0">
-                <a:solidFill>
-                  <a:srgbClr val="FF0000"/>
-                </a:solidFill>
-              </a:rPr>
-              <a:t>ASLR on</a:t>
-            </a:r>
-            <a:endParaRPr lang="en-US" dirty="0"/>
-          </a:p>
-          <a:p>
-            <a:pPr marL="285750" indent="-285750">
-              <a:buFont typeface="Arial" panose="020B0604020202020204" pitchFamily="34" charset="0"/>
-              <a:buChar char="•"/>
-            </a:pPr>
-            <a:r>
-              <a:rPr lang="en-US" dirty="0" smtClean="0"/>
-              <a:t>Crash after 40 bytes, trash in buffer = </a:t>
-            </a:r>
-            <a:r>
-              <a:rPr lang="en-US" dirty="0" smtClean="0">
-                <a:solidFill>
-                  <a:srgbClr val="FF0000"/>
-                </a:solidFill>
-              </a:rPr>
-              <a:t>char </a:t>
-            </a:r>
-            <a:r>
-              <a:rPr lang="en-US" dirty="0">
-                <a:solidFill>
-                  <a:srgbClr val="FF0000"/>
-                </a:solidFill>
-              </a:rPr>
-              <a:t>b</a:t>
-            </a:r>
-            <a:r>
-              <a:rPr lang="en-US" dirty="0" smtClean="0">
-                <a:solidFill>
-                  <a:srgbClr val="FF0000"/>
-                </a:solidFill>
-              </a:rPr>
-              <a:t>uffer[32];</a:t>
-            </a:r>
-            <a:endParaRPr lang="en-US" dirty="0"/>
-          </a:p>
-          <a:p>
-            <a:pPr marL="285750" indent="-285750">
-              <a:buFont typeface="Arial" panose="020B0604020202020204" pitchFamily="34" charset="0"/>
-              <a:buChar char="•"/>
-            </a:pPr>
-            <a:r>
-              <a:rPr lang="en-US" dirty="0" smtClean="0"/>
-              <a:t>Does not print “ </a:t>
-            </a:r>
-            <a:r>
-              <a:rPr lang="en-US" i="1" dirty="0" smtClean="0"/>
-              <a:t>Bye! </a:t>
-            </a:r>
-            <a:r>
-              <a:rPr lang="en-US" dirty="0" smtClean="0"/>
-              <a:t>” when it crashes = intermediate function</a:t>
-            </a:r>
-            <a:endParaRPr lang="en-US" dirty="0"/>
-          </a:p>
-        </p:txBody>
-      </p:sp>
-      <p:sp>
-        <p:nvSpPr>
-          <p:cNvPr id="3" name="TextBox 2"/>
-          <p:cNvSpPr txBox="1"/>
-          <p:nvPr/>
-        </p:nvSpPr>
-        <p:spPr>
-          <a:xfrm>
-            <a:off x="4004068" y="6187494"/>
-            <a:ext cx="4201297" cy="369332"/>
-          </a:xfrm>
-          <a:prstGeom prst="rect">
-            <a:avLst/>
-          </a:prstGeom>
-          <a:noFill/>
-        </p:spPr>
-        <p:txBody>
-          <a:bodyPr wrap="square" rtlCol="0">
-            <a:spAutoFit/>
-          </a:bodyPr>
-          <a:lstStyle/>
-          <a:p>
-            <a:r>
-              <a:rPr lang="en-US" i="1" dirty="0" smtClean="0"/>
-              <a:t>Ok cool bro, but what’s next?</a:t>
-            </a:r>
-            <a:endParaRPr lang="en-US" i="1" dirty="0"/>
-          </a:p>
-        </p:txBody>
-      </p:sp>
-    </p:spTree>
-    <p:extLst>
-      <p:ext uri="{BB962C8B-B14F-4D97-AF65-F5344CB8AC3E}">
-        <p14:creationId xmlns:p14="http://schemas.microsoft.com/office/powerpoint/2010/main" val="3297735021"/>
-      </p:ext>
-    </p:extLst>
-  </p:cSld>
-  <p:clrMapOvr>
-    <a:masterClrMapping/>
-  </p:clrMapOvr>
-  <p:timing>
-    <p:tnLst>
-      <p:par>
-        <p:cTn id="1" dur="indefinite" restart="never" nodeType="tmRoot"/>
-      </p:par>
-    </p:tnLst>
-  </p:timing>
-</p:sld>
-</file>
-
-<file path=ppt/slides/slide9.xml><?xml version="1.0" encoding="utf-8"?>
-<p:sld xmlns:a="http://schemas.openxmlformats.org/drawingml/2006/main" xmlns:r="http://schemas.openxmlformats.org/officeDocument/2006/relationships" xmlns:p="http://schemas.openxmlformats.org/presentationml/2006/main">
-  <p:cSld>
-    <p:spTree>
-      <p:nvGrpSpPr>
-        <p:cNvPr id="1" name=""/>
-        <p:cNvGrpSpPr/>
-        <p:nvPr/>
-      </p:nvGrpSpPr>
-      <p:grpSpPr>
-        <a:xfrm>
-          <a:off x="0" y="0"/>
-          <a:ext cx="0" cy="0"/>
-          <a:chOff x="0" y="0"/>
-          <a:chExt cx="0" cy="0"/>
-        </a:xfrm>
-      </p:grpSpPr>
-      <p:sp>
-        <p:nvSpPr>
-          <p:cNvPr id="12" name="Rectangle 11"/>
-          <p:cNvSpPr/>
-          <p:nvPr/>
-        </p:nvSpPr>
-        <p:spPr>
-          <a:xfrm>
-            <a:off x="457199" y="0"/>
-            <a:ext cx="10839451" cy="628649"/>
-          </a:xfrm>
-          <a:prstGeom prst="rect">
-            <a:avLst/>
-          </a:prstGeom>
-          <a:gradFill flip="none" rotWithShape="1">
-            <a:gsLst>
-              <a:gs pos="52000">
-                <a:schemeClr val="accent1">
-                  <a:lumMod val="60000"/>
-                  <a:lumOff val="40000"/>
-                </a:schemeClr>
-              </a:gs>
-              <a:gs pos="100000">
-                <a:schemeClr val="tx2">
-                  <a:lumMod val="60000"/>
-                  <a:lumOff val="40000"/>
-                </a:schemeClr>
-              </a:gs>
-              <a:gs pos="0">
-                <a:schemeClr val="accent1"/>
-              </a:gs>
-            </a:gsLst>
-            <a:lin ang="10800000" scaled="1"/>
-            <a:tileRect/>
-          </a:gradFill>
-          <a:ln>
-            <a:noFill/>
-          </a:ln>
-        </p:spPr>
-        <p:style>
-          <a:lnRef idx="2">
-            <a:schemeClr val="accent1">
-              <a:shade val="50000"/>
-            </a:schemeClr>
-          </a:lnRef>
-          <a:fillRef idx="1">
-            <a:schemeClr val="accent1"/>
-          </a:fillRef>
-          <a:effectRef idx="0">
-            <a:schemeClr val="accent1"/>
-          </a:effectRef>
-          <a:fontRef idx="minor">
-            <a:schemeClr val="lt1"/>
-          </a:fontRef>
-        </p:style>
-        <p:txBody>
-          <a:bodyPr rtlCol="0" anchor="ctr"/>
-          <a:lstStyle/>
-          <a:p>
-            <a:pPr algn="ctr"/>
-            <a:endParaRPr lang="en-US" sz="3200"/>
-          </a:p>
-        </p:txBody>
-      </p:sp>
-      <p:pic>
-        <p:nvPicPr>
-          <p:cNvPr id="10" name="Picture 9"/>
-          <p:cNvPicPr>
-            <a:picLocks noChangeAspect="1"/>
-          </p:cNvPicPr>
-          <p:nvPr/>
-        </p:nvPicPr>
-        <p:blipFill>
-          <a:blip r:embed="rId2" cstate="print">
-            <a:extLst>
-              <a:ext uri="{28A0092B-C50C-407E-A947-70E740481C1C}">
-                <a14:useLocalDpi xmlns:a14="http://schemas.microsoft.com/office/drawing/2010/main" val="0"/>
-              </a:ext>
-            </a:extLst>
-          </a:blip>
-          <a:stretch>
-            <a:fillRect/>
-          </a:stretch>
-        </p:blipFill>
-        <p:spPr>
-          <a:xfrm>
-            <a:off x="11325199" y="116740"/>
-            <a:ext cx="866801" cy="731428"/>
-          </a:xfrm>
-          <a:prstGeom prst="rect">
-            <a:avLst/>
-          </a:prstGeom>
-        </p:spPr>
-      </p:pic>
-      <p:sp>
-        <p:nvSpPr>
-          <p:cNvPr id="4" name="TextBox 3"/>
-          <p:cNvSpPr txBox="1"/>
-          <p:nvPr/>
-        </p:nvSpPr>
-        <p:spPr>
-          <a:xfrm>
-            <a:off x="1340642" y="0"/>
-            <a:ext cx="9072564" cy="584775"/>
-          </a:xfrm>
-          <a:prstGeom prst="rect">
-            <a:avLst/>
-          </a:prstGeom>
-          <a:noFill/>
-        </p:spPr>
-        <p:txBody>
-          <a:bodyPr wrap="square" rtlCol="0">
-            <a:spAutoFit/>
-          </a:bodyPr>
-          <a:lstStyle/>
-          <a:p>
-            <a:pPr algn="ctr"/>
-            <a:r>
-              <a:rPr lang="en-US" sz="3200" dirty="0" smtClean="0"/>
-              <a:t>Return Oriented Programming</a:t>
-            </a:r>
-            <a:endParaRPr lang="en-US" sz="3200" dirty="0"/>
-          </a:p>
-        </p:txBody>
-      </p:sp>
-      <p:sp>
-        <p:nvSpPr>
-          <p:cNvPr id="3" name="TextBox 2"/>
-          <p:cNvSpPr txBox="1"/>
-          <p:nvPr/>
-        </p:nvSpPr>
-        <p:spPr>
-          <a:xfrm>
-            <a:off x="2034746" y="1351005"/>
-            <a:ext cx="7809470" cy="1754326"/>
-          </a:xfrm>
-          <a:prstGeom prst="rect">
-            <a:avLst/>
-          </a:prstGeom>
-          <a:noFill/>
-        </p:spPr>
-        <p:txBody>
-          <a:bodyPr wrap="square" rtlCol="0">
-            <a:spAutoFit/>
-          </a:bodyPr>
-          <a:lstStyle/>
-          <a:p>
-            <a:pPr marL="285750" indent="-285750">
-              <a:buFont typeface="Arial" panose="020B0604020202020204" pitchFamily="34" charset="0"/>
-              <a:buChar char="•"/>
-            </a:pPr>
-            <a:r>
-              <a:rPr lang="en-US" dirty="0" smtClean="0"/>
-              <a:t>Once we control the execution flow = we control RIP</a:t>
-            </a:r>
-          </a:p>
-          <a:p>
-            <a:pPr marL="285750" indent="-285750">
-              <a:buFont typeface="Arial" panose="020B0604020202020204" pitchFamily="34" charset="0"/>
-              <a:buChar char="•"/>
-            </a:pPr>
-            <a:endParaRPr lang="en-US" dirty="0"/>
-          </a:p>
-          <a:p>
-            <a:pPr marL="285750" indent="-285750">
-              <a:buFont typeface="Arial" panose="020B0604020202020204" pitchFamily="34" charset="0"/>
-              <a:buChar char="•"/>
-            </a:pPr>
-            <a:r>
-              <a:rPr lang="en-US" dirty="0" smtClean="0"/>
-              <a:t>Use </a:t>
-            </a:r>
-            <a:r>
-              <a:rPr lang="en-US" i="1" dirty="0" smtClean="0"/>
-              <a:t>gadgets</a:t>
-            </a:r>
-            <a:r>
-              <a:rPr lang="en-US" dirty="0" smtClean="0"/>
-              <a:t> to execute instructions sequences from the binary itself and jump somewhere else using RET</a:t>
-            </a:r>
-            <a:endParaRPr lang="en-US" i="1" dirty="0" smtClean="0"/>
-          </a:p>
-          <a:p>
-            <a:pPr marL="285750" indent="-285750">
-              <a:buFont typeface="Arial" panose="020B0604020202020204" pitchFamily="34" charset="0"/>
-              <a:buChar char="•"/>
-            </a:pPr>
-            <a:endParaRPr lang="en-US" i="1" dirty="0"/>
-          </a:p>
-          <a:p>
-            <a:pPr marL="285750" indent="-285750">
-              <a:buFont typeface="Arial" panose="020B0604020202020204" pitchFamily="34" charset="0"/>
-              <a:buChar char="•"/>
-            </a:pPr>
-            <a:r>
-              <a:rPr lang="en-US" dirty="0" smtClean="0"/>
-              <a:t>We control the stack values with the stack buffer overflow!</a:t>
-            </a:r>
-          </a:p>
-        </p:txBody>
-      </p:sp>
-      <p:pic>
-        <p:nvPicPr>
-          <p:cNvPr id="5" name="Picture 4"/>
-          <p:cNvPicPr>
-            <a:picLocks noChangeAspect="1"/>
-          </p:cNvPicPr>
-          <p:nvPr/>
-        </p:nvPicPr>
-        <p:blipFill>
-          <a:blip r:embed="rId3">
-            <a:extLst>
-              <a:ext uri="{28A0092B-C50C-407E-A947-70E740481C1C}">
-                <a14:useLocalDpi xmlns:a14="http://schemas.microsoft.com/office/drawing/2010/main" val="0"/>
-              </a:ext>
-            </a:extLst>
-          </a:blip>
-          <a:stretch>
-            <a:fillRect/>
-          </a:stretch>
-        </p:blipFill>
-        <p:spPr>
-          <a:xfrm>
-            <a:off x="1070059" y="4562694"/>
-            <a:ext cx="9712584" cy="868857"/>
-          </a:xfrm>
-          <a:prstGeom prst="rect">
-            <a:avLst/>
-          </a:prstGeom>
-        </p:spPr>
-      </p:pic>
-      <p:sp>
-        <p:nvSpPr>
-          <p:cNvPr id="8" name="TextBox 7"/>
-          <p:cNvSpPr txBox="1"/>
-          <p:nvPr/>
-        </p:nvSpPr>
-        <p:spPr>
-          <a:xfrm>
-            <a:off x="1070059" y="3593898"/>
-            <a:ext cx="9704172" cy="646331"/>
-          </a:xfrm>
-          <a:prstGeom prst="rect">
-            <a:avLst/>
-          </a:prstGeom>
-          <a:noFill/>
-        </p:spPr>
-        <p:txBody>
-          <a:bodyPr wrap="square" rtlCol="0">
-            <a:spAutoFit/>
-          </a:bodyPr>
-          <a:lstStyle/>
-          <a:p>
-            <a:r>
-              <a:rPr lang="en-US" dirty="0" smtClean="0"/>
-              <a:t>For instance, this gadgets allows the attacker to control RDI, which is the first argument in the x64 calling convention.</a:t>
-            </a:r>
-            <a:endParaRPr lang="en-US" dirty="0"/>
-          </a:p>
-        </p:txBody>
-      </p:sp>
-    </p:spTree>
-    <p:extLst>
-      <p:ext uri="{BB962C8B-B14F-4D97-AF65-F5344CB8AC3E}">
-        <p14:creationId xmlns:p14="http://schemas.microsoft.com/office/powerpoint/2010/main" val="3476725745"/>
-      </p:ext>
-    </p:extLst>
-  </p:cSld>
-  <p:clrMapOvr>
-    <a:masterClrMapping/>
-  </p:clrMapOvr>
-  <p:timing>
-    <p:tnLst>
-      <p:par>
-        <p:cTn id="1" dur="indefinite" restart="never" nodeType="tmRoot"/>
-      </p:par>
-    </p:tnLst>
   </p:timing>
 </p:sld>
 </file>

</xml_diff>